<commit_message>
Reorganización del proyecto para el uso de Browserify y GRUNT
Se crea la carpeta src/ y se mueven los fuentes a dicha carpeta para el
uso de GRUNT
NOTAS:
No se suben los directorios build y node_modulo_modules porque se
generan al momento de configurar el ambiente de desarrollo
</commit_message>
<xml_diff>
--- a/bitacora_desarrollo.pptx
+++ b/bitacora_desarrollo.pptx
@@ -11,7 +11,12 @@
     <p:sldId id="262" r:id="rId5"/>
     <p:sldId id="264" r:id="rId6"/>
     <p:sldId id="265" r:id="rId7"/>
-    <p:sldId id="263" r:id="rId8"/>
+    <p:sldId id="266" r:id="rId8"/>
+    <p:sldId id="267" r:id="rId9"/>
+    <p:sldId id="268" r:id="rId10"/>
+    <p:sldId id="269" r:id="rId11"/>
+    <p:sldId id="270" r:id="rId12"/>
+    <p:sldId id="263" r:id="rId13"/>
   </p:sldIdLst>
   <p:sldSz cx="9144000" cy="6858000" type="screen4x3"/>
   <p:notesSz cx="6858000" cy="9144000"/>
@@ -302,7 +307,7 @@
             <a:fld id="{7A847CFC-816F-41D0-AAC0-9BF4FEBC753E}" type="datetimeFigureOut">
               <a:rPr lang="es-ES" smtClean="0"/>
               <a:pPr/>
-              <a:t>26/09/2015</a:t>
+              <a:t>25/10/2015</a:t>
             </a:fld>
             <a:endParaRPr lang="es-ES"/>
           </a:p>
@@ -504,7 +509,7 @@
             <a:fld id="{7A847CFC-816F-41D0-AAC0-9BF4FEBC753E}" type="datetimeFigureOut">
               <a:rPr lang="es-ES" smtClean="0"/>
               <a:pPr/>
-              <a:t>26/09/2015</a:t>
+              <a:t>25/10/2015</a:t>
             </a:fld>
             <a:endParaRPr lang="es-ES"/>
           </a:p>
@@ -681,7 +686,7 @@
             <a:fld id="{7A847CFC-816F-41D0-AAC0-9BF4FEBC753E}" type="datetimeFigureOut">
               <a:rPr lang="es-ES" smtClean="0"/>
               <a:pPr/>
-              <a:t>26/09/2015</a:t>
+              <a:t>25/10/2015</a:t>
             </a:fld>
             <a:endParaRPr lang="es-ES"/>
           </a:p>
@@ -848,7 +853,7 @@
             <a:fld id="{7A847CFC-816F-41D0-AAC0-9BF4FEBC753E}" type="datetimeFigureOut">
               <a:rPr lang="es-ES" smtClean="0"/>
               <a:pPr/>
-              <a:t>26/09/2015</a:t>
+              <a:t>25/10/2015</a:t>
             </a:fld>
             <a:endParaRPr lang="es-ES"/>
           </a:p>
@@ -1098,7 +1103,7 @@
             <a:fld id="{7A847CFC-816F-41D0-AAC0-9BF4FEBC753E}" type="datetimeFigureOut">
               <a:rPr lang="es-ES" smtClean="0"/>
               <a:pPr/>
-              <a:t>26/09/2015</a:t>
+              <a:t>25/10/2015</a:t>
             </a:fld>
             <a:endParaRPr lang="es-ES"/>
           </a:p>
@@ -1418,7 +1423,7 @@
             <a:fld id="{7A847CFC-816F-41D0-AAC0-9BF4FEBC753E}" type="datetimeFigureOut">
               <a:rPr lang="es-ES" smtClean="0"/>
               <a:pPr/>
-              <a:t>26/09/2015</a:t>
+              <a:t>25/10/2015</a:t>
             </a:fld>
             <a:endParaRPr lang="es-ES"/>
           </a:p>
@@ -1886,7 +1891,7 @@
             <a:fld id="{7A847CFC-816F-41D0-AAC0-9BF4FEBC753E}" type="datetimeFigureOut">
               <a:rPr lang="es-ES" smtClean="0"/>
               <a:pPr/>
-              <a:t>26/09/2015</a:t>
+              <a:t>25/10/2015</a:t>
             </a:fld>
             <a:endParaRPr lang="es-ES"/>
           </a:p>
@@ -2036,7 +2041,7 @@
             <a:fld id="{7A847CFC-816F-41D0-AAC0-9BF4FEBC753E}" type="datetimeFigureOut">
               <a:rPr lang="es-ES" smtClean="0"/>
               <a:pPr/>
-              <a:t>26/09/2015</a:t>
+              <a:t>25/10/2015</a:t>
             </a:fld>
             <a:endParaRPr lang="es-ES"/>
           </a:p>
@@ -2128,7 +2133,7 @@
             <a:fld id="{7A847CFC-816F-41D0-AAC0-9BF4FEBC753E}" type="datetimeFigureOut">
               <a:rPr lang="es-ES" smtClean="0"/>
               <a:pPr/>
-              <a:t>26/09/2015</a:t>
+              <a:t>25/10/2015</a:t>
             </a:fld>
             <a:endParaRPr lang="es-ES"/>
           </a:p>
@@ -2404,7 +2409,7 @@
             <a:fld id="{7A847CFC-816F-41D0-AAC0-9BF4FEBC753E}" type="datetimeFigureOut">
               <a:rPr lang="es-ES" smtClean="0"/>
               <a:pPr/>
-              <a:t>26/09/2015</a:t>
+              <a:t>25/10/2015</a:t>
             </a:fld>
             <a:endParaRPr lang="es-ES"/>
           </a:p>
@@ -2711,7 +2716,7 @@
             <a:fld id="{7A847CFC-816F-41D0-AAC0-9BF4FEBC753E}" type="datetimeFigureOut">
               <a:rPr lang="es-ES" smtClean="0"/>
               <a:pPr/>
-              <a:t>26/09/2015</a:t>
+              <a:t>25/10/2015</a:t>
             </a:fld>
             <a:endParaRPr lang="es-ES"/>
           </a:p>
@@ -3011,7 +3016,7 @@
             <a:fld id="{7A847CFC-816F-41D0-AAC0-9BF4FEBC753E}" type="datetimeFigureOut">
               <a:rPr lang="es-ES" smtClean="0"/>
               <a:pPr/>
-              <a:t>26/09/2015</a:t>
+              <a:t>25/10/2015</a:t>
             </a:fld>
             <a:endParaRPr lang="es-ES"/>
           </a:p>
@@ -3449,54 +3454,1248 @@
           </a:bodyPr>
           <a:lstStyle/>
           <a:p>
-            <a:r>
-              <a:rPr lang="es-VE" sz="2400" dirty="0" err="1" smtClean="0"/>
-              <a:t>Bower</a:t>
-            </a:r>
-            <a:r>
-              <a:rPr lang="es-VE" sz="2400" dirty="0" smtClean="0"/>
-              <a:t> – manejador de dependencias de librerías FRONT. Necesita:</a:t>
-            </a:r>
-          </a:p>
-          <a:p>
-            <a:pPr lvl="1"/>
-            <a:r>
-              <a:rPr lang="es-VE" sz="2400" dirty="0" smtClean="0"/>
-              <a:t>NODE (NPM).</a:t>
-            </a:r>
-          </a:p>
-          <a:p>
-            <a:pPr lvl="1"/>
-            <a:r>
-              <a:rPr lang="es-VE" sz="2400" dirty="0" smtClean="0"/>
-              <a:t>Cliente GIT (recomendado MSGIT).</a:t>
-            </a:r>
-          </a:p>
-          <a:p>
-            <a:r>
-              <a:rPr lang="es-VE" sz="2400" dirty="0" err="1" smtClean="0"/>
-              <a:t>Brackets</a:t>
-            </a:r>
-            <a:r>
-              <a:rPr lang="es-VE" sz="2400" dirty="0" smtClean="0"/>
-              <a:t> – editor de texto para desarrollo web</a:t>
-            </a:r>
+            <a:pPr>
+              <a:buNone/>
+            </a:pPr>
+            <a:endParaRPr lang="es-VE" sz="2400" dirty="0" smtClean="0"/>
+          </a:p>
+          <a:p>
+            <a:endParaRPr lang="es-VE" sz="2400" dirty="0" smtClean="0"/>
+          </a:p>
+          <a:p>
+            <a:endParaRPr lang="es-VE" sz="2400" dirty="0" smtClean="0"/>
+          </a:p>
+          <a:p>
+            <a:endParaRPr lang="es-VE" dirty="0" smtClean="0"/>
+          </a:p>
+          <a:p>
+            <a:endParaRPr lang="es-VE" u="sng" dirty="0" smtClean="0"/>
+          </a:p>
+          <a:p>
+            <a:endParaRPr lang="es-VE" dirty="0" smtClean="0"/>
+          </a:p>
+          <a:p>
+            <a:endParaRPr lang="es-VE" dirty="0" smtClean="0"/>
+          </a:p>
+          <a:p>
+            <a:endParaRPr lang="en-US" dirty="0" smtClean="0"/>
+          </a:p>
+          <a:p>
+            <a:endParaRPr lang="es-VE" dirty="0" err="1" smtClean="0"/>
+          </a:p>
+          <a:p>
+            <a:endParaRPr lang="es-VE" sz="2400" dirty="0" smtClean="0"/>
           </a:p>
           <a:p>
             <a:endParaRPr lang="es-VE" sz="2400" dirty="0"/>
           </a:p>
         </p:txBody>
       </p:sp>
+      <p:graphicFrame>
+        <p:nvGraphicFramePr>
+          <p:cNvPr id="4" name="3 Tabla"/>
+          <p:cNvGraphicFramePr>
+            <a:graphicFrameLocks noGrp="1"/>
+          </p:cNvGraphicFramePr>
+          <p:nvPr/>
+        </p:nvGraphicFramePr>
+        <p:xfrm>
+          <a:off x="611560" y="1556794"/>
+          <a:ext cx="7992889" cy="5176822"/>
+        </p:xfrm>
+        <a:graphic>
+          <a:graphicData uri="http://schemas.openxmlformats.org/drawingml/2006/table">
+            <a:tbl>
+              <a:tblPr firstRow="1" bandRow="1">
+                <a:tableStyleId>{5C22544A-7EE6-4342-B048-85BDC9FD1C3A}</a:tableStyleId>
+              </a:tblPr>
+              <a:tblGrid>
+                <a:gridCol w="1728192"/>
+                <a:gridCol w="4680520"/>
+                <a:gridCol w="1584177"/>
+              </a:tblGrid>
+              <a:tr h="396165">
+                <a:tc>
+                  <a:txBody>
+                    <a:bodyPr/>
+                    <a:lstStyle/>
+                    <a:p>
+                      <a:endParaRPr lang="es-VE" dirty="0"/>
+                    </a:p>
+                  </a:txBody>
+                  <a:tcPr/>
+                </a:tc>
+                <a:tc>
+                  <a:txBody>
+                    <a:bodyPr/>
+                    <a:lstStyle/>
+                    <a:p>
+                      <a:endParaRPr lang="es-VE" dirty="0"/>
+                    </a:p>
+                  </a:txBody>
+                  <a:tcPr/>
+                </a:tc>
+                <a:tc>
+                  <a:txBody>
+                    <a:bodyPr/>
+                    <a:lstStyle/>
+                    <a:p>
+                      <a:endParaRPr lang="es-VE" dirty="0"/>
+                    </a:p>
+                  </a:txBody>
+                  <a:tcPr/>
+                </a:tc>
+              </a:tr>
+              <a:tr h="395921">
+                <a:tc>
+                  <a:txBody>
+                    <a:bodyPr/>
+                    <a:lstStyle/>
+                    <a:p>
+                      <a:pPr marL="0" marR="0" indent="0" algn="l" defTabSz="914400" rtl="0" eaLnBrk="1" fontAlgn="auto" latinLnBrk="0" hangingPunct="1">
+                        <a:lnSpc>
+                          <a:spcPct val="100000"/>
+                        </a:lnSpc>
+                        <a:spcBef>
+                          <a:spcPts val="0"/>
+                        </a:spcBef>
+                        <a:spcAft>
+                          <a:spcPts val="0"/>
+                        </a:spcAft>
+                        <a:buClrTx/>
+                        <a:buSzTx/>
+                        <a:buFontTx/>
+                        <a:buNone/>
+                        <a:tabLst/>
+                        <a:defRPr/>
+                      </a:pPr>
+                      <a:r>
+                        <a:rPr lang="es-VE" sz="1800" smtClean="0"/>
+                        <a:t>NODE (NPM)</a:t>
+                      </a:r>
+                      <a:endParaRPr lang="es-VE" smtClean="0"/>
+                    </a:p>
+                  </a:txBody>
+                  <a:tcPr/>
+                </a:tc>
+                <a:tc>
+                  <a:txBody>
+                    <a:bodyPr/>
+                    <a:lstStyle/>
+                    <a:p>
+                      <a:pPr marL="0" marR="0" indent="0" algn="l" defTabSz="914400" rtl="0" eaLnBrk="1" fontAlgn="auto" latinLnBrk="0" hangingPunct="1">
+                        <a:lnSpc>
+                          <a:spcPct val="100000"/>
+                        </a:lnSpc>
+                        <a:spcBef>
+                          <a:spcPts val="0"/>
+                        </a:spcBef>
+                        <a:spcAft>
+                          <a:spcPts val="0"/>
+                        </a:spcAft>
+                        <a:buClrTx/>
+                        <a:buSzTx/>
+                        <a:buFontTx/>
+                        <a:buNone/>
+                        <a:tabLst/>
+                        <a:defRPr/>
+                      </a:pPr>
+                      <a:r>
+                        <a:rPr lang="es-VE" sz="1800" dirty="0" smtClean="0"/>
+                        <a:t>manejador de paquetes</a:t>
+                      </a:r>
+                      <a:endParaRPr lang="es-VE" dirty="0" smtClean="0"/>
+                    </a:p>
+                  </a:txBody>
+                  <a:tcPr/>
+                </a:tc>
+                <a:tc>
+                  <a:txBody>
+                    <a:bodyPr/>
+                    <a:lstStyle/>
+                    <a:p>
+                      <a:r>
+                        <a:rPr lang="es-VE" smtClean="0"/>
+                        <a:t>Instalador</a:t>
+                      </a:r>
+                      <a:endParaRPr lang="es-VE" dirty="0"/>
+                    </a:p>
+                  </a:txBody>
+                  <a:tcPr/>
+                </a:tc>
+              </a:tr>
+              <a:tr h="432208">
+                <a:tc>
+                  <a:txBody>
+                    <a:bodyPr/>
+                    <a:lstStyle/>
+                    <a:p>
+                      <a:r>
+                        <a:rPr lang="es-VE" dirty="0" smtClean="0"/>
+                        <a:t>Cliente </a:t>
+                      </a:r>
+                      <a:r>
+                        <a:rPr lang="es-VE" dirty="0" smtClean="0"/>
+                        <a:t>GIT</a:t>
+                      </a:r>
+                      <a:endParaRPr lang="es-VE" dirty="0"/>
+                    </a:p>
+                  </a:txBody>
+                  <a:tcPr/>
+                </a:tc>
+                <a:tc>
+                  <a:txBody>
+                    <a:bodyPr/>
+                    <a:lstStyle/>
+                    <a:p>
+                      <a:r>
+                        <a:rPr lang="es-VE" dirty="0" smtClean="0"/>
+                        <a:t>recomendado MSGIT</a:t>
+                      </a:r>
+                      <a:endParaRPr lang="es-VE" dirty="0"/>
+                    </a:p>
+                  </a:txBody>
+                  <a:tcPr/>
+                </a:tc>
+                <a:tc>
+                  <a:txBody>
+                    <a:bodyPr/>
+                    <a:lstStyle/>
+                    <a:p>
+                      <a:pPr marL="0" marR="0" indent="0" algn="l" defTabSz="914400" rtl="0" eaLnBrk="1" fontAlgn="auto" latinLnBrk="0" hangingPunct="1">
+                        <a:lnSpc>
+                          <a:spcPct val="100000"/>
+                        </a:lnSpc>
+                        <a:spcBef>
+                          <a:spcPts val="0"/>
+                        </a:spcBef>
+                        <a:spcAft>
+                          <a:spcPts val="0"/>
+                        </a:spcAft>
+                        <a:buClrTx/>
+                        <a:buSzTx/>
+                        <a:buFontTx/>
+                        <a:buNone/>
+                        <a:tabLst/>
+                        <a:defRPr/>
+                      </a:pPr>
+                      <a:r>
+                        <a:rPr lang="es-VE" dirty="0" smtClean="0"/>
+                        <a:t>Instalador</a:t>
+                      </a:r>
+                    </a:p>
+                  </a:txBody>
+                  <a:tcPr/>
+                </a:tc>
+              </a:tr>
+              <a:tr h="396165">
+                <a:tc>
+                  <a:txBody>
+                    <a:bodyPr/>
+                    <a:lstStyle/>
+                    <a:p>
+                      <a:pPr marL="0" marR="0" indent="0" algn="l" defTabSz="914400" rtl="0" eaLnBrk="1" fontAlgn="auto" latinLnBrk="0" hangingPunct="1">
+                        <a:lnSpc>
+                          <a:spcPct val="100000"/>
+                        </a:lnSpc>
+                        <a:spcBef>
+                          <a:spcPts val="0"/>
+                        </a:spcBef>
+                        <a:spcAft>
+                          <a:spcPts val="0"/>
+                        </a:spcAft>
+                        <a:buClrTx/>
+                        <a:buSzTx/>
+                        <a:buFontTx/>
+                        <a:buNone/>
+                        <a:tabLst/>
+                        <a:defRPr/>
+                      </a:pPr>
+                      <a:r>
+                        <a:rPr lang="es-VE" sz="1800" dirty="0" err="1" smtClean="0"/>
+                        <a:t>Bower</a:t>
+                      </a:r>
+                      <a:endParaRPr lang="es-VE" sz="1800" dirty="0" smtClean="0"/>
+                    </a:p>
+                    <a:p>
+                      <a:endParaRPr lang="es-VE" dirty="0"/>
+                    </a:p>
+                  </a:txBody>
+                  <a:tcPr/>
+                </a:tc>
+                <a:tc>
+                  <a:txBody>
+                    <a:bodyPr/>
+                    <a:lstStyle/>
+                    <a:p>
+                      <a:pPr marL="0" marR="0" indent="0" algn="l" defTabSz="914400" rtl="0" eaLnBrk="1" fontAlgn="auto" latinLnBrk="0" hangingPunct="1">
+                        <a:lnSpc>
+                          <a:spcPct val="100000"/>
+                        </a:lnSpc>
+                        <a:spcBef>
+                          <a:spcPts val="0"/>
+                        </a:spcBef>
+                        <a:spcAft>
+                          <a:spcPts val="0"/>
+                        </a:spcAft>
+                        <a:buClrTx/>
+                        <a:buSzTx/>
+                        <a:buFontTx/>
+                        <a:buNone/>
+                        <a:tabLst/>
+                        <a:defRPr/>
+                      </a:pPr>
+                      <a:r>
+                        <a:rPr lang="es-VE" sz="1800" dirty="0" smtClean="0"/>
+                        <a:t>manejador de dependencias de librerías FRONT</a:t>
+                      </a:r>
+                      <a:endParaRPr lang="es-VE" dirty="0" smtClean="0"/>
+                    </a:p>
+                  </a:txBody>
+                  <a:tcPr/>
+                </a:tc>
+                <a:tc>
+                  <a:txBody>
+                    <a:bodyPr/>
+                    <a:lstStyle/>
+                    <a:p>
+                      <a:r>
+                        <a:rPr lang="es-VE" baseline="0" dirty="0" smtClean="0"/>
+                        <a:t>NPM</a:t>
+                      </a:r>
+                      <a:endParaRPr lang="es-VE" dirty="0"/>
+                    </a:p>
+                  </a:txBody>
+                  <a:tcPr/>
+                </a:tc>
+              </a:tr>
+              <a:tr h="396165">
+                <a:tc>
+                  <a:txBody>
+                    <a:bodyPr/>
+                    <a:lstStyle/>
+                    <a:p>
+                      <a:r>
+                        <a:rPr lang="es-VE" dirty="0" err="1" smtClean="0"/>
+                        <a:t>LessCSS</a:t>
+                      </a:r>
+                      <a:endParaRPr lang="es-VE" dirty="0"/>
+                    </a:p>
+                  </a:txBody>
+                  <a:tcPr/>
+                </a:tc>
+                <a:tc>
+                  <a:txBody>
+                    <a:bodyPr/>
+                    <a:lstStyle/>
+                    <a:p>
+                      <a:r>
+                        <a:rPr lang="es-VE" dirty="0" smtClean="0"/>
+                        <a:t>Librería para extensión de CSS </a:t>
+                      </a:r>
+                      <a:r>
+                        <a:rPr lang="es-VE" sz="1100" dirty="0" smtClean="0"/>
+                        <a:t>(</a:t>
+                      </a:r>
+                      <a:r>
+                        <a:rPr lang="es-VE" sz="1100" dirty="0" smtClean="0">
+                          <a:hlinkClick r:id="rId2"/>
+                        </a:rPr>
+                        <a:t>http://lesscss.org</a:t>
+                      </a:r>
+                      <a:r>
+                        <a:rPr lang="es-VE" sz="1100" dirty="0" smtClean="0"/>
+                        <a:t>/)</a:t>
+                      </a:r>
+                      <a:endParaRPr lang="es-VE" dirty="0"/>
+                    </a:p>
+                  </a:txBody>
+                  <a:tcPr/>
+                </a:tc>
+                <a:tc>
+                  <a:txBody>
+                    <a:bodyPr/>
+                    <a:lstStyle/>
+                    <a:p>
+                      <a:pPr marL="0" marR="0" indent="0" algn="l" defTabSz="914400" rtl="0" eaLnBrk="1" fontAlgn="auto" latinLnBrk="0" hangingPunct="1">
+                        <a:lnSpc>
+                          <a:spcPct val="100000"/>
+                        </a:lnSpc>
+                        <a:spcBef>
+                          <a:spcPts val="0"/>
+                        </a:spcBef>
+                        <a:spcAft>
+                          <a:spcPts val="0"/>
+                        </a:spcAft>
+                        <a:buClrTx/>
+                        <a:buSzTx/>
+                        <a:buFontTx/>
+                        <a:buNone/>
+                        <a:tabLst/>
+                        <a:defRPr/>
+                      </a:pPr>
+                      <a:r>
+                        <a:rPr lang="es-VE" baseline="0" dirty="0" smtClean="0"/>
+                        <a:t>NPM</a:t>
+                      </a:r>
+                      <a:endParaRPr lang="es-VE" dirty="0" smtClean="0"/>
+                    </a:p>
+                  </a:txBody>
+                  <a:tcPr/>
+                </a:tc>
+              </a:tr>
+              <a:tr h="403915">
+                <a:tc>
+                  <a:txBody>
+                    <a:bodyPr/>
+                    <a:lstStyle/>
+                    <a:p>
+                      <a:r>
+                        <a:rPr lang="es-VE" dirty="0" err="1" smtClean="0"/>
+                        <a:t>Browserify</a:t>
+                      </a:r>
+                      <a:endParaRPr lang="es-VE" dirty="0"/>
+                    </a:p>
+                  </a:txBody>
+                  <a:tcPr/>
+                </a:tc>
+                <a:tc>
+                  <a:txBody>
+                    <a:bodyPr/>
+                    <a:lstStyle/>
+                    <a:p>
+                      <a:r>
+                        <a:rPr lang="es-VE" dirty="0" smtClean="0"/>
+                        <a:t>Librería para la programación web modular</a:t>
+                      </a:r>
+                      <a:endParaRPr lang="es-VE" dirty="0"/>
+                    </a:p>
+                  </a:txBody>
+                  <a:tcPr/>
+                </a:tc>
+                <a:tc>
+                  <a:txBody>
+                    <a:bodyPr/>
+                    <a:lstStyle/>
+                    <a:p>
+                      <a:pPr marL="0" marR="0" indent="0" algn="l" defTabSz="914400" rtl="0" eaLnBrk="1" fontAlgn="auto" latinLnBrk="0" hangingPunct="1">
+                        <a:lnSpc>
+                          <a:spcPct val="100000"/>
+                        </a:lnSpc>
+                        <a:spcBef>
+                          <a:spcPts val="0"/>
+                        </a:spcBef>
+                        <a:spcAft>
+                          <a:spcPts val="0"/>
+                        </a:spcAft>
+                        <a:buClrTx/>
+                        <a:buSzTx/>
+                        <a:buFontTx/>
+                        <a:buNone/>
+                        <a:tabLst/>
+                        <a:defRPr/>
+                      </a:pPr>
+                      <a:r>
+                        <a:rPr lang="es-VE" baseline="0" dirty="0" smtClean="0"/>
+                        <a:t>NPM</a:t>
+                      </a:r>
+                      <a:endParaRPr lang="es-VE" dirty="0" smtClean="0"/>
+                    </a:p>
+                  </a:txBody>
+                  <a:tcPr/>
+                </a:tc>
+              </a:tr>
+              <a:tr h="683793">
+                <a:tc>
+                  <a:txBody>
+                    <a:bodyPr/>
+                    <a:lstStyle/>
+                    <a:p>
+                      <a:r>
+                        <a:rPr lang="es-VE" dirty="0" err="1" smtClean="0"/>
+                        <a:t>Grunt</a:t>
+                      </a:r>
+                      <a:endParaRPr lang="es-VE" dirty="0"/>
+                    </a:p>
+                  </a:txBody>
+                  <a:tcPr/>
+                </a:tc>
+                <a:tc>
+                  <a:txBody>
+                    <a:bodyPr/>
+                    <a:lstStyle/>
+                    <a:p>
+                      <a:r>
+                        <a:rPr lang="es-VE" dirty="0" smtClean="0"/>
+                        <a:t>Librería para la automatización de tareas de </a:t>
+                      </a:r>
+                      <a:r>
+                        <a:rPr lang="es-VE" dirty="0" err="1" smtClean="0"/>
+                        <a:t>deployment</a:t>
+                      </a:r>
+                      <a:endParaRPr lang="es-VE" dirty="0"/>
+                    </a:p>
+                  </a:txBody>
+                  <a:tcPr/>
+                </a:tc>
+                <a:tc>
+                  <a:txBody>
+                    <a:bodyPr/>
+                    <a:lstStyle/>
+                    <a:p>
+                      <a:pPr marL="0" marR="0" indent="0" algn="l" defTabSz="914400" rtl="0" eaLnBrk="1" fontAlgn="auto" latinLnBrk="0" hangingPunct="1">
+                        <a:lnSpc>
+                          <a:spcPct val="100000"/>
+                        </a:lnSpc>
+                        <a:spcBef>
+                          <a:spcPts val="0"/>
+                        </a:spcBef>
+                        <a:spcAft>
+                          <a:spcPts val="0"/>
+                        </a:spcAft>
+                        <a:buClrTx/>
+                        <a:buSzTx/>
+                        <a:buFontTx/>
+                        <a:buNone/>
+                        <a:tabLst/>
+                        <a:defRPr/>
+                      </a:pPr>
+                      <a:r>
+                        <a:rPr lang="es-VE" baseline="0" dirty="0" smtClean="0"/>
+                        <a:t>NPM</a:t>
+                      </a:r>
+                      <a:endParaRPr lang="es-VE" dirty="0" smtClean="0"/>
+                    </a:p>
+                  </a:txBody>
+                  <a:tcPr/>
+                </a:tc>
+              </a:tr>
+              <a:tr h="396165">
+                <a:tc>
+                  <a:txBody>
+                    <a:bodyPr/>
+                    <a:lstStyle/>
+                    <a:p>
+                      <a:r>
+                        <a:rPr lang="en-US" dirty="0" err="1" smtClean="0">
+                          <a:hlinkClick r:id="rId3"/>
+                        </a:rPr>
+                        <a:t>UglifyJS</a:t>
+                      </a:r>
+                      <a:endParaRPr lang="es-VE" dirty="0"/>
+                    </a:p>
+                  </a:txBody>
+                  <a:tcPr/>
+                </a:tc>
+                <a:tc>
+                  <a:txBody>
+                    <a:bodyPr/>
+                    <a:lstStyle/>
+                    <a:p>
+                      <a:r>
+                        <a:rPr lang="en-US" dirty="0" err="1" smtClean="0"/>
+                        <a:t>Javascript</a:t>
+                      </a:r>
+                      <a:r>
+                        <a:rPr lang="en-US" dirty="0" smtClean="0"/>
+                        <a:t> </a:t>
+                      </a:r>
+                      <a:r>
+                        <a:rPr lang="en-US" dirty="0" err="1" smtClean="0"/>
+                        <a:t>minification</a:t>
+                      </a:r>
+                      <a:endParaRPr lang="es-VE" dirty="0"/>
+                    </a:p>
+                  </a:txBody>
+                  <a:tcPr/>
+                </a:tc>
+                <a:tc>
+                  <a:txBody>
+                    <a:bodyPr/>
+                    <a:lstStyle/>
+                    <a:p>
+                      <a:pPr marL="0" marR="0" indent="0" algn="l" defTabSz="914400" rtl="0" eaLnBrk="1" fontAlgn="auto" latinLnBrk="0" hangingPunct="1">
+                        <a:lnSpc>
+                          <a:spcPct val="100000"/>
+                        </a:lnSpc>
+                        <a:spcBef>
+                          <a:spcPts val="0"/>
+                        </a:spcBef>
+                        <a:spcAft>
+                          <a:spcPts val="0"/>
+                        </a:spcAft>
+                        <a:buClrTx/>
+                        <a:buSzTx/>
+                        <a:buFontTx/>
+                        <a:buNone/>
+                        <a:tabLst/>
+                        <a:defRPr/>
+                      </a:pPr>
+                      <a:r>
+                        <a:rPr lang="es-VE" baseline="0" dirty="0" smtClean="0"/>
+                        <a:t>NPM</a:t>
+                      </a:r>
+                      <a:endParaRPr lang="es-VE" dirty="0" smtClean="0"/>
+                    </a:p>
+                  </a:txBody>
+                  <a:tcPr/>
+                </a:tc>
+              </a:tr>
+              <a:tr h="396165">
+                <a:tc>
+                  <a:txBody>
+                    <a:bodyPr/>
+                    <a:lstStyle/>
+                    <a:p>
+                      <a:r>
+                        <a:rPr lang="en-US" dirty="0" err="1" smtClean="0"/>
+                        <a:t>Jshint</a:t>
+                      </a:r>
+                      <a:endParaRPr lang="es-VE" dirty="0"/>
+                    </a:p>
+                  </a:txBody>
+                  <a:tcPr/>
+                </a:tc>
+                <a:tc>
+                  <a:txBody>
+                    <a:bodyPr/>
+                    <a:lstStyle/>
+                    <a:p>
+                      <a:r>
+                        <a:rPr lang="en-US" dirty="0" err="1" smtClean="0"/>
+                        <a:t>Valida</a:t>
+                      </a:r>
+                      <a:r>
+                        <a:rPr lang="en-US" dirty="0" smtClean="0"/>
+                        <a:t> el </a:t>
+                      </a:r>
+                      <a:r>
+                        <a:rPr lang="en-US" dirty="0" err="1" smtClean="0"/>
+                        <a:t>codigo</a:t>
+                      </a:r>
+                      <a:r>
+                        <a:rPr lang="en-US" dirty="0" smtClean="0"/>
+                        <a:t> JavaScript</a:t>
+                      </a:r>
+                      <a:endParaRPr lang="es-VE" dirty="0"/>
+                    </a:p>
+                  </a:txBody>
+                  <a:tcPr/>
+                </a:tc>
+                <a:tc>
+                  <a:txBody>
+                    <a:bodyPr/>
+                    <a:lstStyle/>
+                    <a:p>
+                      <a:pPr marL="0" marR="0" indent="0" algn="l" defTabSz="914400" rtl="0" eaLnBrk="1" fontAlgn="auto" latinLnBrk="0" hangingPunct="1">
+                        <a:lnSpc>
+                          <a:spcPct val="100000"/>
+                        </a:lnSpc>
+                        <a:spcBef>
+                          <a:spcPts val="0"/>
+                        </a:spcBef>
+                        <a:spcAft>
+                          <a:spcPts val="0"/>
+                        </a:spcAft>
+                        <a:buClrTx/>
+                        <a:buSzTx/>
+                        <a:buFontTx/>
+                        <a:buNone/>
+                        <a:tabLst/>
+                        <a:defRPr/>
+                      </a:pPr>
+                      <a:r>
+                        <a:rPr lang="es-VE" baseline="0" dirty="0" smtClean="0"/>
+                        <a:t>NPM</a:t>
+                      </a:r>
+                      <a:endParaRPr lang="es-VE" dirty="0" smtClean="0"/>
+                    </a:p>
+                  </a:txBody>
+                  <a:tcPr/>
+                </a:tc>
+              </a:tr>
+              <a:tr h="396165">
+                <a:tc>
+                  <a:txBody>
+                    <a:bodyPr/>
+                    <a:lstStyle/>
+                    <a:p>
+                      <a:r>
+                        <a:rPr lang="es-VE" sz="1800" dirty="0" err="1" smtClean="0"/>
+                        <a:t>Brackets</a:t>
+                      </a:r>
+                      <a:endParaRPr lang="es-VE" dirty="0"/>
+                    </a:p>
+                  </a:txBody>
+                  <a:tcPr/>
+                </a:tc>
+                <a:tc>
+                  <a:txBody>
+                    <a:bodyPr/>
+                    <a:lstStyle/>
+                    <a:p>
+                      <a:r>
+                        <a:rPr lang="es-VE" sz="1800" dirty="0" smtClean="0"/>
+                        <a:t>editor de texto para desarrollo web</a:t>
+                      </a:r>
+                      <a:endParaRPr lang="es-VE" dirty="0"/>
+                    </a:p>
+                  </a:txBody>
+                  <a:tcPr/>
+                </a:tc>
+                <a:tc>
+                  <a:txBody>
+                    <a:bodyPr/>
+                    <a:lstStyle/>
+                    <a:p>
+                      <a:pPr marL="0" marR="0" indent="0" algn="l" defTabSz="914400" rtl="0" eaLnBrk="1" fontAlgn="auto" latinLnBrk="0" hangingPunct="1">
+                        <a:lnSpc>
+                          <a:spcPct val="100000"/>
+                        </a:lnSpc>
+                        <a:spcBef>
+                          <a:spcPts val="0"/>
+                        </a:spcBef>
+                        <a:spcAft>
+                          <a:spcPts val="0"/>
+                        </a:spcAft>
+                        <a:buClrTx/>
+                        <a:buSzTx/>
+                        <a:buFontTx/>
+                        <a:buNone/>
+                        <a:tabLst/>
+                        <a:defRPr/>
+                      </a:pPr>
+                      <a:r>
+                        <a:rPr lang="es-VE" dirty="0" smtClean="0"/>
+                        <a:t>Instalador</a:t>
+                      </a:r>
+                    </a:p>
+                  </a:txBody>
+                  <a:tcPr/>
+                </a:tc>
+              </a:tr>
+              <a:tr h="396165">
+                <a:tc>
+                  <a:txBody>
+                    <a:bodyPr/>
+                    <a:lstStyle/>
+                    <a:p>
+                      <a:r>
+                        <a:rPr lang="es-VE" dirty="0" err="1" smtClean="0"/>
+                        <a:t>Emmet</a:t>
+                      </a:r>
+                      <a:endParaRPr lang="es-VE" dirty="0"/>
+                    </a:p>
+                  </a:txBody>
+                  <a:tcPr/>
+                </a:tc>
+                <a:tc>
+                  <a:txBody>
+                    <a:bodyPr/>
+                    <a:lstStyle/>
+                    <a:p>
+                      <a:r>
+                        <a:rPr lang="es-VE" dirty="0" smtClean="0"/>
+                        <a:t>Extensión</a:t>
+                      </a:r>
+                      <a:r>
+                        <a:rPr lang="es-VE" baseline="0" dirty="0" smtClean="0"/>
+                        <a:t> recomendada para la edición de HTML y CSS (no obligatorio)</a:t>
+                      </a:r>
+                      <a:endParaRPr lang="es-VE" dirty="0"/>
+                    </a:p>
+                  </a:txBody>
+                  <a:tcPr/>
+                </a:tc>
+                <a:tc>
+                  <a:txBody>
+                    <a:bodyPr/>
+                    <a:lstStyle/>
+                    <a:p>
+                      <a:pPr marL="0" marR="0" indent="0" algn="l" defTabSz="914400" rtl="0" eaLnBrk="1" fontAlgn="auto" latinLnBrk="0" hangingPunct="1">
+                        <a:lnSpc>
+                          <a:spcPct val="100000"/>
+                        </a:lnSpc>
+                        <a:spcBef>
+                          <a:spcPts val="0"/>
+                        </a:spcBef>
+                        <a:spcAft>
+                          <a:spcPts val="0"/>
+                        </a:spcAft>
+                        <a:buClrTx/>
+                        <a:buSzTx/>
+                        <a:buFontTx/>
+                        <a:buNone/>
+                        <a:tabLst/>
+                        <a:defRPr/>
+                      </a:pPr>
+                      <a:endParaRPr lang="es-VE" dirty="0" smtClean="0"/>
+                    </a:p>
+                  </a:txBody>
+                  <a:tcPr/>
+                </a:tc>
+              </a:tr>
+            </a:tbl>
+          </a:graphicData>
+        </a:graphic>
+      </p:graphicFrame>
     </p:spTree>
     <p:extLst>
       <p:ext uri="{BB962C8B-B14F-4D97-AF65-F5344CB8AC3E}">
-        <p14:creationId xmlns:p14="http://schemas.microsoft.com/office/powerpoint/2010/main" xmlns="" val="2585810778"/>
+        <p14:creationId xmlns="" xmlns:p14="http://schemas.microsoft.com/office/powerpoint/2010/main" val="2585810778"/>
       </p:ext>
     </p:extLst>
   </p:cSld>
   <p:clrMapOvr>
     <a:masterClrMapping/>
   </p:clrMapOvr>
+  <p:timing>
+    <p:tnLst>
+      <p:par>
+        <p:cTn id="1" dur="indefinite" restart="never" nodeType="tmRoot"/>
+      </p:par>
+    </p:tnLst>
+  </p:timing>
+</p:sld>
+</file>
+
+<file path=ppt/slides/slide10.xml><?xml version="1.0" encoding="utf-8"?>
+<p:sld xmlns:a="http://schemas.openxmlformats.org/drawingml/2006/main" xmlns:r="http://schemas.openxmlformats.org/officeDocument/2006/relationships" xmlns:p="http://schemas.openxmlformats.org/presentationml/2006/main">
+  <p:cSld>
+    <p:spTree>
+      <p:nvGrpSpPr>
+        <p:cNvPr id="1" name=""/>
+        <p:cNvGrpSpPr/>
+        <p:nvPr/>
+      </p:nvGrpSpPr>
+      <p:grpSpPr>
+        <a:xfrm>
+          <a:off x="0" y="0"/>
+          <a:ext cx="0" cy="0"/>
+          <a:chOff x="0" y="0"/>
+          <a:chExt cx="0" cy="0"/>
+        </a:xfrm>
+      </p:grpSpPr>
+      <p:sp>
+        <p:nvSpPr>
+          <p:cNvPr id="2" name="1 Título"/>
+          <p:cNvSpPr>
+            <a:spLocks noGrp="1"/>
+          </p:cNvSpPr>
+          <p:nvPr>
+            <p:ph type="title"/>
+          </p:nvPr>
+        </p:nvSpPr>
+        <p:spPr/>
+        <p:txBody>
+          <a:bodyPr/>
+          <a:lstStyle/>
+          <a:p>
+            <a:r>
+              <a:rPr lang="es-VE" dirty="0" smtClean="0"/>
+              <a:t>Archivos resultantes</a:t>
+            </a:r>
+            <a:endParaRPr lang="es-VE" dirty="0"/>
+          </a:p>
+        </p:txBody>
+      </p:sp>
+      <p:graphicFrame>
+        <p:nvGraphicFramePr>
+          <p:cNvPr id="4" name="3 Tabla"/>
+          <p:cNvGraphicFramePr>
+            <a:graphicFrameLocks noGrp="1"/>
+          </p:cNvGraphicFramePr>
+          <p:nvPr/>
+        </p:nvGraphicFramePr>
+        <p:xfrm>
+          <a:off x="539552" y="1628800"/>
+          <a:ext cx="8136904" cy="2194560"/>
+        </p:xfrm>
+        <a:graphic>
+          <a:graphicData uri="http://schemas.openxmlformats.org/drawingml/2006/table">
+            <a:tbl>
+              <a:tblPr firstRow="1" bandRow="1">
+                <a:tableStyleId>{5C22544A-7EE6-4342-B048-85BDC9FD1C3A}</a:tableStyleId>
+              </a:tblPr>
+              <a:tblGrid>
+                <a:gridCol w="4068452"/>
+                <a:gridCol w="4068452"/>
+              </a:tblGrid>
+              <a:tr h="360040">
+                <a:tc>
+                  <a:txBody>
+                    <a:bodyPr/>
+                    <a:lstStyle/>
+                    <a:p>
+                      <a:endParaRPr lang="es-VE" dirty="0"/>
+                    </a:p>
+                  </a:txBody>
+                  <a:tcPr/>
+                </a:tc>
+                <a:tc>
+                  <a:txBody>
+                    <a:bodyPr/>
+                    <a:lstStyle/>
+                    <a:p>
+                      <a:endParaRPr lang="es-VE"/>
+                    </a:p>
+                  </a:txBody>
+                  <a:tcPr/>
+                </a:tc>
+              </a:tr>
+              <a:tr h="630070">
+                <a:tc>
+                  <a:txBody>
+                    <a:bodyPr/>
+                    <a:lstStyle/>
+                    <a:p>
+                      <a:r>
+                        <a:rPr lang="es-VE" dirty="0" err="1" smtClean="0"/>
+                        <a:t>bower.json</a:t>
+                      </a:r>
+                      <a:endParaRPr lang="es-VE" dirty="0"/>
+                    </a:p>
+                  </a:txBody>
+                  <a:tcPr/>
+                </a:tc>
+                <a:tc>
+                  <a:txBody>
+                    <a:bodyPr/>
+                    <a:lstStyle/>
+                    <a:p>
+                      <a:r>
+                        <a:rPr lang="es-VE" dirty="0" smtClean="0"/>
+                        <a:t>Indica las librerías</a:t>
+                      </a:r>
+                      <a:r>
+                        <a:rPr lang="es-VE" baseline="0" dirty="0" smtClean="0"/>
+                        <a:t> JS que se deben descargar (</a:t>
+                      </a:r>
+                      <a:r>
+                        <a:rPr lang="es-VE" baseline="0" dirty="0" err="1" smtClean="0"/>
+                        <a:t>Jquery</a:t>
+                      </a:r>
+                      <a:r>
+                        <a:rPr lang="es-VE" baseline="0" dirty="0" smtClean="0"/>
+                        <a:t>, </a:t>
+                      </a:r>
+                      <a:r>
+                        <a:rPr lang="es-VE" baseline="0" dirty="0" err="1" smtClean="0"/>
+                        <a:t>bootstrap</a:t>
+                      </a:r>
+                      <a:r>
+                        <a:rPr lang="es-VE" baseline="0" dirty="0" smtClean="0"/>
+                        <a:t>, </a:t>
+                      </a:r>
+                      <a:r>
+                        <a:rPr lang="es-VE" baseline="0" dirty="0" err="1" smtClean="0"/>
+                        <a:t>etc</a:t>
+                      </a:r>
+                      <a:r>
+                        <a:rPr lang="es-VE" baseline="0" dirty="0" smtClean="0"/>
+                        <a:t>)</a:t>
+                      </a:r>
+                    </a:p>
+                    <a:p>
+                      <a:r>
+                        <a:rPr lang="es-VE" baseline="0" dirty="0" smtClean="0"/>
+                        <a:t>TIP: Es parecido a POM de </a:t>
+                      </a:r>
+                      <a:r>
+                        <a:rPr lang="es-VE" baseline="0" dirty="0" err="1" smtClean="0"/>
+                        <a:t>Maven</a:t>
+                      </a:r>
+                      <a:r>
+                        <a:rPr lang="es-VE" baseline="0" dirty="0" smtClean="0"/>
+                        <a:t>.</a:t>
+                      </a:r>
+                      <a:endParaRPr lang="es-VE" dirty="0"/>
+                    </a:p>
+                  </a:txBody>
+                  <a:tcPr/>
+                </a:tc>
+              </a:tr>
+              <a:tr h="723782">
+                <a:tc>
+                  <a:txBody>
+                    <a:bodyPr/>
+                    <a:lstStyle/>
+                    <a:p>
+                      <a:r>
+                        <a:rPr lang="es-VE" dirty="0" err="1" smtClean="0"/>
+                        <a:t>package.json</a:t>
+                      </a:r>
+                      <a:endParaRPr lang="es-VE" dirty="0"/>
+                    </a:p>
+                  </a:txBody>
+                  <a:tcPr/>
+                </a:tc>
+                <a:tc>
+                  <a:txBody>
+                    <a:bodyPr/>
+                    <a:lstStyle/>
+                    <a:p>
+                      <a:r>
+                        <a:rPr lang="es-VE" dirty="0" smtClean="0"/>
+                        <a:t>Indica</a:t>
+                      </a:r>
+                      <a:r>
+                        <a:rPr lang="es-VE" baseline="0" dirty="0" smtClean="0"/>
+                        <a:t> los PLUGINS de GRUNT que se deben descargar (</a:t>
+                      </a:r>
+                      <a:r>
+                        <a:rPr lang="es-VE" baseline="0" dirty="0" err="1" smtClean="0"/>
+                        <a:t>browserify</a:t>
+                      </a:r>
+                      <a:r>
+                        <a:rPr lang="es-VE" baseline="0" dirty="0" smtClean="0"/>
+                        <a:t>, </a:t>
+                      </a:r>
+                      <a:r>
+                        <a:rPr lang="es-VE" baseline="0" dirty="0" err="1" smtClean="0"/>
+                        <a:t>jshint</a:t>
+                      </a:r>
+                      <a:r>
+                        <a:rPr lang="es-VE" baseline="0" dirty="0" smtClean="0"/>
+                        <a:t>, </a:t>
+                      </a:r>
+                      <a:r>
+                        <a:rPr lang="es-VE" baseline="0" dirty="0" err="1" smtClean="0"/>
+                        <a:t>uglify</a:t>
+                      </a:r>
+                      <a:r>
+                        <a:rPr lang="es-VE" baseline="0" dirty="0" smtClean="0"/>
+                        <a:t>)</a:t>
+                      </a:r>
+                      <a:endParaRPr lang="es-VE" dirty="0"/>
+                    </a:p>
+                  </a:txBody>
+                  <a:tcPr/>
+                </a:tc>
+              </a:tr>
+            </a:tbl>
+          </a:graphicData>
+        </a:graphic>
+      </p:graphicFrame>
+    </p:spTree>
+  </p:cSld>
+  <p:clrMapOvr>
+    <a:masterClrMapping/>
+  </p:clrMapOvr>
+</p:sld>
+</file>
+
+<file path=ppt/slides/slide11.xml><?xml version="1.0" encoding="utf-8"?>
+<p:sld xmlns:a="http://schemas.openxmlformats.org/drawingml/2006/main" xmlns:r="http://schemas.openxmlformats.org/officeDocument/2006/relationships" xmlns:p="http://schemas.openxmlformats.org/presentationml/2006/main">
+  <p:cSld>
+    <p:spTree>
+      <p:nvGrpSpPr>
+        <p:cNvPr id="1" name=""/>
+        <p:cNvGrpSpPr/>
+        <p:nvPr/>
+      </p:nvGrpSpPr>
+      <p:grpSpPr>
+        <a:xfrm>
+          <a:off x="0" y="0"/>
+          <a:ext cx="0" cy="0"/>
+          <a:chOff x="0" y="0"/>
+          <a:chExt cx="0" cy="0"/>
+        </a:xfrm>
+      </p:grpSpPr>
+      <p:sp>
+        <p:nvSpPr>
+          <p:cNvPr id="2" name="1 Título"/>
+          <p:cNvSpPr>
+            <a:spLocks noGrp="1"/>
+          </p:cNvSpPr>
+          <p:nvPr>
+            <p:ph type="title"/>
+          </p:nvPr>
+        </p:nvSpPr>
+        <p:spPr/>
+        <p:txBody>
+          <a:bodyPr/>
+          <a:lstStyle/>
+          <a:p>
+            <a:r>
+              <a:rPr lang="es-VE" dirty="0" err="1" smtClean="0"/>
+              <a:t>DEPLOYdel</a:t>
+            </a:r>
+            <a:r>
+              <a:rPr lang="es-VE" dirty="0" smtClean="0"/>
+              <a:t> SITE con GRUNT</a:t>
+            </a:r>
+            <a:endParaRPr lang="es-VE" dirty="0"/>
+          </a:p>
+        </p:txBody>
+      </p:sp>
+      <p:sp>
+        <p:nvSpPr>
+          <p:cNvPr id="3" name="2 Marcador de contenido"/>
+          <p:cNvSpPr>
+            <a:spLocks noGrp="1"/>
+          </p:cNvSpPr>
+          <p:nvPr>
+            <p:ph idx="1"/>
+          </p:nvPr>
+        </p:nvSpPr>
+        <p:spPr/>
+        <p:txBody>
+          <a:bodyPr/>
+          <a:lstStyle/>
+          <a:p>
+            <a:r>
+              <a:rPr lang="es-VE" dirty="0" smtClean="0"/>
+              <a:t>Crear y Editar el </a:t>
+            </a:r>
+            <a:r>
+              <a:rPr lang="es-VE" dirty="0" smtClean="0"/>
+              <a:t>archivo </a:t>
+            </a:r>
+            <a:r>
+              <a:rPr lang="es-VE" dirty="0" smtClean="0"/>
+              <a:t>Gruntfile.js, ver documentación de GRUNT.</a:t>
+            </a:r>
+          </a:p>
+          <a:p>
+            <a:r>
+              <a:rPr lang="es-VE" dirty="0" smtClean="0"/>
+              <a:t>Ejecutar en el directorio </a:t>
+            </a:r>
+            <a:r>
+              <a:rPr lang="es-VE" dirty="0" err="1" smtClean="0"/>
+              <a:t>raiz</a:t>
+            </a:r>
+            <a:r>
+              <a:rPr lang="es-VE" dirty="0" smtClean="0"/>
+              <a:t> del proyecto:</a:t>
+            </a:r>
+          </a:p>
+          <a:p>
+            <a:pPr lvl="1"/>
+            <a:r>
+              <a:rPr lang="es-VE" dirty="0" err="1" smtClean="0"/>
+              <a:t>grunt</a:t>
+            </a:r>
+            <a:r>
+              <a:rPr lang="es-VE" dirty="0" smtClean="0"/>
+              <a:t> </a:t>
+            </a:r>
+            <a:r>
+              <a:rPr lang="es-VE" dirty="0" smtClean="0"/>
+              <a:t>–v</a:t>
+            </a:r>
+          </a:p>
+          <a:p>
+            <a:pPr>
+              <a:buNone/>
+            </a:pPr>
+            <a:endParaRPr lang="es-VE" dirty="0"/>
+          </a:p>
+        </p:txBody>
+      </p:sp>
+    </p:spTree>
+  </p:cSld>
+  <p:clrMapOvr>
+    <a:masterClrMapping/>
+  </p:clrMapOvr>
+</p:sld>
+</file>
+
+<file path=ppt/slides/slide12.xml><?xml version="1.0" encoding="utf-8"?>
+<p:sld xmlns:a="http://schemas.openxmlformats.org/drawingml/2006/main" xmlns:r="http://schemas.openxmlformats.org/officeDocument/2006/relationships" xmlns:p="http://schemas.openxmlformats.org/presentationml/2006/main">
+  <p:cSld>
+    <p:spTree>
+      <p:nvGrpSpPr>
+        <p:cNvPr id="1" name=""/>
+        <p:cNvGrpSpPr/>
+        <p:nvPr/>
+      </p:nvGrpSpPr>
+      <p:grpSpPr>
+        <a:xfrm>
+          <a:off x="0" y="0"/>
+          <a:ext cx="0" cy="0"/>
+          <a:chOff x="0" y="0"/>
+          <a:chExt cx="0" cy="0"/>
+        </a:xfrm>
+      </p:grpSpPr>
+      <p:sp>
+        <p:nvSpPr>
+          <p:cNvPr id="2" name="1 Título"/>
+          <p:cNvSpPr>
+            <a:spLocks noGrp="1"/>
+          </p:cNvSpPr>
+          <p:nvPr>
+            <p:ph type="title"/>
+          </p:nvPr>
+        </p:nvSpPr>
+        <p:spPr/>
+        <p:txBody>
+          <a:bodyPr/>
+          <a:lstStyle/>
+          <a:p>
+            <a:r>
+              <a:rPr lang="es-VE" dirty="0" smtClean="0"/>
+              <a:t>Páginas de Referencia</a:t>
+            </a:r>
+            <a:endParaRPr lang="es-VE" dirty="0"/>
+          </a:p>
+        </p:txBody>
+      </p:sp>
+      <p:sp>
+        <p:nvSpPr>
+          <p:cNvPr id="3" name="2 Marcador de contenido"/>
+          <p:cNvSpPr>
+            <a:spLocks noGrp="1"/>
+          </p:cNvSpPr>
+          <p:nvPr>
+            <p:ph idx="1"/>
+          </p:nvPr>
+        </p:nvSpPr>
+        <p:spPr/>
+        <p:txBody>
+          <a:bodyPr/>
+          <a:lstStyle/>
+          <a:p>
+            <a:r>
+              <a:rPr lang="es-VE" dirty="0">
+                <a:hlinkClick r:id="rId2"/>
+              </a:rPr>
+              <a:t>http://caniuse.com</a:t>
+            </a:r>
+            <a:r>
+              <a:rPr lang="es-VE" dirty="0" smtClean="0">
+                <a:hlinkClick r:id="rId2"/>
+              </a:rPr>
+              <a:t>/</a:t>
+            </a:r>
+            <a:r>
+              <a:rPr lang="es-VE" dirty="0" smtClean="0"/>
+              <a:t> - Indica compatibilidad HTML y CSS</a:t>
+            </a:r>
+          </a:p>
+          <a:p>
+            <a:endParaRPr lang="es-VE" dirty="0"/>
+          </a:p>
+        </p:txBody>
+      </p:sp>
+    </p:spTree>
+    <p:extLst>
+      <p:ext uri="{BB962C8B-B14F-4D97-AF65-F5344CB8AC3E}">
+        <p14:creationId xmlns="" xmlns:p14="http://schemas.microsoft.com/office/powerpoint/2010/main" val="2061773745"/>
+      </p:ext>
+    </p:extLst>
+  </p:cSld>
+  <p:clrMapOvr>
+    <a:masterClrMapping/>
+  </p:clrMapOvr>
+  <p:timing>
+    <p:tnLst>
+      <p:par>
+        <p:cTn id="1" dur="indefinite" restart="never" nodeType="tmRoot"/>
+      </p:par>
+    </p:tnLst>
+  </p:timing>
 </p:sld>
 </file>
 
@@ -3550,9 +4749,16 @@
             <p:ph idx="1"/>
           </p:nvPr>
         </p:nvSpPr>
-        <p:spPr/>
-        <p:txBody>
-          <a:bodyPr/>
+        <p:spPr>
+          <a:xfrm>
+            <a:off x="457200" y="1600200"/>
+            <a:ext cx="8229600" cy="1540768"/>
+          </a:xfrm>
+        </p:spPr>
+        <p:txBody>
+          <a:bodyPr>
+            <a:normAutofit/>
+          </a:bodyPr>
           <a:lstStyle/>
           <a:p>
             <a:pPr marL="285750" indent="-285750"/>
@@ -3571,9 +4777,12 @@
           <a:p>
             <a:pPr marL="285750" indent="-285750"/>
             <a:r>
-              <a:rPr lang="es-VE" dirty="0"/>
+              <a:rPr lang="es-VE" dirty="0" smtClean="0"/>
               <a:t>Brackets.1.4.Extract.msi</a:t>
             </a:r>
+          </a:p>
+          <a:p>
+            <a:pPr marL="285750" indent="-285750"/>
             <a:endParaRPr lang="es-VE" dirty="0" smtClean="0"/>
           </a:p>
           <a:p>
@@ -3584,19 +4793,410 @@
           </a:p>
           <a:p>
             <a:endParaRPr lang="es-VE" dirty="0"/>
+          </a:p>
+        </p:txBody>
+      </p:sp>
+      <p:sp>
+        <p:nvSpPr>
+          <p:cNvPr id="4" name="1 Título"/>
+          <p:cNvSpPr txBox="1">
+            <a:spLocks/>
+          </p:cNvSpPr>
+          <p:nvPr/>
+        </p:nvSpPr>
+        <p:spPr>
+          <a:xfrm>
+            <a:off x="467544" y="3014464"/>
+            <a:ext cx="8229600" cy="990600"/>
+          </a:xfrm>
+          <a:prstGeom prst="rect">
+            <a:avLst/>
+          </a:prstGeom>
+        </p:spPr>
+        <p:txBody>
+          <a:bodyPr vert="horz" lIns="91440" tIns="45720" rIns="91440" bIns="45720" rtlCol="0" anchor="ctr">
+            <a:normAutofit/>
+          </a:bodyPr>
+          <a:lstStyle/>
+          <a:p>
+            <a:pPr marL="0" marR="0" lvl="0" indent="0" algn="l" defTabSz="914400" rtl="0" eaLnBrk="1" fontAlgn="auto" latinLnBrk="0" hangingPunct="1">
+              <a:lnSpc>
+                <a:spcPct val="100000"/>
+              </a:lnSpc>
+              <a:spcBef>
+                <a:spcPct val="0"/>
+              </a:spcBef>
+              <a:spcAft>
+                <a:spcPts val="0"/>
+              </a:spcAft>
+              <a:buClrTx/>
+              <a:buSzTx/>
+              <a:buFontTx/>
+              <a:buNone/>
+              <a:tabLst/>
+              <a:defRPr/>
+            </a:pPr>
+            <a:r>
+              <a:rPr kumimoji="0" lang="es-VE" sz="4000" b="0" i="0" u="none" strike="noStrike" kern="1200" cap="none" spc="-100" normalizeH="0" baseline="0" noProof="0" dirty="0" smtClean="0">
+                <a:ln>
+                  <a:noFill/>
+                </a:ln>
+                <a:solidFill>
+                  <a:schemeClr val="tx2"/>
+                </a:solidFill>
+                <a:effectLst/>
+                <a:uLnTx/>
+                <a:uFillTx/>
+                <a:latin typeface="+mj-lt"/>
+                <a:ea typeface="+mj-ea"/>
+                <a:cs typeface="+mj-cs"/>
+              </a:rPr>
+              <a:t>Enlaces instructivos</a:t>
+            </a:r>
+            <a:endParaRPr kumimoji="0" lang="es-VE" sz="4000" b="0" i="0" u="none" strike="noStrike" kern="1200" cap="none" spc="-100" normalizeH="0" baseline="0" noProof="0" dirty="0">
+              <a:ln>
+                <a:noFill/>
+              </a:ln>
+              <a:solidFill>
+                <a:schemeClr val="tx2"/>
+              </a:solidFill>
+              <a:effectLst/>
+              <a:uLnTx/>
+              <a:uFillTx/>
+              <a:latin typeface="+mj-lt"/>
+              <a:ea typeface="+mj-ea"/>
+              <a:cs typeface="+mj-cs"/>
+            </a:endParaRPr>
+          </a:p>
+        </p:txBody>
+      </p:sp>
+      <p:sp>
+        <p:nvSpPr>
+          <p:cNvPr id="5" name="2 Marcador de contenido"/>
+          <p:cNvSpPr txBox="1">
+            <a:spLocks/>
+          </p:cNvSpPr>
+          <p:nvPr/>
+        </p:nvSpPr>
+        <p:spPr>
+          <a:xfrm>
+            <a:off x="467544" y="4149080"/>
+            <a:ext cx="8229600" cy="2448272"/>
+          </a:xfrm>
+          <a:prstGeom prst="rect">
+            <a:avLst/>
+          </a:prstGeom>
+        </p:spPr>
+        <p:txBody>
+          <a:bodyPr vert="horz" lIns="91440" tIns="45720" rIns="91440" bIns="45720" rtlCol="0">
+            <a:normAutofit/>
+          </a:bodyPr>
+          <a:lstStyle/>
+          <a:p>
+            <a:pPr marL="285750" marR="0" lvl="0" indent="-285750" algn="l" defTabSz="914400" rtl="0" eaLnBrk="1" fontAlgn="auto" latinLnBrk="0" hangingPunct="1">
+              <a:lnSpc>
+                <a:spcPct val="100000"/>
+              </a:lnSpc>
+              <a:spcBef>
+                <a:spcPct val="20000"/>
+              </a:spcBef>
+              <a:spcAft>
+                <a:spcPts val="0"/>
+              </a:spcAft>
+              <a:buClr>
+                <a:schemeClr val="accent1"/>
+              </a:buClr>
+              <a:buSzPct val="85000"/>
+              <a:buFont typeface="Arial" pitchFamily="34" charset="0"/>
+              <a:buChar char="•"/>
+              <a:tabLst/>
+              <a:defRPr/>
+            </a:pPr>
+            <a:r>
+              <a:rPr kumimoji="0" lang="es-VE" sz="2400" b="0" i="0" u="none" strike="noStrike" kern="1200" cap="none" spc="0" normalizeH="0" baseline="0" noProof="0" dirty="0" smtClean="0">
+                <a:ln>
+                  <a:noFill/>
+                </a:ln>
+                <a:solidFill>
+                  <a:schemeClr val="tx1"/>
+                </a:solidFill>
+                <a:effectLst/>
+                <a:uLnTx/>
+                <a:uFillTx/>
+                <a:latin typeface="+mn-lt"/>
+                <a:ea typeface="+mn-ea"/>
+                <a:cs typeface="+mn-cs"/>
+                <a:hlinkClick r:id="rId2"/>
+              </a:rPr>
+              <a:t>http://blog.escuelaweb.net/manejar-paquetes-cliente-con-bower/  </a:t>
+            </a:r>
+            <a:r>
+              <a:rPr kumimoji="0" lang="es-VE" sz="3600" b="0" i="0" u="none" strike="noStrike" kern="1200" cap="none" spc="0" normalizeH="0" baseline="0" noProof="0" dirty="0" smtClean="0">
+                <a:ln>
+                  <a:noFill/>
+                </a:ln>
+                <a:solidFill>
+                  <a:schemeClr val="tx1"/>
+                </a:solidFill>
+                <a:effectLst/>
+                <a:uLnTx/>
+                <a:uFillTx/>
+                <a:latin typeface="+mn-lt"/>
+                <a:ea typeface="+mn-ea"/>
+                <a:cs typeface="+mn-cs"/>
+              </a:rPr>
+              <a:t>- </a:t>
+            </a:r>
+            <a:r>
+              <a:rPr kumimoji="0" lang="es-VE" sz="2400" b="0" i="0" u="none" strike="noStrike" kern="1200" cap="none" spc="0" normalizeH="0" baseline="0" noProof="0" dirty="0" smtClean="0">
+                <a:ln>
+                  <a:noFill/>
+                </a:ln>
+                <a:solidFill>
+                  <a:schemeClr val="tx1"/>
+                </a:solidFill>
+                <a:effectLst/>
+                <a:uLnTx/>
+                <a:uFillTx/>
+                <a:latin typeface="+mn-lt"/>
+                <a:ea typeface="+mn-ea"/>
+                <a:cs typeface="+mn-cs"/>
+              </a:rPr>
+              <a:t>Tutorial uso de BOWER</a:t>
+            </a:r>
+          </a:p>
+          <a:p>
+            <a:pPr marL="285750" marR="0" lvl="0" indent="-285750" algn="l" defTabSz="914400" rtl="0" eaLnBrk="1" fontAlgn="auto" latinLnBrk="0" hangingPunct="1">
+              <a:lnSpc>
+                <a:spcPct val="100000"/>
+              </a:lnSpc>
+              <a:spcBef>
+                <a:spcPct val="20000"/>
+              </a:spcBef>
+              <a:spcAft>
+                <a:spcPts val="0"/>
+              </a:spcAft>
+              <a:buClr>
+                <a:schemeClr val="accent1"/>
+              </a:buClr>
+              <a:buSzPct val="85000"/>
+              <a:buFont typeface="Arial" pitchFamily="34" charset="0"/>
+              <a:buChar char="•"/>
+              <a:tabLst/>
+              <a:defRPr/>
+            </a:pPr>
+            <a:r>
+              <a:rPr kumimoji="0" lang="es-VE" sz="1600" b="0" i="0" u="none" strike="noStrike" kern="1200" cap="none" spc="0" normalizeH="0" baseline="0" noProof="0" dirty="0" smtClean="0">
+                <a:ln>
+                  <a:noFill/>
+                </a:ln>
+                <a:solidFill>
+                  <a:schemeClr val="tx1"/>
+                </a:solidFill>
+                <a:effectLst/>
+                <a:uLnTx/>
+                <a:uFillTx/>
+                <a:latin typeface="+mn-lt"/>
+                <a:ea typeface="+mn-ea"/>
+                <a:cs typeface="+mn-cs"/>
+                <a:hlinkClick r:id="rId3"/>
+              </a:rPr>
+              <a:t>http://brackets.io/</a:t>
+            </a:r>
+            <a:r>
+              <a:rPr kumimoji="0" lang="es-VE" sz="1600" b="0" i="0" u="none" strike="noStrike" kern="1200" cap="none" spc="0" normalizeH="0" baseline="0" noProof="0" dirty="0" smtClean="0">
+                <a:ln>
+                  <a:noFill/>
+                </a:ln>
+                <a:solidFill>
+                  <a:schemeClr val="tx1"/>
+                </a:solidFill>
+                <a:effectLst/>
+                <a:uLnTx/>
+                <a:uFillTx/>
+                <a:latin typeface="+mn-lt"/>
+                <a:ea typeface="+mn-ea"/>
+                <a:cs typeface="+mn-cs"/>
+              </a:rPr>
+              <a:t> </a:t>
+            </a:r>
+            <a:r>
+              <a:rPr kumimoji="0" lang="es-VE" sz="2400" b="0" i="0" u="none" strike="noStrike" kern="1200" cap="none" spc="0" normalizeH="0" baseline="0" noProof="0" dirty="0" smtClean="0">
+                <a:ln>
+                  <a:noFill/>
+                </a:ln>
+                <a:solidFill>
+                  <a:schemeClr val="tx1"/>
+                </a:solidFill>
+                <a:effectLst/>
+                <a:uLnTx/>
+                <a:uFillTx/>
+                <a:latin typeface="+mn-lt"/>
+                <a:ea typeface="+mn-ea"/>
+                <a:cs typeface="+mn-cs"/>
+              </a:rPr>
+              <a:t>- Editor Texto para desarrollo web</a:t>
+            </a:r>
+          </a:p>
+          <a:p>
+            <a:pPr marL="285750" marR="0" lvl="0" indent="-285750" algn="l" defTabSz="914400" rtl="0" eaLnBrk="1" fontAlgn="auto" latinLnBrk="0" hangingPunct="1">
+              <a:lnSpc>
+                <a:spcPct val="100000"/>
+              </a:lnSpc>
+              <a:spcBef>
+                <a:spcPct val="20000"/>
+              </a:spcBef>
+              <a:spcAft>
+                <a:spcPts val="0"/>
+              </a:spcAft>
+              <a:buClr>
+                <a:schemeClr val="accent1"/>
+              </a:buClr>
+              <a:buSzPct val="85000"/>
+              <a:buFont typeface="Arial" pitchFamily="34" charset="0"/>
+              <a:buChar char="•"/>
+              <a:tabLst/>
+              <a:defRPr/>
+            </a:pPr>
+            <a:endParaRPr kumimoji="0" lang="es-VE" sz="2400" b="0" i="0" u="none" strike="noStrike" kern="1200" cap="none" spc="0" normalizeH="0" baseline="0" noProof="0" dirty="0" smtClean="0">
+              <a:ln>
+                <a:noFill/>
+              </a:ln>
+              <a:solidFill>
+                <a:schemeClr val="tx1"/>
+              </a:solidFill>
+              <a:effectLst/>
+              <a:uLnTx/>
+              <a:uFillTx/>
+              <a:latin typeface="+mn-lt"/>
+              <a:ea typeface="+mn-ea"/>
+              <a:cs typeface="+mn-cs"/>
+            </a:endParaRPr>
+          </a:p>
+          <a:p>
+            <a:pPr marL="285750" marR="0" lvl="0" indent="-285750" algn="l" defTabSz="914400" rtl="0" eaLnBrk="1" fontAlgn="auto" latinLnBrk="0" hangingPunct="1">
+              <a:lnSpc>
+                <a:spcPct val="100000"/>
+              </a:lnSpc>
+              <a:spcBef>
+                <a:spcPct val="20000"/>
+              </a:spcBef>
+              <a:spcAft>
+                <a:spcPts val="0"/>
+              </a:spcAft>
+              <a:buClr>
+                <a:schemeClr val="accent1"/>
+              </a:buClr>
+              <a:buSzPct val="85000"/>
+              <a:buFont typeface="Arial" pitchFamily="34" charset="0"/>
+              <a:buChar char="•"/>
+              <a:tabLst/>
+              <a:defRPr/>
+            </a:pPr>
+            <a:endParaRPr kumimoji="0" lang="es-VE" sz="2400" b="0" i="0" u="none" strike="noStrike" kern="1200" cap="none" spc="0" normalizeH="0" baseline="0" noProof="0" dirty="0" smtClean="0">
+              <a:ln>
+                <a:noFill/>
+              </a:ln>
+              <a:solidFill>
+                <a:schemeClr val="tx1"/>
+              </a:solidFill>
+              <a:effectLst/>
+              <a:uLnTx/>
+              <a:uFillTx/>
+              <a:latin typeface="+mn-lt"/>
+              <a:ea typeface="+mn-ea"/>
+              <a:cs typeface="+mn-cs"/>
+            </a:endParaRPr>
+          </a:p>
+          <a:p>
+            <a:pPr marL="0" marR="0" lvl="0" indent="0" algn="l" defTabSz="914400" rtl="0" eaLnBrk="1" fontAlgn="auto" latinLnBrk="0" hangingPunct="1">
+              <a:lnSpc>
+                <a:spcPct val="100000"/>
+              </a:lnSpc>
+              <a:spcBef>
+                <a:spcPct val="20000"/>
+              </a:spcBef>
+              <a:spcAft>
+                <a:spcPts val="0"/>
+              </a:spcAft>
+              <a:buClr>
+                <a:schemeClr val="accent1"/>
+              </a:buClr>
+              <a:buSzPct val="85000"/>
+              <a:buFont typeface="Arial" pitchFamily="34" charset="0"/>
+              <a:buNone/>
+              <a:tabLst/>
+              <a:defRPr/>
+            </a:pPr>
+            <a:endParaRPr kumimoji="0" lang="es-VE" sz="2400" b="0" i="0" u="none" strike="noStrike" kern="1200" cap="none" spc="0" normalizeH="0" baseline="0" noProof="0" dirty="0" smtClean="0">
+              <a:ln>
+                <a:noFill/>
+              </a:ln>
+              <a:solidFill>
+                <a:schemeClr val="tx1"/>
+              </a:solidFill>
+              <a:effectLst/>
+              <a:uLnTx/>
+              <a:uFillTx/>
+              <a:latin typeface="+mn-lt"/>
+              <a:ea typeface="+mn-ea"/>
+              <a:cs typeface="+mn-cs"/>
+            </a:endParaRPr>
+          </a:p>
+          <a:p>
+            <a:pPr marL="182880" marR="0" lvl="0" indent="-182880" algn="l" defTabSz="914400" rtl="0" eaLnBrk="1" fontAlgn="auto" latinLnBrk="0" hangingPunct="1">
+              <a:lnSpc>
+                <a:spcPct val="100000"/>
+              </a:lnSpc>
+              <a:spcBef>
+                <a:spcPct val="20000"/>
+              </a:spcBef>
+              <a:spcAft>
+                <a:spcPts val="0"/>
+              </a:spcAft>
+              <a:buClr>
+                <a:schemeClr val="accent1"/>
+              </a:buClr>
+              <a:buSzPct val="85000"/>
+              <a:buFont typeface="Arial" pitchFamily="34" charset="0"/>
+              <a:buChar char="•"/>
+              <a:tabLst/>
+              <a:defRPr/>
+            </a:pPr>
+            <a:endParaRPr kumimoji="0" lang="es-VE" sz="2400" b="0" i="0" u="none" strike="noStrike" kern="1200" cap="none" spc="0" normalizeH="0" baseline="0" noProof="0" dirty="0">
+              <a:ln>
+                <a:noFill/>
+              </a:ln>
+              <a:solidFill>
+                <a:schemeClr val="tx1"/>
+              </a:solidFill>
+              <a:effectLst/>
+              <a:uLnTx/>
+              <a:uFillTx/>
+              <a:latin typeface="+mn-lt"/>
+              <a:ea typeface="+mn-ea"/>
+              <a:cs typeface="+mn-cs"/>
+            </a:endParaRPr>
           </a:p>
         </p:txBody>
       </p:sp>
     </p:spTree>
     <p:extLst>
       <p:ext uri="{BB962C8B-B14F-4D97-AF65-F5344CB8AC3E}">
-        <p14:creationId xmlns:p14="http://schemas.microsoft.com/office/powerpoint/2010/main" xmlns="" val="1503682371"/>
+        <p14:creationId xmlns="" xmlns:p14="http://schemas.microsoft.com/office/powerpoint/2010/main" val="1503682371"/>
       </p:ext>
     </p:extLst>
   </p:cSld>
   <p:clrMapOvr>
     <a:masterClrMapping/>
   </p:clrMapOvr>
+  <p:timing>
+    <p:tnLst>
+      <p:par>
+        <p:cTn id="1" dur="indefinite" restart="never" nodeType="tmRoot"/>
+      </p:par>
+    </p:tnLst>
+  </p:timing>
 </p:sld>
 </file>
 
@@ -3652,32 +5252,67 @@
         </p:nvSpPr>
         <p:spPr/>
         <p:txBody>
-          <a:bodyPr/>
+          <a:bodyPr>
+            <a:normAutofit/>
+          </a:bodyPr>
           <a:lstStyle/>
           <a:p>
             <a:pPr marL="285750" indent="-285750"/>
             <a:r>
-              <a:rPr lang="es-VE" sz="1600" dirty="0">
+              <a:rPr lang="es-VE" sz="1600" b="1" dirty="0" smtClean="0"/>
+              <a:t>Instalar </a:t>
+            </a:r>
+            <a:r>
+              <a:rPr lang="es-VE" sz="1600" b="1" dirty="0" smtClean="0"/>
+              <a:t>NODE </a:t>
+            </a:r>
+            <a:r>
+              <a:rPr lang="es-VE" sz="1600" dirty="0" smtClean="0"/>
+              <a:t>- </a:t>
+            </a:r>
+            <a:r>
+              <a:rPr lang="es-VE" sz="1600" dirty="0" smtClean="0">
                 <a:hlinkClick r:id="rId2"/>
               </a:rPr>
-              <a:t>http://blog.escuelaweb.net/manejar-paquetes-cliente-con-bower/ </a:t>
-            </a:r>
-            <a:r>
-              <a:rPr lang="es-VE" sz="1600" dirty="0"/>
+              <a:t>https</a:t>
+            </a:r>
+            <a:r>
+              <a:rPr lang="es-VE" sz="1600" dirty="0" smtClean="0">
+                <a:hlinkClick r:id="rId2"/>
+              </a:rPr>
+              <a:t>://nodejs.org/en/</a:t>
+            </a:r>
+            <a:r>
+              <a:rPr lang="es-VE" sz="1600" dirty="0" smtClean="0">
+                <a:hlinkClick r:id="rId3"/>
+              </a:rPr>
               <a:t> </a:t>
             </a:r>
-            <a:r>
-              <a:rPr lang="es-VE" sz="2400" dirty="0"/>
-              <a:t>- Tutorial uso de BOWER</a:t>
-            </a:r>
+            <a:endParaRPr lang="es-VE" sz="1600" dirty="0" smtClean="0">
+              <a:hlinkClick r:id="rId3"/>
+            </a:endParaRPr>
           </a:p>
           <a:p>
             <a:pPr marL="285750" indent="-285750"/>
+            <a:r>
+              <a:rPr lang="es-VE" sz="1600" b="1" dirty="0" smtClean="0"/>
+              <a:t>Instalar MSGIT </a:t>
+            </a:r>
+            <a:r>
+              <a:rPr lang="es-VE" sz="1600" dirty="0" smtClean="0"/>
+              <a:t>- </a:t>
+            </a:r>
+            <a:r>
+              <a:rPr lang="es-VE" sz="1600" dirty="0" smtClean="0">
+                <a:hlinkClick r:id="rId3"/>
+              </a:rPr>
+              <a:t>https</a:t>
+            </a:r>
             <a:r>
               <a:rPr lang="es-VE" sz="1600" dirty="0">
                 <a:hlinkClick r:id="rId3"/>
               </a:rPr>
-              <a:t>https://</a:t>
+              <a:t>://</a:t>
             </a:r>
             <a:r>
               <a:rPr lang="es-VE" sz="1600" dirty="0" smtClean="0">
@@ -3685,87 +5320,232 @@
               </a:rPr>
               <a:t>github.com/git-for-windows/git/releases/tag/v2.5.3.windows.1</a:t>
             </a:r>
+            <a:endParaRPr lang="es-VE" sz="2400" dirty="0" smtClean="0"/>
+          </a:p>
+          <a:p>
+            <a:pPr marL="285750" indent="-285750"/>
+            <a:r>
+              <a:rPr lang="es-VE" sz="1600" b="1" dirty="0" smtClean="0"/>
+              <a:t>Instalar </a:t>
+            </a:r>
+            <a:r>
+              <a:rPr lang="es-VE" sz="1600" b="1" dirty="0" smtClean="0"/>
+              <a:t>BOWER </a:t>
+            </a:r>
             <a:r>
               <a:rPr lang="es-VE" sz="1600" dirty="0" smtClean="0"/>
-              <a:t>  </a:t>
-            </a:r>
-            <a:r>
-              <a:rPr lang="es-VE" sz="2400" dirty="0"/>
-              <a:t>- Instalar MSGIT</a:t>
-            </a:r>
-          </a:p>
-          <a:p>
-            <a:pPr marL="285750" indent="-285750"/>
-            <a:r>
-              <a:rPr lang="es-VE" sz="1600" dirty="0">
-                <a:hlinkClick r:id="rId2"/>
-              </a:rPr>
-              <a:t>https://nodejs.org/en/</a:t>
-            </a:r>
-            <a:r>
-              <a:rPr lang="es-VE" sz="1600" dirty="0"/>
+              <a:t>- </a:t>
+            </a:r>
+            <a:r>
+              <a:rPr lang="es-VE" sz="1600" i="1" dirty="0" err="1" smtClean="0"/>
+              <a:t>npm</a:t>
+            </a:r>
+            <a:r>
+              <a:rPr lang="es-VE" sz="1600" i="1" dirty="0" smtClean="0"/>
               <a:t> </a:t>
             </a:r>
             <a:r>
-              <a:rPr lang="es-VE" sz="2400" dirty="0"/>
-              <a:t>- Instalar NODE</a:t>
-            </a:r>
-          </a:p>
-          <a:p>
-            <a:pPr marL="285750" indent="-285750"/>
-            <a:r>
               <a:rPr lang="es-VE" sz="1600" i="1" dirty="0" err="1"/>
-              <a:t>npm</a:t>
+              <a:t>install</a:t>
+            </a:r>
+            <a:r>
+              <a:rPr lang="es-VE" sz="1600" i="1" dirty="0"/>
+              <a:t> -g </a:t>
+            </a:r>
+            <a:r>
+              <a:rPr lang="es-VE" sz="1600" i="1" dirty="0" err="1"/>
+              <a:t>bower</a:t>
             </a:r>
             <a:r>
               <a:rPr lang="es-VE" sz="1600" i="1" dirty="0"/>
               <a:t> </a:t>
             </a:r>
-            <a:r>
-              <a:rPr lang="es-VE" sz="1600" i="1" dirty="0" err="1"/>
-              <a:t>install</a:t>
-            </a:r>
-            <a:r>
-              <a:rPr lang="es-VE" sz="1600" i="1" dirty="0"/>
-              <a:t> -g </a:t>
-            </a:r>
-            <a:r>
-              <a:rPr lang="es-VE" sz="1600" i="1" dirty="0" err="1"/>
-              <a:t>bower</a:t>
-            </a:r>
-            <a:r>
-              <a:rPr lang="es-VE" sz="1600" i="1" dirty="0"/>
-              <a:t>  </a:t>
-            </a:r>
-            <a:r>
-              <a:rPr lang="es-VE" sz="2400" dirty="0"/>
-              <a:t>- Instalar </a:t>
-            </a:r>
-            <a:r>
-              <a:rPr lang="es-VE" sz="2400" dirty="0" smtClean="0"/>
-              <a:t>BOWER</a:t>
-            </a:r>
+            <a:endParaRPr lang="es-VE" sz="1600" i="1" dirty="0" smtClean="0"/>
           </a:p>
           <a:p>
             <a:pPr marL="285750" indent="-285750"/>
             <a:r>
-              <a:rPr lang="es-VE" sz="1600" dirty="0">
-                <a:hlinkClick r:id="rId4"/>
-              </a:rPr>
-              <a:t>http://brackets.io/</a:t>
-            </a:r>
-            <a:r>
-              <a:rPr lang="es-VE" sz="1600" dirty="0"/>
+              <a:rPr lang="en-US" sz="1600" b="1" dirty="0" err="1" smtClean="0"/>
+              <a:t>Instalar</a:t>
+            </a:r>
+            <a:r>
+              <a:rPr lang="en-US" sz="1600" b="1" dirty="0" smtClean="0"/>
+              <a:t> BROWSERIFY </a:t>
+            </a:r>
+            <a:r>
+              <a:rPr lang="en-US" sz="1600" dirty="0" smtClean="0"/>
+              <a:t>- </a:t>
+            </a:r>
+            <a:r>
+              <a:rPr lang="en-US" sz="1600" i="1" dirty="0" err="1" smtClean="0"/>
+              <a:t>npm</a:t>
+            </a:r>
+            <a:r>
+              <a:rPr lang="en-US" sz="1600" i="1" dirty="0" smtClean="0"/>
               <a:t> </a:t>
             </a:r>
             <a:r>
-              <a:rPr lang="es-VE" sz="2400" dirty="0"/>
-              <a:t>- Editor </a:t>
-            </a:r>
-            <a:r>
-              <a:rPr lang="es-VE" sz="2400" dirty="0" smtClean="0"/>
-              <a:t>Texto para desarrollo web</a:t>
-            </a:r>
+              <a:rPr lang="en-US" sz="1600" i="1" dirty="0" smtClean="0"/>
+              <a:t>install -g </a:t>
+            </a:r>
+            <a:r>
+              <a:rPr lang="en-US" sz="1600" i="1" dirty="0" err="1" smtClean="0"/>
+              <a:t>browserify</a:t>
+            </a:r>
+            <a:endParaRPr lang="en-US" dirty="0" smtClean="0"/>
+          </a:p>
+          <a:p>
+            <a:pPr marL="285750" indent="-285750"/>
+            <a:r>
+              <a:rPr lang="en-US" sz="1600" b="1" dirty="0" err="1" smtClean="0"/>
+              <a:t>Instalar</a:t>
+            </a:r>
+            <a:r>
+              <a:rPr lang="en-US" sz="1600" b="1" dirty="0" smtClean="0"/>
+              <a:t> GRUNT </a:t>
+            </a:r>
+            <a:r>
+              <a:rPr lang="en-US" sz="1600" dirty="0" smtClean="0"/>
+              <a:t>– </a:t>
+            </a:r>
+          </a:p>
+          <a:p>
+            <a:pPr marL="560070" lvl="1" indent="-285750"/>
+            <a:r>
+              <a:rPr lang="en-US" sz="1600" i="1" dirty="0" err="1" smtClean="0"/>
+              <a:t>npm</a:t>
+            </a:r>
+            <a:r>
+              <a:rPr lang="en-US" sz="1600" i="1" dirty="0" smtClean="0"/>
+              <a:t> install -g grunt-</a:t>
+            </a:r>
+            <a:r>
+              <a:rPr lang="en-US" sz="1600" i="1" dirty="0" err="1" smtClean="0"/>
+              <a:t>cli</a:t>
+            </a:r>
+            <a:endParaRPr lang="en-US" sz="1600" i="1" dirty="0" smtClean="0"/>
+          </a:p>
+          <a:p>
+            <a:pPr marL="560070" lvl="2" indent="-285750"/>
+            <a:r>
+              <a:rPr lang="en-US" sz="1600" i="1" dirty="0" err="1" smtClean="0"/>
+              <a:t>npm</a:t>
+            </a:r>
+            <a:r>
+              <a:rPr lang="en-US" sz="1600" i="1" dirty="0" smtClean="0"/>
+              <a:t> install grunt --save-dev</a:t>
+            </a:r>
+          </a:p>
+          <a:p>
+            <a:pPr marL="285750" indent="-285750"/>
+            <a:r>
+              <a:rPr lang="en-US" sz="1600" b="1" dirty="0" err="1" smtClean="0"/>
+              <a:t>Instalar</a:t>
+            </a:r>
+            <a:r>
+              <a:rPr lang="en-US" sz="1600" b="1" dirty="0" smtClean="0"/>
+              <a:t> PLUGINS DE GRUNT</a:t>
+            </a:r>
+          </a:p>
+          <a:p>
+            <a:pPr marL="560070" lvl="1" indent="-285750"/>
+            <a:r>
+              <a:rPr lang="en-US" sz="1600" i="1" dirty="0" err="1" smtClean="0"/>
+              <a:t>npm</a:t>
+            </a:r>
+            <a:r>
+              <a:rPr lang="en-US" sz="1600" i="1" dirty="0" smtClean="0"/>
+              <a:t> </a:t>
+            </a:r>
+            <a:r>
+              <a:rPr lang="en-US" sz="1600" i="1" dirty="0" smtClean="0"/>
+              <a:t>install grunt-</a:t>
+            </a:r>
+            <a:r>
+              <a:rPr lang="en-US" sz="1600" i="1" dirty="0" err="1" smtClean="0"/>
+              <a:t>contrib</a:t>
+            </a:r>
+            <a:r>
+              <a:rPr lang="en-US" sz="1600" i="1" dirty="0" smtClean="0"/>
+              <a:t>-watch --save-dev</a:t>
+            </a:r>
+          </a:p>
+          <a:p>
+            <a:pPr marL="560070" lvl="1" indent="-285750"/>
+            <a:r>
+              <a:rPr lang="en-US" sz="1600" i="1" dirty="0" err="1" smtClean="0"/>
+              <a:t>npm</a:t>
+            </a:r>
+            <a:r>
+              <a:rPr lang="en-US" sz="1600" i="1" dirty="0" smtClean="0"/>
+              <a:t> install grunt-</a:t>
+            </a:r>
+            <a:r>
+              <a:rPr lang="en-US" sz="1600" i="1" dirty="0" err="1" smtClean="0"/>
+              <a:t>browserify</a:t>
+            </a:r>
+            <a:r>
+              <a:rPr lang="en-US" sz="1600" i="1" dirty="0" smtClean="0"/>
+              <a:t> --</a:t>
+            </a:r>
+            <a:r>
+              <a:rPr lang="en-US" sz="1600" i="1" dirty="0" smtClean="0"/>
+              <a:t>save-dev</a:t>
+            </a:r>
+          </a:p>
+          <a:p>
+            <a:pPr marL="560070" lvl="1" indent="-285750"/>
+            <a:r>
+              <a:rPr lang="en-US" sz="1600" i="1" dirty="0" err="1" smtClean="0"/>
+              <a:t>npm</a:t>
+            </a:r>
+            <a:r>
+              <a:rPr lang="en-US" sz="1600" i="1" dirty="0" smtClean="0"/>
+              <a:t> </a:t>
+            </a:r>
+            <a:r>
+              <a:rPr lang="en-US" sz="1600" i="1" dirty="0" smtClean="0"/>
+              <a:t>install grunt-</a:t>
+            </a:r>
+            <a:r>
+              <a:rPr lang="en-US" sz="1600" i="1" dirty="0" err="1" smtClean="0"/>
+              <a:t>contrib</a:t>
+            </a:r>
+            <a:r>
+              <a:rPr lang="en-US" sz="1600" i="1" dirty="0" smtClean="0"/>
+              <a:t>-</a:t>
+            </a:r>
+            <a:r>
+              <a:rPr lang="en-US" sz="1600" i="1" dirty="0" err="1" smtClean="0"/>
+              <a:t>jshint</a:t>
+            </a:r>
+            <a:r>
+              <a:rPr lang="en-US" sz="1600" i="1" dirty="0" smtClean="0"/>
+              <a:t> --</a:t>
+            </a:r>
+            <a:r>
+              <a:rPr lang="en-US" sz="1600" i="1" dirty="0" smtClean="0"/>
+              <a:t>save-dev</a:t>
+            </a:r>
+          </a:p>
+          <a:p>
+            <a:pPr marL="560070" lvl="1" indent="-285750"/>
+            <a:r>
+              <a:rPr lang="en-US" sz="1600" i="1" dirty="0" err="1" smtClean="0"/>
+              <a:t>npm</a:t>
+            </a:r>
+            <a:r>
+              <a:rPr lang="en-US" sz="1600" i="1" dirty="0" smtClean="0"/>
+              <a:t> install uglify-js@1</a:t>
+            </a:r>
+          </a:p>
+          <a:p>
+            <a:pPr marL="285750" indent="-285750"/>
+            <a:r>
+              <a:rPr lang="en-US" sz="1600" b="1" dirty="0" err="1" smtClean="0"/>
+              <a:t>Instalar Brackets</a:t>
+            </a:r>
+            <a:endParaRPr lang="es-VE" sz="1600" b="1" dirty="0" err="1" smtClean="0"/>
           </a:p>
           <a:p>
             <a:pPr marL="285750" indent="-285750"/>
@@ -3779,13 +5559,20 @@
     </p:spTree>
     <p:extLst>
       <p:ext uri="{BB962C8B-B14F-4D97-AF65-F5344CB8AC3E}">
-        <p14:creationId xmlns:p14="http://schemas.microsoft.com/office/powerpoint/2010/main" xmlns="" val="1407232196"/>
+        <p14:creationId xmlns="" xmlns:p14="http://schemas.microsoft.com/office/powerpoint/2010/main" val="1407232196"/>
       </p:ext>
     </p:extLst>
   </p:cSld>
   <p:clrMapOvr>
     <a:masterClrMapping/>
   </p:clrMapOvr>
+  <p:timing>
+    <p:tnLst>
+      <p:par>
+        <p:cTn id="1" dur="indefinite" restart="never" nodeType="tmRoot"/>
+      </p:par>
+    </p:tnLst>
+  </p:timing>
 </p:sld>
 </file>
 
@@ -3849,7 +5636,7 @@
           <a:blip r:embed="rId2" cstate="print">
             <a:extLst>
               <a:ext uri="{28A0092B-C50C-407E-A947-70E740481C1C}">
-                <a14:useLocalDpi xmlns:a14="http://schemas.microsoft.com/office/drawing/2010/main" xmlns="" val="0"/>
+                <a14:useLocalDpi xmlns="" xmlns:a14="http://schemas.microsoft.com/office/drawing/2010/main" val="0"/>
               </a:ext>
             </a:extLst>
           </a:blip>
@@ -3869,7 +5656,7 @@
           <a:noFill/>
           <a:extLst>
             <a:ext uri="{909E8E84-426E-40DD-AFC4-6F175D3DCCD1}">
-              <a14:hiddenFill xmlns:a14="http://schemas.microsoft.com/office/drawing/2010/main" xmlns="">
+              <a14:hiddenFill xmlns="" xmlns:a14="http://schemas.microsoft.com/office/drawing/2010/main">
                 <a:solidFill>
                   <a:srgbClr val="FFFFFF"/>
                 </a:solidFill>
@@ -3881,13 +5668,20 @@
     </p:spTree>
     <p:extLst>
       <p:ext uri="{BB962C8B-B14F-4D97-AF65-F5344CB8AC3E}">
-        <p14:creationId xmlns:p14="http://schemas.microsoft.com/office/powerpoint/2010/main" xmlns="" val="1034331391"/>
+        <p14:creationId xmlns="" xmlns:p14="http://schemas.microsoft.com/office/powerpoint/2010/main" val="1034331391"/>
       </p:ext>
     </p:extLst>
   </p:cSld>
   <p:clrMapOvr>
     <a:masterClrMapping/>
   </p:clrMapOvr>
+  <p:timing>
+    <p:tnLst>
+      <p:par>
+        <p:cTn id="1" dur="indefinite" restart="never" nodeType="tmRoot"/>
+      </p:par>
+    </p:tnLst>
+  </p:timing>
 </p:sld>
 </file>
 
@@ -3947,7 +5741,7 @@
           <a:blip r:embed="rId2" cstate="print">
             <a:extLst>
               <a:ext uri="{28A0092B-C50C-407E-A947-70E740481C1C}">
-                <a14:useLocalDpi xmlns:a14="http://schemas.microsoft.com/office/drawing/2010/main" xmlns="" val="0"/>
+                <a14:useLocalDpi xmlns="" xmlns:a14="http://schemas.microsoft.com/office/drawing/2010/main" val="0"/>
               </a:ext>
             </a:extLst>
           </a:blip>
@@ -3970,14 +5764,14 @@
           </a:ln>
           <a:extLst>
             <a:ext uri="{909E8E84-426E-40DD-AFC4-6F175D3DCCD1}">
-              <a14:hiddenFill xmlns:a14="http://schemas.microsoft.com/office/drawing/2010/main" xmlns="">
+              <a14:hiddenFill xmlns="" xmlns:a14="http://schemas.microsoft.com/office/drawing/2010/main">
                 <a:solidFill>
                   <a:schemeClr val="accent1"/>
                 </a:solidFill>
               </a14:hiddenFill>
             </a:ext>
             <a:ext uri="{91240B29-F687-4F45-9708-019B960494DF}">
-              <a14:hiddenLine xmlns:a14="http://schemas.microsoft.com/office/drawing/2010/main" xmlns="" w="9525">
+              <a14:hiddenLine xmlns="" xmlns:a14="http://schemas.microsoft.com/office/drawing/2010/main" w="9525">
                 <a:solidFill>
                   <a:schemeClr val="tx1"/>
                 </a:solidFill>
@@ -3992,13 +5786,20 @@
     </p:spTree>
     <p:extLst>
       <p:ext uri="{BB962C8B-B14F-4D97-AF65-F5344CB8AC3E}">
-        <p14:creationId xmlns:p14="http://schemas.microsoft.com/office/powerpoint/2010/main" xmlns="" val="2020869238"/>
+        <p14:creationId xmlns="" xmlns:p14="http://schemas.microsoft.com/office/powerpoint/2010/main" val="2020869238"/>
       </p:ext>
     </p:extLst>
   </p:cSld>
   <p:clrMapOvr>
     <a:masterClrMapping/>
   </p:clrMapOvr>
+  <p:timing>
+    <p:tnLst>
+      <p:par>
+        <p:cTn id="1" dur="indefinite" restart="never" nodeType="tmRoot"/>
+      </p:par>
+    </p:tnLst>
+  </p:timing>
 </p:sld>
 </file>
 
@@ -4066,7 +5867,7 @@
           <a:blip r:embed="rId2" cstate="print">
             <a:extLst>
               <a:ext uri="{28A0092B-C50C-407E-A947-70E740481C1C}">
-                <a14:useLocalDpi xmlns:a14="http://schemas.microsoft.com/office/drawing/2010/main" xmlns="" val="0"/>
+                <a14:useLocalDpi xmlns="" xmlns:a14="http://schemas.microsoft.com/office/drawing/2010/main" val="0"/>
               </a:ext>
             </a:extLst>
           </a:blip>
@@ -4089,14 +5890,14 @@
           </a:ln>
           <a:extLst>
             <a:ext uri="{909E8E84-426E-40DD-AFC4-6F175D3DCCD1}">
-              <a14:hiddenFill xmlns:a14="http://schemas.microsoft.com/office/drawing/2010/main" xmlns="">
+              <a14:hiddenFill xmlns="" xmlns:a14="http://schemas.microsoft.com/office/drawing/2010/main">
                 <a:solidFill>
                   <a:schemeClr val="accent1"/>
                 </a:solidFill>
               </a14:hiddenFill>
             </a:ext>
             <a:ext uri="{91240B29-F687-4F45-9708-019B960494DF}">
-              <a14:hiddenLine xmlns:a14="http://schemas.microsoft.com/office/drawing/2010/main" xmlns="" w="9525">
+              <a14:hiddenLine xmlns="" xmlns:a14="http://schemas.microsoft.com/office/drawing/2010/main" w="9525">
                 <a:solidFill>
                   <a:schemeClr val="tx1"/>
                 </a:solidFill>
@@ -4120,7 +5921,7 @@
           <a:blip r:embed="rId3" cstate="print">
             <a:extLst>
               <a:ext uri="{28A0092B-C50C-407E-A947-70E740481C1C}">
-                <a14:useLocalDpi xmlns:a14="http://schemas.microsoft.com/office/drawing/2010/main" xmlns="" val="0"/>
+                <a14:useLocalDpi xmlns="" xmlns:a14="http://schemas.microsoft.com/office/drawing/2010/main" val="0"/>
               </a:ext>
             </a:extLst>
           </a:blip>
@@ -4143,14 +5944,14 @@
           </a:ln>
           <a:extLst>
             <a:ext uri="{909E8E84-426E-40DD-AFC4-6F175D3DCCD1}">
-              <a14:hiddenFill xmlns:a14="http://schemas.microsoft.com/office/drawing/2010/main" xmlns="">
+              <a14:hiddenFill xmlns="" xmlns:a14="http://schemas.microsoft.com/office/drawing/2010/main">
                 <a:solidFill>
                   <a:schemeClr val="accent1"/>
                 </a:solidFill>
               </a14:hiddenFill>
             </a:ext>
             <a:ext uri="{91240B29-F687-4F45-9708-019B960494DF}">
-              <a14:hiddenLine xmlns:a14="http://schemas.microsoft.com/office/drawing/2010/main" xmlns="" w="9525">
+              <a14:hiddenLine xmlns="" xmlns:a14="http://schemas.microsoft.com/office/drawing/2010/main" w="9525">
                 <a:solidFill>
                   <a:schemeClr val="tx1"/>
                 </a:solidFill>
@@ -4286,13 +6087,20 @@
     </p:spTree>
     <p:extLst>
       <p:ext uri="{BB962C8B-B14F-4D97-AF65-F5344CB8AC3E}">
-        <p14:creationId xmlns:p14="http://schemas.microsoft.com/office/powerpoint/2010/main" xmlns="" val="3608842146"/>
+        <p14:creationId xmlns="" xmlns:p14="http://schemas.microsoft.com/office/powerpoint/2010/main" val="3608842146"/>
       </p:ext>
     </p:extLst>
   </p:cSld>
   <p:clrMapOvr>
     <a:masterClrMapping/>
   </p:clrMapOvr>
+  <p:timing>
+    <p:tnLst>
+      <p:par>
+        <p:cTn id="1" dur="indefinite" restart="never" nodeType="tmRoot"/>
+      </p:par>
+    </p:tnLst>
+  </p:timing>
 </p:sld>
 </file>
 
@@ -4315,7 +6123,7 @@
       </p:grpSpPr>
       <p:sp>
         <p:nvSpPr>
-          <p:cNvPr id="2" name="1 Título"/>
+          <p:cNvPr id="4" name="3 Título"/>
           <p:cNvSpPr>
             <a:spLocks noGrp="1"/>
           </p:cNvSpPr>
@@ -4330,20 +6138,75 @@
           <a:p>
             <a:r>
               <a:rPr lang="es-VE" dirty="0" smtClean="0"/>
-              <a:t>Páginas de Referencia</a:t>
+              <a:t>Instalar </a:t>
+            </a:r>
+            <a:r>
+              <a:rPr lang="es-VE" dirty="0" err="1" smtClean="0"/>
+              <a:t>Browserify</a:t>
             </a:r>
             <a:endParaRPr lang="es-VE" dirty="0"/>
           </a:p>
         </p:txBody>
       </p:sp>
-      <p:sp>
-        <p:nvSpPr>
-          <p:cNvPr id="3" name="2 Marcador de contenido"/>
-          <p:cNvSpPr>
-            <a:spLocks noGrp="1"/>
-          </p:cNvSpPr>
-          <p:nvPr>
-            <p:ph idx="1"/>
+      <p:pic>
+        <p:nvPicPr>
+          <p:cNvPr id="1026" name="Picture 2" descr="C:\Users\Arkiteck\AppData\Local\Temp\SNAGHTMLc51a7b4.PNG"/>
+          <p:cNvPicPr>
+            <a:picLocks noChangeAspect="1" noChangeArrowheads="1"/>
+          </p:cNvPicPr>
+          <p:nvPr/>
+        </p:nvPicPr>
+        <p:blipFill>
+          <a:blip r:embed="rId2" cstate="print"/>
+          <a:srcRect/>
+          <a:stretch>
+            <a:fillRect/>
+          </a:stretch>
+        </p:blipFill>
+        <p:spPr bwMode="auto">
+          <a:xfrm>
+            <a:off x="1835696" y="1340768"/>
+            <a:ext cx="5040560" cy="5366083"/>
+          </a:xfrm>
+          <a:prstGeom prst="rect">
+            <a:avLst/>
+          </a:prstGeom>
+          <a:noFill/>
+        </p:spPr>
+      </p:pic>
+    </p:spTree>
+  </p:cSld>
+  <p:clrMapOvr>
+    <a:masterClrMapping/>
+  </p:clrMapOvr>
+</p:sld>
+</file>
+
+<file path=ppt/slides/slide8.xml><?xml version="1.0" encoding="utf-8"?>
+<p:sld xmlns:a="http://schemas.openxmlformats.org/drawingml/2006/main" xmlns:r="http://schemas.openxmlformats.org/officeDocument/2006/relationships" xmlns:p="http://schemas.openxmlformats.org/presentationml/2006/main">
+  <p:cSld>
+    <p:spTree>
+      <p:nvGrpSpPr>
+        <p:cNvPr id="1" name=""/>
+        <p:cNvGrpSpPr/>
+        <p:nvPr/>
+      </p:nvGrpSpPr>
+      <p:grpSpPr>
+        <a:xfrm>
+          <a:off x="0" y="0"/>
+          <a:ext cx="0" cy="0"/>
+          <a:chOff x="0" y="0"/>
+          <a:chExt cx="0" cy="0"/>
+        </a:xfrm>
+      </p:grpSpPr>
+      <p:sp>
+        <p:nvSpPr>
+          <p:cNvPr id="4" name="3 Título"/>
+          <p:cNvSpPr>
+            <a:spLocks noGrp="1"/>
+          </p:cNvSpPr>
+          <p:nvPr>
+            <p:ph type="title"/>
           </p:nvPr>
         </p:nvSpPr>
         <p:spPr/>
@@ -4352,33 +6215,128 @@
           <a:lstStyle/>
           <a:p>
             <a:r>
-              <a:rPr lang="es-VE" dirty="0">
-                <a:hlinkClick r:id="rId2"/>
-              </a:rPr>
-              <a:t>http://caniuse.com</a:t>
-            </a:r>
-            <a:r>
-              <a:rPr lang="es-VE" dirty="0" smtClean="0">
-                <a:hlinkClick r:id="rId2"/>
-              </a:rPr>
-              <a:t>/</a:t>
-            </a:r>
-            <a:r>
               <a:rPr lang="es-VE" dirty="0" smtClean="0"/>
-              <a:t> - Indica compatibilidad HTML y CSS</a:t>
-            </a:r>
-          </a:p>
-          <a:p>
+              <a:t>Instalar GRUNT</a:t>
+            </a:r>
             <a:endParaRPr lang="es-VE" dirty="0"/>
           </a:p>
         </p:txBody>
       </p:sp>
+      <p:pic>
+        <p:nvPicPr>
+          <p:cNvPr id="21510" name="Picture 6" descr="C:\Users\Arkiteck\AppData\Local\Temp\SNAGHTMLc5c64bb.PNG"/>
+          <p:cNvPicPr>
+            <a:picLocks noChangeAspect="1" noChangeArrowheads="1"/>
+          </p:cNvPicPr>
+          <p:nvPr/>
+        </p:nvPicPr>
+        <p:blipFill>
+          <a:blip r:embed="rId2" cstate="print"/>
+          <a:srcRect/>
+          <a:stretch>
+            <a:fillRect/>
+          </a:stretch>
+        </p:blipFill>
+        <p:spPr bwMode="auto">
+          <a:xfrm>
+            <a:off x="2123728" y="1340768"/>
+            <a:ext cx="4824536" cy="5517232"/>
+          </a:xfrm>
+          <a:prstGeom prst="rect">
+            <a:avLst/>
+          </a:prstGeom>
+          <a:noFill/>
+        </p:spPr>
+      </p:pic>
     </p:spTree>
-    <p:extLst>
-      <p:ext uri="{BB962C8B-B14F-4D97-AF65-F5344CB8AC3E}">
-        <p14:creationId xmlns:p14="http://schemas.microsoft.com/office/powerpoint/2010/main" xmlns="" val="2061773745"/>
-      </p:ext>
-    </p:extLst>
+  </p:cSld>
+  <p:clrMapOvr>
+    <a:masterClrMapping/>
+  </p:clrMapOvr>
+</p:sld>
+</file>
+
+<file path=ppt/slides/slide9.xml><?xml version="1.0" encoding="utf-8"?>
+<p:sld xmlns:a="http://schemas.openxmlformats.org/drawingml/2006/main" xmlns:r="http://schemas.openxmlformats.org/officeDocument/2006/relationships" xmlns:p="http://schemas.openxmlformats.org/presentationml/2006/main">
+  <p:cSld>
+    <p:spTree>
+      <p:nvGrpSpPr>
+        <p:cNvPr id="1" name=""/>
+        <p:cNvGrpSpPr/>
+        <p:nvPr/>
+      </p:nvGrpSpPr>
+      <p:grpSpPr>
+        <a:xfrm>
+          <a:off x="0" y="0"/>
+          <a:ext cx="0" cy="0"/>
+          <a:chOff x="0" y="0"/>
+          <a:chExt cx="0" cy="0"/>
+        </a:xfrm>
+      </p:grpSpPr>
+      <p:sp>
+        <p:nvSpPr>
+          <p:cNvPr id="2" name="1 Título"/>
+          <p:cNvSpPr>
+            <a:spLocks noGrp="1"/>
+          </p:cNvSpPr>
+          <p:nvPr>
+            <p:ph type="title"/>
+          </p:nvPr>
+        </p:nvSpPr>
+        <p:spPr/>
+        <p:txBody>
+          <a:bodyPr/>
+          <a:lstStyle/>
+          <a:p>
+            <a:r>
+              <a:rPr lang="es-VE" dirty="0" smtClean="0"/>
+              <a:t>Sumar </a:t>
+            </a:r>
+            <a:r>
+              <a:rPr lang="es-VE" dirty="0" err="1" smtClean="0"/>
+              <a:t>grunt</a:t>
+            </a:r>
+            <a:r>
+              <a:rPr lang="es-VE" dirty="0" smtClean="0"/>
+              <a:t> al proyecto</a:t>
+            </a:r>
+            <a:endParaRPr lang="es-VE" dirty="0"/>
+          </a:p>
+        </p:txBody>
+      </p:sp>
+      <p:pic>
+        <p:nvPicPr>
+          <p:cNvPr id="22530" name="Picture 2"/>
+          <p:cNvPicPr>
+            <a:picLocks noChangeAspect="1" noChangeArrowheads="1"/>
+          </p:cNvPicPr>
+          <p:nvPr/>
+        </p:nvPicPr>
+        <p:blipFill>
+          <a:blip r:embed="rId2" cstate="print"/>
+          <a:srcRect/>
+          <a:stretch>
+            <a:fillRect/>
+          </a:stretch>
+        </p:blipFill>
+        <p:spPr bwMode="auto">
+          <a:xfrm>
+            <a:off x="1331640" y="2132856"/>
+            <a:ext cx="6305550" cy="3848100"/>
+          </a:xfrm>
+          <a:prstGeom prst="rect">
+            <a:avLst/>
+          </a:prstGeom>
+          <a:noFill/>
+          <a:ln w="9525">
+            <a:noFill/>
+            <a:miter lim="800000"/>
+            <a:headEnd/>
+            <a:tailEnd/>
+          </a:ln>
+        </p:spPr>
+      </p:pic>
+    </p:spTree>
   </p:cSld>
   <p:clrMapOvr>
     <a:masterClrMapping/>

</xml_diff>

<commit_message>
Se modifica la sección "Instalación de herramientas"
Se suma la instalación del plugin de grunt grunt-contrib-uglify para uglify
</commit_message>
<xml_diff>
--- a/bitacora_desarrollo.pptx
+++ b/bitacora_desarrollo.pptx
@@ -307,7 +307,7 @@
             <a:fld id="{7A847CFC-816F-41D0-AAC0-9BF4FEBC753E}" type="datetimeFigureOut">
               <a:rPr lang="es-ES" smtClean="0"/>
               <a:pPr/>
-              <a:t>25/10/2015</a:t>
+              <a:t>26/10/2015</a:t>
             </a:fld>
             <a:endParaRPr lang="es-ES"/>
           </a:p>
@@ -509,7 +509,7 @@
             <a:fld id="{7A847CFC-816F-41D0-AAC0-9BF4FEBC753E}" type="datetimeFigureOut">
               <a:rPr lang="es-ES" smtClean="0"/>
               <a:pPr/>
-              <a:t>25/10/2015</a:t>
+              <a:t>26/10/2015</a:t>
             </a:fld>
             <a:endParaRPr lang="es-ES"/>
           </a:p>
@@ -686,7 +686,7 @@
             <a:fld id="{7A847CFC-816F-41D0-AAC0-9BF4FEBC753E}" type="datetimeFigureOut">
               <a:rPr lang="es-ES" smtClean="0"/>
               <a:pPr/>
-              <a:t>25/10/2015</a:t>
+              <a:t>26/10/2015</a:t>
             </a:fld>
             <a:endParaRPr lang="es-ES"/>
           </a:p>
@@ -853,7 +853,7 @@
             <a:fld id="{7A847CFC-816F-41D0-AAC0-9BF4FEBC753E}" type="datetimeFigureOut">
               <a:rPr lang="es-ES" smtClean="0"/>
               <a:pPr/>
-              <a:t>25/10/2015</a:t>
+              <a:t>26/10/2015</a:t>
             </a:fld>
             <a:endParaRPr lang="es-ES"/>
           </a:p>
@@ -1103,7 +1103,7 @@
             <a:fld id="{7A847CFC-816F-41D0-AAC0-9BF4FEBC753E}" type="datetimeFigureOut">
               <a:rPr lang="es-ES" smtClean="0"/>
               <a:pPr/>
-              <a:t>25/10/2015</a:t>
+              <a:t>26/10/2015</a:t>
             </a:fld>
             <a:endParaRPr lang="es-ES"/>
           </a:p>
@@ -1423,7 +1423,7 @@
             <a:fld id="{7A847CFC-816F-41D0-AAC0-9BF4FEBC753E}" type="datetimeFigureOut">
               <a:rPr lang="es-ES" smtClean="0"/>
               <a:pPr/>
-              <a:t>25/10/2015</a:t>
+              <a:t>26/10/2015</a:t>
             </a:fld>
             <a:endParaRPr lang="es-ES"/>
           </a:p>
@@ -1891,7 +1891,7 @@
             <a:fld id="{7A847CFC-816F-41D0-AAC0-9BF4FEBC753E}" type="datetimeFigureOut">
               <a:rPr lang="es-ES" smtClean="0"/>
               <a:pPr/>
-              <a:t>25/10/2015</a:t>
+              <a:t>26/10/2015</a:t>
             </a:fld>
             <a:endParaRPr lang="es-ES"/>
           </a:p>
@@ -2041,7 +2041,7 @@
             <a:fld id="{7A847CFC-816F-41D0-AAC0-9BF4FEBC753E}" type="datetimeFigureOut">
               <a:rPr lang="es-ES" smtClean="0"/>
               <a:pPr/>
-              <a:t>25/10/2015</a:t>
+              <a:t>26/10/2015</a:t>
             </a:fld>
             <a:endParaRPr lang="es-ES"/>
           </a:p>
@@ -2133,7 +2133,7 @@
             <a:fld id="{7A847CFC-816F-41D0-AAC0-9BF4FEBC753E}" type="datetimeFigureOut">
               <a:rPr lang="es-ES" smtClean="0"/>
               <a:pPr/>
-              <a:t>25/10/2015</a:t>
+              <a:t>26/10/2015</a:t>
             </a:fld>
             <a:endParaRPr lang="es-ES"/>
           </a:p>
@@ -2409,7 +2409,7 @@
             <a:fld id="{7A847CFC-816F-41D0-AAC0-9BF4FEBC753E}" type="datetimeFigureOut">
               <a:rPr lang="es-ES" smtClean="0"/>
               <a:pPr/>
-              <a:t>25/10/2015</a:t>
+              <a:t>26/10/2015</a:t>
             </a:fld>
             <a:endParaRPr lang="es-ES"/>
           </a:p>
@@ -2716,7 +2716,7 @@
             <a:fld id="{7A847CFC-816F-41D0-AAC0-9BF4FEBC753E}" type="datetimeFigureOut">
               <a:rPr lang="es-ES" smtClean="0"/>
               <a:pPr/>
-              <a:t>25/10/2015</a:t>
+              <a:t>26/10/2015</a:t>
             </a:fld>
             <a:endParaRPr lang="es-ES"/>
           </a:p>
@@ -3016,7 +3016,7 @@
             <a:fld id="{7A847CFC-816F-41D0-AAC0-9BF4FEBC753E}" type="datetimeFigureOut">
               <a:rPr lang="es-ES" smtClean="0"/>
               <a:pPr/>
-              <a:t>25/10/2015</a:t>
+              <a:t>26/10/2015</a:t>
             </a:fld>
             <a:endParaRPr lang="es-ES"/>
           </a:p>
@@ -3632,11 +3632,7 @@
                     <a:p>
                       <a:r>
                         <a:rPr lang="es-VE" dirty="0" smtClean="0"/>
-                        <a:t>Cliente </a:t>
-                      </a:r>
-                      <a:r>
-                        <a:rPr lang="es-VE" dirty="0" smtClean="0"/>
-                        <a:t>GIT</a:t>
+                        <a:t>Cliente GIT</a:t>
                       </a:r>
                       <a:endParaRPr lang="es-VE" dirty="0"/>
                     </a:p>
@@ -4242,7 +4238,7 @@
     </p:spTree>
     <p:extLst>
       <p:ext uri="{BB962C8B-B14F-4D97-AF65-F5344CB8AC3E}">
-        <p14:creationId xmlns="" xmlns:p14="http://schemas.microsoft.com/office/powerpoint/2010/main" val="2585810778"/>
+        <p14:creationId xmlns:p14="http://schemas.microsoft.com/office/powerpoint/2010/main" val="2585810778"/>
       </p:ext>
     </p:extLst>
   </p:cSld>
@@ -4546,15 +4542,7 @@
           <a:p>
             <a:r>
               <a:rPr lang="es-VE" dirty="0" smtClean="0"/>
-              <a:t>Crear y Editar el </a:t>
-            </a:r>
-            <a:r>
-              <a:rPr lang="es-VE" dirty="0" smtClean="0"/>
-              <a:t>archivo </a:t>
-            </a:r>
-            <a:r>
-              <a:rPr lang="es-VE" dirty="0" smtClean="0"/>
-              <a:t>Gruntfile.js, ver documentación de GRUNT.</a:t>
+              <a:t>Crear y Editar el archivo Gruntfile.js, ver documentación de GRUNT.</a:t>
             </a:r>
           </a:p>
           <a:p>
@@ -4579,11 +4567,7 @@
             </a:r>
             <a:r>
               <a:rPr lang="es-VE" dirty="0" smtClean="0"/>
-              <a:t> </a:t>
-            </a:r>
-            <a:r>
-              <a:rPr lang="es-VE" dirty="0" smtClean="0"/>
-              <a:t>–v</a:t>
+              <a:t> –v</a:t>
             </a:r>
           </a:p>
           <a:p>
@@ -4682,7 +4666,7 @@
     </p:spTree>
     <p:extLst>
       <p:ext uri="{BB962C8B-B14F-4D97-AF65-F5344CB8AC3E}">
-        <p14:creationId xmlns="" xmlns:p14="http://schemas.microsoft.com/office/powerpoint/2010/main" val="2061773745"/>
+        <p14:creationId xmlns:p14="http://schemas.microsoft.com/office/powerpoint/2010/main" val="2061773745"/>
       </p:ext>
     </p:extLst>
   </p:cSld>
@@ -5183,7 +5167,7 @@
     </p:spTree>
     <p:extLst>
       <p:ext uri="{BB962C8B-B14F-4D97-AF65-F5344CB8AC3E}">
-        <p14:creationId xmlns="" xmlns:p14="http://schemas.microsoft.com/office/powerpoint/2010/main" val="1503682371"/>
+        <p14:creationId xmlns:p14="http://schemas.microsoft.com/office/powerpoint/2010/main" val="1503682371"/>
       </p:ext>
     </p:extLst>
   </p:cSld>
@@ -5260,11 +5244,7 @@
             <a:pPr marL="285750" indent="-285750"/>
             <a:r>
               <a:rPr lang="es-VE" sz="1600" b="1" dirty="0" smtClean="0"/>
-              <a:t>Instalar </a:t>
-            </a:r>
-            <a:r>
-              <a:rPr lang="es-VE" sz="1600" b="1" dirty="0" smtClean="0"/>
-              <a:t>NODE </a:t>
+              <a:t>Instalar NODE </a:t>
             </a:r>
             <a:r>
               <a:rPr lang="es-VE" sz="1600" dirty="0" smtClean="0"/>
@@ -5274,13 +5254,7 @@
               <a:rPr lang="es-VE" sz="1600" dirty="0" smtClean="0">
                 <a:hlinkClick r:id="rId2"/>
               </a:rPr>
-              <a:t>https</a:t>
-            </a:r>
-            <a:r>
-              <a:rPr lang="es-VE" sz="1600" dirty="0" smtClean="0">
-                <a:hlinkClick r:id="rId2"/>
-              </a:rPr>
-              <a:t>://nodejs.org/en/</a:t>
+              <a:t>https://nodejs.org/en/</a:t>
             </a:r>
             <a:r>
               <a:rPr lang="es-VE" sz="1600" dirty="0" smtClean="0">
@@ -5288,9 +5262,6 @@
               </a:rPr>
               <a:t> </a:t>
             </a:r>
-            <a:endParaRPr lang="es-VE" sz="1600" dirty="0" smtClean="0">
-              <a:hlinkClick r:id="rId3"/>
-            </a:endParaRPr>
           </a:p>
           <a:p>
             <a:pPr marL="285750" indent="-285750"/>
@@ -5326,11 +5297,7 @@
             <a:pPr marL="285750" indent="-285750"/>
             <a:r>
               <a:rPr lang="es-VE" sz="1600" b="1" dirty="0" smtClean="0"/>
-              <a:t>Instalar </a:t>
-            </a:r>
-            <a:r>
-              <a:rPr lang="es-VE" sz="1600" b="1" dirty="0" smtClean="0"/>
-              <a:t>BOWER </a:t>
+              <a:t>Instalar BOWER </a:t>
             </a:r>
             <a:r>
               <a:rPr lang="es-VE" sz="1600" dirty="0" smtClean="0"/>
@@ -5382,16 +5349,42 @@
             </a:r>
             <a:r>
               <a:rPr lang="en-US" sz="1600" i="1" dirty="0" smtClean="0"/>
-              <a:t> </a:t>
-            </a:r>
-            <a:r>
-              <a:rPr lang="en-US" sz="1600" i="1" dirty="0" smtClean="0"/>
-              <a:t>install -g </a:t>
+              <a:t> install -g </a:t>
             </a:r>
             <a:r>
               <a:rPr lang="en-US" sz="1600" i="1" dirty="0" err="1" smtClean="0"/>
               <a:t>browserify</a:t>
             </a:r>
+            <a:endParaRPr lang="en-US" sz="1600" i="1" dirty="0" smtClean="0"/>
+          </a:p>
+          <a:p>
+            <a:pPr marL="285750" lvl="2" indent="-285750">
+              <a:buSzPct val="85000"/>
+            </a:pPr>
+            <a:r>
+              <a:rPr lang="en-US" sz="1600" b="1" dirty="0" err="1"/>
+              <a:t>Instalar</a:t>
+            </a:r>
+            <a:r>
+              <a:rPr lang="en-US" sz="1600" b="1" dirty="0"/>
+              <a:t> UGLIFY </a:t>
+            </a:r>
+            <a:r>
+              <a:rPr lang="en-US" sz="1600" dirty="0"/>
+              <a:t>- </a:t>
+            </a:r>
+            <a:r>
+              <a:rPr lang="en-US" sz="1600" i="1" dirty="0" err="1"/>
+              <a:t>npm</a:t>
+            </a:r>
+            <a:r>
+              <a:rPr lang="en-US" sz="1600" i="1" dirty="0"/>
+              <a:t> install </a:t>
+            </a:r>
+            <a:r>
+              <a:rPr lang="en-US" sz="1600" i="1" dirty="0" smtClean="0"/>
+              <a:t>uglify-js@1</a:t>
+            </a:r>
             <a:endParaRPr lang="en-US" dirty="0" smtClean="0"/>
           </a:p>
           <a:p>
@@ -5433,7 +5426,11 @@
             </a:r>
             <a:r>
               <a:rPr lang="en-US" sz="1600" i="1" dirty="0" smtClean="0"/>
-              <a:t> install grunt --save-dev</a:t>
+              <a:t> install grunt --</a:t>
+            </a:r>
+            <a:r>
+              <a:rPr lang="en-US" sz="1600" i="1" dirty="0" smtClean="0"/>
+              <a:t>save-dev</a:t>
             </a:r>
           </a:p>
           <a:p>
@@ -5444,7 +5441,11 @@
             </a:r>
             <a:r>
               <a:rPr lang="en-US" sz="1600" b="1" dirty="0" smtClean="0"/>
-              <a:t> PLUGINS DE GRUNT</a:t>
+              <a:t> </a:t>
+            </a:r>
+            <a:r>
+              <a:rPr lang="en-US" sz="1600" b="1" dirty="0" smtClean="0"/>
+              <a:t>PLUGINS DE GRUNT</a:t>
             </a:r>
           </a:p>
           <a:p>
@@ -5455,11 +5456,7 @@
             </a:r>
             <a:r>
               <a:rPr lang="en-US" sz="1600" i="1" dirty="0" smtClean="0"/>
-              <a:t> </a:t>
-            </a:r>
-            <a:r>
-              <a:rPr lang="en-US" sz="1600" i="1" dirty="0" smtClean="0"/>
-              <a:t>install grunt-</a:t>
+              <a:t> install grunt-</a:t>
             </a:r>
             <a:r>
               <a:rPr lang="en-US" sz="1600" i="1" dirty="0" err="1" smtClean="0"/>
@@ -5486,11 +5483,7 @@
             </a:r>
             <a:r>
               <a:rPr lang="en-US" sz="1600" i="1" dirty="0" smtClean="0"/>
-              <a:t> --</a:t>
-            </a:r>
-            <a:r>
-              <a:rPr lang="en-US" sz="1600" i="1" dirty="0" smtClean="0"/>
-              <a:t>save-dev</a:t>
+              <a:t> --save-dev</a:t>
             </a:r>
           </a:p>
           <a:p>
@@ -5501,11 +5494,7 @@
             </a:r>
             <a:r>
               <a:rPr lang="en-US" sz="1600" i="1" dirty="0" smtClean="0"/>
-              <a:t> </a:t>
-            </a:r>
-            <a:r>
-              <a:rPr lang="en-US" sz="1600" i="1" dirty="0" smtClean="0"/>
-              <a:t>install grunt-</a:t>
+              <a:t> install grunt-</a:t>
             </a:r>
             <a:r>
               <a:rPr lang="en-US" sz="1600" i="1" dirty="0" err="1" smtClean="0"/>
@@ -5521,11 +5510,7 @@
             </a:r>
             <a:r>
               <a:rPr lang="en-US" sz="1600" i="1" dirty="0" smtClean="0"/>
-              <a:t> --</a:t>
-            </a:r>
-            <a:r>
-              <a:rPr lang="en-US" sz="1600" i="1" dirty="0" smtClean="0"/>
-              <a:t>save-dev</a:t>
+              <a:t> --save-dev</a:t>
             </a:r>
           </a:p>
           <a:p>
@@ -5536,8 +5521,29 @@
             </a:r>
             <a:r>
               <a:rPr lang="en-US" sz="1600" i="1" dirty="0" smtClean="0"/>
-              <a:t> install uglify-js@1</a:t>
-            </a:r>
+              <a:t> </a:t>
+            </a:r>
+            <a:r>
+              <a:rPr lang="en-US" sz="1600" i="1" dirty="0"/>
+              <a:t>install grunt-</a:t>
+            </a:r>
+            <a:r>
+              <a:rPr lang="en-US" sz="1600" i="1" dirty="0" err="1"/>
+              <a:t>contrib</a:t>
+            </a:r>
+            <a:r>
+              <a:rPr lang="en-US" sz="1600" i="1" dirty="0"/>
+              <a:t>-</a:t>
+            </a:r>
+            <a:r>
+              <a:rPr lang="en-US" sz="1600" i="1" dirty="0" err="1"/>
+              <a:t>uglify</a:t>
+            </a:r>
+            <a:r>
+              <a:rPr lang="en-US" sz="1600" i="1" dirty="0"/>
+              <a:t> --save-dev</a:t>
+            </a:r>
+            <a:endParaRPr lang="en-US" sz="1600" i="1" dirty="0" smtClean="0"/>
           </a:p>
           <a:p>
             <a:pPr marL="285750" indent="-285750"/>
@@ -5559,7 +5565,7 @@
     </p:spTree>
     <p:extLst>
       <p:ext uri="{BB962C8B-B14F-4D97-AF65-F5344CB8AC3E}">
-        <p14:creationId xmlns="" xmlns:p14="http://schemas.microsoft.com/office/powerpoint/2010/main" val="1407232196"/>
+        <p14:creationId xmlns:p14="http://schemas.microsoft.com/office/powerpoint/2010/main" val="1407232196"/>
       </p:ext>
     </p:extLst>
   </p:cSld>
@@ -5636,7 +5642,7 @@
           <a:blip r:embed="rId2" cstate="print">
             <a:extLst>
               <a:ext uri="{28A0092B-C50C-407E-A947-70E740481C1C}">
-                <a14:useLocalDpi xmlns="" xmlns:a14="http://schemas.microsoft.com/office/drawing/2010/main" val="0"/>
+                <a14:useLocalDpi xmlns:a14="http://schemas.microsoft.com/office/drawing/2010/main" val="0"/>
               </a:ext>
             </a:extLst>
           </a:blip>
@@ -5656,7 +5662,7 @@
           <a:noFill/>
           <a:extLst>
             <a:ext uri="{909E8E84-426E-40DD-AFC4-6F175D3DCCD1}">
-              <a14:hiddenFill xmlns="" xmlns:a14="http://schemas.microsoft.com/office/drawing/2010/main">
+              <a14:hiddenFill xmlns:a14="http://schemas.microsoft.com/office/drawing/2010/main">
                 <a:solidFill>
                   <a:srgbClr val="FFFFFF"/>
                 </a:solidFill>
@@ -5668,7 +5674,7 @@
     </p:spTree>
     <p:extLst>
       <p:ext uri="{BB962C8B-B14F-4D97-AF65-F5344CB8AC3E}">
-        <p14:creationId xmlns="" xmlns:p14="http://schemas.microsoft.com/office/powerpoint/2010/main" val="1034331391"/>
+        <p14:creationId xmlns:p14="http://schemas.microsoft.com/office/powerpoint/2010/main" val="1034331391"/>
       </p:ext>
     </p:extLst>
   </p:cSld>
@@ -5741,7 +5747,7 @@
           <a:blip r:embed="rId2" cstate="print">
             <a:extLst>
               <a:ext uri="{28A0092B-C50C-407E-A947-70E740481C1C}">
-                <a14:useLocalDpi xmlns="" xmlns:a14="http://schemas.microsoft.com/office/drawing/2010/main" val="0"/>
+                <a14:useLocalDpi xmlns:a14="http://schemas.microsoft.com/office/drawing/2010/main" val="0"/>
               </a:ext>
             </a:extLst>
           </a:blip>
@@ -5764,14 +5770,14 @@
           </a:ln>
           <a:extLst>
             <a:ext uri="{909E8E84-426E-40DD-AFC4-6F175D3DCCD1}">
-              <a14:hiddenFill xmlns="" xmlns:a14="http://schemas.microsoft.com/office/drawing/2010/main">
+              <a14:hiddenFill xmlns:a14="http://schemas.microsoft.com/office/drawing/2010/main">
                 <a:solidFill>
                   <a:schemeClr val="accent1"/>
                 </a:solidFill>
               </a14:hiddenFill>
             </a:ext>
             <a:ext uri="{91240B29-F687-4F45-9708-019B960494DF}">
-              <a14:hiddenLine xmlns="" xmlns:a14="http://schemas.microsoft.com/office/drawing/2010/main" w="9525">
+              <a14:hiddenLine xmlns:a14="http://schemas.microsoft.com/office/drawing/2010/main" w="9525">
                 <a:solidFill>
                   <a:schemeClr val="tx1"/>
                 </a:solidFill>
@@ -5786,7 +5792,7 @@
     </p:spTree>
     <p:extLst>
       <p:ext uri="{BB962C8B-B14F-4D97-AF65-F5344CB8AC3E}">
-        <p14:creationId xmlns="" xmlns:p14="http://schemas.microsoft.com/office/powerpoint/2010/main" val="2020869238"/>
+        <p14:creationId xmlns:p14="http://schemas.microsoft.com/office/powerpoint/2010/main" val="2020869238"/>
       </p:ext>
     </p:extLst>
   </p:cSld>
@@ -5867,7 +5873,7 @@
           <a:blip r:embed="rId2" cstate="print">
             <a:extLst>
               <a:ext uri="{28A0092B-C50C-407E-A947-70E740481C1C}">
-                <a14:useLocalDpi xmlns="" xmlns:a14="http://schemas.microsoft.com/office/drawing/2010/main" val="0"/>
+                <a14:useLocalDpi xmlns:a14="http://schemas.microsoft.com/office/drawing/2010/main" val="0"/>
               </a:ext>
             </a:extLst>
           </a:blip>
@@ -5890,14 +5896,14 @@
           </a:ln>
           <a:extLst>
             <a:ext uri="{909E8E84-426E-40DD-AFC4-6F175D3DCCD1}">
-              <a14:hiddenFill xmlns="" xmlns:a14="http://schemas.microsoft.com/office/drawing/2010/main">
+              <a14:hiddenFill xmlns:a14="http://schemas.microsoft.com/office/drawing/2010/main">
                 <a:solidFill>
                   <a:schemeClr val="accent1"/>
                 </a:solidFill>
               </a14:hiddenFill>
             </a:ext>
             <a:ext uri="{91240B29-F687-4F45-9708-019B960494DF}">
-              <a14:hiddenLine xmlns="" xmlns:a14="http://schemas.microsoft.com/office/drawing/2010/main" w="9525">
+              <a14:hiddenLine xmlns:a14="http://schemas.microsoft.com/office/drawing/2010/main" w="9525">
                 <a:solidFill>
                   <a:schemeClr val="tx1"/>
                 </a:solidFill>
@@ -5921,7 +5927,7 @@
           <a:blip r:embed="rId3" cstate="print">
             <a:extLst>
               <a:ext uri="{28A0092B-C50C-407E-A947-70E740481C1C}">
-                <a14:useLocalDpi xmlns="" xmlns:a14="http://schemas.microsoft.com/office/drawing/2010/main" val="0"/>
+                <a14:useLocalDpi xmlns:a14="http://schemas.microsoft.com/office/drawing/2010/main" val="0"/>
               </a:ext>
             </a:extLst>
           </a:blip>
@@ -5944,14 +5950,14 @@
           </a:ln>
           <a:extLst>
             <a:ext uri="{909E8E84-426E-40DD-AFC4-6F175D3DCCD1}">
-              <a14:hiddenFill xmlns="" xmlns:a14="http://schemas.microsoft.com/office/drawing/2010/main">
+              <a14:hiddenFill xmlns:a14="http://schemas.microsoft.com/office/drawing/2010/main">
                 <a:solidFill>
                   <a:schemeClr val="accent1"/>
                 </a:solidFill>
               </a14:hiddenFill>
             </a:ext>
             <a:ext uri="{91240B29-F687-4F45-9708-019B960494DF}">
-              <a14:hiddenLine xmlns="" xmlns:a14="http://schemas.microsoft.com/office/drawing/2010/main" w="9525">
+              <a14:hiddenLine xmlns:a14="http://schemas.microsoft.com/office/drawing/2010/main" w="9525">
                 <a:solidFill>
                   <a:schemeClr val="tx1"/>
                 </a:solidFill>
@@ -6087,7 +6093,7 @@
     </p:spTree>
     <p:extLst>
       <p:ext uri="{BB962C8B-B14F-4D97-AF65-F5344CB8AC3E}">
-        <p14:creationId xmlns="" xmlns:p14="http://schemas.microsoft.com/office/powerpoint/2010/main" val="3608842146"/>
+        <p14:creationId xmlns:p14="http://schemas.microsoft.com/office/powerpoint/2010/main" val="3608842146"/>
       </p:ext>
     </p:extLst>
   </p:cSld>

</xml_diff>

<commit_message>
Se actualiza con nuevos plugins de GRUNT (Clean, COPY) Se indica la instalación de JADE para plantillas HTML Se suma una sección de configuracón rápida del ambiente
</commit_message>
<xml_diff>
--- a/bitacora_desarrollo.pptx
+++ b/bitacora_desarrollo.pptx
@@ -8,15 +8,16 @@
     <p:sldId id="259" r:id="rId2"/>
     <p:sldId id="261" r:id="rId3"/>
     <p:sldId id="260" r:id="rId4"/>
-    <p:sldId id="262" r:id="rId5"/>
-    <p:sldId id="264" r:id="rId6"/>
-    <p:sldId id="265" r:id="rId7"/>
-    <p:sldId id="266" r:id="rId8"/>
-    <p:sldId id="267" r:id="rId9"/>
-    <p:sldId id="268" r:id="rId10"/>
-    <p:sldId id="269" r:id="rId11"/>
-    <p:sldId id="270" r:id="rId12"/>
-    <p:sldId id="263" r:id="rId13"/>
+    <p:sldId id="271" r:id="rId5"/>
+    <p:sldId id="262" r:id="rId6"/>
+    <p:sldId id="264" r:id="rId7"/>
+    <p:sldId id="265" r:id="rId8"/>
+    <p:sldId id="266" r:id="rId9"/>
+    <p:sldId id="267" r:id="rId10"/>
+    <p:sldId id="268" r:id="rId11"/>
+    <p:sldId id="269" r:id="rId12"/>
+    <p:sldId id="270" r:id="rId13"/>
+    <p:sldId id="263" r:id="rId14"/>
   </p:sldIdLst>
   <p:sldSz cx="9144000" cy="6858000" type="screen4x3"/>
   <p:notesSz cx="6858000" cy="9144000"/>
@@ -307,7 +308,7 @@
             <a:fld id="{7A847CFC-816F-41D0-AAC0-9BF4FEBC753E}" type="datetimeFigureOut">
               <a:rPr lang="es-ES" smtClean="0"/>
               <a:pPr/>
-              <a:t>26/10/2015</a:t>
+              <a:t>27/10/2015</a:t>
             </a:fld>
             <a:endParaRPr lang="es-ES"/>
           </a:p>
@@ -509,7 +510,7 @@
             <a:fld id="{7A847CFC-816F-41D0-AAC0-9BF4FEBC753E}" type="datetimeFigureOut">
               <a:rPr lang="es-ES" smtClean="0"/>
               <a:pPr/>
-              <a:t>26/10/2015</a:t>
+              <a:t>27/10/2015</a:t>
             </a:fld>
             <a:endParaRPr lang="es-ES"/>
           </a:p>
@@ -686,7 +687,7 @@
             <a:fld id="{7A847CFC-816F-41D0-AAC0-9BF4FEBC753E}" type="datetimeFigureOut">
               <a:rPr lang="es-ES" smtClean="0"/>
               <a:pPr/>
-              <a:t>26/10/2015</a:t>
+              <a:t>27/10/2015</a:t>
             </a:fld>
             <a:endParaRPr lang="es-ES"/>
           </a:p>
@@ -853,7 +854,7 @@
             <a:fld id="{7A847CFC-816F-41D0-AAC0-9BF4FEBC753E}" type="datetimeFigureOut">
               <a:rPr lang="es-ES" smtClean="0"/>
               <a:pPr/>
-              <a:t>26/10/2015</a:t>
+              <a:t>27/10/2015</a:t>
             </a:fld>
             <a:endParaRPr lang="es-ES"/>
           </a:p>
@@ -1103,7 +1104,7 @@
             <a:fld id="{7A847CFC-816F-41D0-AAC0-9BF4FEBC753E}" type="datetimeFigureOut">
               <a:rPr lang="es-ES" smtClean="0"/>
               <a:pPr/>
-              <a:t>26/10/2015</a:t>
+              <a:t>27/10/2015</a:t>
             </a:fld>
             <a:endParaRPr lang="es-ES"/>
           </a:p>
@@ -1423,7 +1424,7 @@
             <a:fld id="{7A847CFC-816F-41D0-AAC0-9BF4FEBC753E}" type="datetimeFigureOut">
               <a:rPr lang="es-ES" smtClean="0"/>
               <a:pPr/>
-              <a:t>26/10/2015</a:t>
+              <a:t>27/10/2015</a:t>
             </a:fld>
             <a:endParaRPr lang="es-ES"/>
           </a:p>
@@ -1891,7 +1892,7 @@
             <a:fld id="{7A847CFC-816F-41D0-AAC0-9BF4FEBC753E}" type="datetimeFigureOut">
               <a:rPr lang="es-ES" smtClean="0"/>
               <a:pPr/>
-              <a:t>26/10/2015</a:t>
+              <a:t>27/10/2015</a:t>
             </a:fld>
             <a:endParaRPr lang="es-ES"/>
           </a:p>
@@ -2041,7 +2042,7 @@
             <a:fld id="{7A847CFC-816F-41D0-AAC0-9BF4FEBC753E}" type="datetimeFigureOut">
               <a:rPr lang="es-ES" smtClean="0"/>
               <a:pPr/>
-              <a:t>26/10/2015</a:t>
+              <a:t>27/10/2015</a:t>
             </a:fld>
             <a:endParaRPr lang="es-ES"/>
           </a:p>
@@ -2133,7 +2134,7 @@
             <a:fld id="{7A847CFC-816F-41D0-AAC0-9BF4FEBC753E}" type="datetimeFigureOut">
               <a:rPr lang="es-ES" smtClean="0"/>
               <a:pPr/>
-              <a:t>26/10/2015</a:t>
+              <a:t>27/10/2015</a:t>
             </a:fld>
             <a:endParaRPr lang="es-ES"/>
           </a:p>
@@ -2409,7 +2410,7 @@
             <a:fld id="{7A847CFC-816F-41D0-AAC0-9BF4FEBC753E}" type="datetimeFigureOut">
               <a:rPr lang="es-ES" smtClean="0"/>
               <a:pPr/>
-              <a:t>26/10/2015</a:t>
+              <a:t>27/10/2015</a:t>
             </a:fld>
             <a:endParaRPr lang="es-ES"/>
           </a:p>
@@ -2716,7 +2717,7 @@
             <a:fld id="{7A847CFC-816F-41D0-AAC0-9BF4FEBC753E}" type="datetimeFigureOut">
               <a:rPr lang="es-ES" smtClean="0"/>
               <a:pPr/>
-              <a:t>26/10/2015</a:t>
+              <a:t>27/10/2015</a:t>
             </a:fld>
             <a:endParaRPr lang="es-ES"/>
           </a:p>
@@ -3016,7 +3017,7 @@
             <a:fld id="{7A847CFC-816F-41D0-AAC0-9BF4FEBC753E}" type="datetimeFigureOut">
               <a:rPr lang="es-ES" smtClean="0"/>
               <a:pPr/>
-              <a:t>26/10/2015</a:t>
+              <a:t>27/10/2015</a:t>
             </a:fld>
             <a:endParaRPr lang="es-ES"/>
           </a:p>
@@ -3501,7 +3502,7 @@
         </p:nvGraphicFramePr>
         <p:xfrm>
           <a:off x="611560" y="1556794"/>
-          <a:ext cx="7992889" cy="5176822"/>
+          <a:ext cx="7992889" cy="4573111"/>
         </p:xfrm>
         <a:graphic>
           <a:graphicData uri="http://schemas.openxmlformats.org/drawingml/2006/table">
@@ -3514,7 +3515,7 @@
                 <a:gridCol w="4680520"/>
                 <a:gridCol w="1584177"/>
               </a:tblGrid>
-              <a:tr h="396165">
+              <a:tr h="144014">
                 <a:tc>
                   <a:txBody>
                     <a:bodyPr/>
@@ -3570,10 +3571,9 @@
                         <a:defRPr/>
                       </a:pPr>
                       <a:r>
-                        <a:rPr lang="es-VE" sz="1800" smtClean="0"/>
+                        <a:rPr lang="es-VE" sz="1600" dirty="0" smtClean="0"/>
                         <a:t>NODE (NPM)</a:t>
                       </a:r>
-                      <a:endParaRPr lang="es-VE" smtClean="0"/>
                     </a:p>
                   </a:txBody>
                   <a:tcPr/>
@@ -3601,10 +3601,9 @@
                         <a:defRPr/>
                       </a:pPr>
                       <a:r>
-                        <a:rPr lang="es-VE" sz="1800" dirty="0" smtClean="0"/>
+                        <a:rPr lang="es-VE" sz="1600" dirty="0" smtClean="0"/>
                         <a:t>manejador de paquetes</a:t>
                       </a:r>
-                      <a:endParaRPr lang="es-VE" dirty="0" smtClean="0"/>
                     </a:p>
                   </a:txBody>
                   <a:tcPr/>
@@ -3615,26 +3614,26 @@
                     <a:lstStyle/>
                     <a:p>
                       <a:r>
-                        <a:rPr lang="es-VE" smtClean="0"/>
+                        <a:rPr lang="es-VE" sz="1600" smtClean="0"/>
                         <a:t>Instalador</a:t>
                       </a:r>
-                      <a:endParaRPr lang="es-VE" dirty="0"/>
+                      <a:endParaRPr lang="es-VE" sz="1600" dirty="0"/>
                     </a:p>
                   </a:txBody>
                   <a:tcPr/>
                 </a:tc>
               </a:tr>
-              <a:tr h="432208">
+              <a:tr h="318437">
                 <a:tc>
                   <a:txBody>
                     <a:bodyPr/>
                     <a:lstStyle/>
                     <a:p>
                       <a:r>
-                        <a:rPr lang="es-VE" dirty="0" smtClean="0"/>
+                        <a:rPr lang="es-VE" sz="1600" dirty="0" smtClean="0"/>
                         <a:t>Cliente GIT</a:t>
                       </a:r>
-                      <a:endParaRPr lang="es-VE" dirty="0"/>
+                      <a:endParaRPr lang="es-VE" sz="1600" dirty="0"/>
                     </a:p>
                   </a:txBody>
                   <a:tcPr/>
@@ -3645,10 +3644,10 @@
                     <a:lstStyle/>
                     <a:p>
                       <a:r>
-                        <a:rPr lang="es-VE" dirty="0" smtClean="0"/>
+                        <a:rPr lang="es-VE" sz="1600" dirty="0" smtClean="0"/>
                         <a:t>recomendado MSGIT</a:t>
                       </a:r>
-                      <a:endParaRPr lang="es-VE" dirty="0"/>
+                      <a:endParaRPr lang="es-VE" sz="1600" dirty="0"/>
                     </a:p>
                   </a:txBody>
                   <a:tcPr/>
@@ -3676,7 +3675,7 @@
                         <a:defRPr/>
                       </a:pPr>
                       <a:r>
-                        <a:rPr lang="es-VE" dirty="0" smtClean="0"/>
+                        <a:rPr lang="es-VE" sz="1600" dirty="0" smtClean="0"/>
                         <a:t>Instalador</a:t>
                       </a:r>
                     </a:p>
@@ -3684,7 +3683,7 @@
                   <a:tcPr/>
                 </a:tc>
               </a:tr>
-              <a:tr h="396165">
+              <a:tr h="199181">
                 <a:tc>
                   <a:txBody>
                     <a:bodyPr/>
@@ -3708,13 +3707,10 @@
                         <a:defRPr/>
                       </a:pPr>
                       <a:r>
-                        <a:rPr lang="es-VE" sz="1800" dirty="0" err="1" smtClean="0"/>
+                        <a:rPr lang="es-VE" sz="1600" dirty="0" err="1" smtClean="0"/>
                         <a:t>Bower</a:t>
                       </a:r>
-                      <a:endParaRPr lang="es-VE" sz="1800" dirty="0" smtClean="0"/>
-                    </a:p>
-                    <a:p>
-                      <a:endParaRPr lang="es-VE" dirty="0"/>
+                      <a:endParaRPr lang="es-VE" sz="1600" dirty="0"/>
                     </a:p>
                   </a:txBody>
                   <a:tcPr/>
@@ -3742,10 +3738,9 @@
                         <a:defRPr/>
                       </a:pPr>
                       <a:r>
-                        <a:rPr lang="es-VE" sz="1800" dirty="0" smtClean="0"/>
+                        <a:rPr lang="es-VE" sz="1600" dirty="0" smtClean="0"/>
                         <a:t>manejador de dependencias de librerías FRONT</a:t>
                       </a:r>
-                      <a:endParaRPr lang="es-VE" dirty="0" smtClean="0"/>
                     </a:p>
                   </a:txBody>
                   <a:tcPr/>
@@ -3756,10 +3751,10 @@
                     <a:lstStyle/>
                     <a:p>
                       <a:r>
-                        <a:rPr lang="es-VE" baseline="0" dirty="0" smtClean="0"/>
+                        <a:rPr lang="es-VE" sz="1600" baseline="0" dirty="0" smtClean="0"/>
                         <a:t>NPM</a:t>
                       </a:r>
-                      <a:endParaRPr lang="es-VE" dirty="0"/>
+                      <a:endParaRPr lang="es-VE" sz="1600" dirty="0"/>
                     </a:p>
                   </a:txBody>
                   <a:tcPr/>
@@ -3772,10 +3767,10 @@
                     <a:lstStyle/>
                     <a:p>
                       <a:r>
-                        <a:rPr lang="es-VE" dirty="0" err="1" smtClean="0"/>
+                        <a:rPr lang="es-VE" sz="1600" dirty="0" err="1" smtClean="0"/>
                         <a:t>LessCSS</a:t>
                       </a:r>
-                      <a:endParaRPr lang="es-VE" dirty="0"/>
+                      <a:endParaRPr lang="es-VE" sz="1600" dirty="0"/>
                     </a:p>
                   </a:txBody>
                   <a:tcPr/>
@@ -3786,24 +3781,24 @@
                     <a:lstStyle/>
                     <a:p>
                       <a:r>
-                        <a:rPr lang="es-VE" dirty="0" smtClean="0"/>
+                        <a:rPr lang="es-VE" sz="1600" dirty="0" smtClean="0"/>
                         <a:t>Librería para extensión de CSS </a:t>
                       </a:r>
                       <a:r>
-                        <a:rPr lang="es-VE" sz="1100" dirty="0" smtClean="0"/>
+                        <a:rPr lang="es-VE" sz="1050" dirty="0" smtClean="0"/>
                         <a:t>(</a:t>
                       </a:r>
                       <a:r>
-                        <a:rPr lang="es-VE" sz="1100" dirty="0" smtClean="0">
+                        <a:rPr lang="es-VE" sz="1050" dirty="0" smtClean="0">
                           <a:hlinkClick r:id="rId2"/>
                         </a:rPr>
                         <a:t>http://lesscss.org</a:t>
                       </a:r>
                       <a:r>
-                        <a:rPr lang="es-VE" sz="1100" dirty="0" smtClean="0"/>
+                        <a:rPr lang="es-VE" sz="1050" dirty="0" smtClean="0"/>
                         <a:t>/)</a:t>
                       </a:r>
-                      <a:endParaRPr lang="es-VE" dirty="0"/>
+                      <a:endParaRPr lang="es-VE" sz="1600" dirty="0"/>
                     </a:p>
                   </a:txBody>
                   <a:tcPr/>
@@ -3831,10 +3826,10 @@
                         <a:defRPr/>
                       </a:pPr>
                       <a:r>
-                        <a:rPr lang="es-VE" baseline="0" dirty="0" smtClean="0"/>
+                        <a:rPr lang="es-VE" sz="1600" baseline="0" dirty="0" smtClean="0"/>
                         <a:t>NPM</a:t>
                       </a:r>
-                      <a:endParaRPr lang="es-VE" dirty="0" smtClean="0"/>
+                      <a:endParaRPr lang="es-VE" sz="1600" dirty="0" smtClean="0"/>
                     </a:p>
                   </a:txBody>
                   <a:tcPr/>
@@ -3847,10 +3842,10 @@
                     <a:lstStyle/>
                     <a:p>
                       <a:r>
-                        <a:rPr lang="es-VE" dirty="0" err="1" smtClean="0"/>
+                        <a:rPr lang="es-VE" sz="1600" dirty="0" err="1" smtClean="0"/>
                         <a:t>Browserify</a:t>
                       </a:r>
-                      <a:endParaRPr lang="es-VE" dirty="0"/>
+                      <a:endParaRPr lang="es-VE" sz="1600" dirty="0"/>
                     </a:p>
                   </a:txBody>
                   <a:tcPr/>
@@ -3861,10 +3856,10 @@
                     <a:lstStyle/>
                     <a:p>
                       <a:r>
-                        <a:rPr lang="es-VE" dirty="0" smtClean="0"/>
+                        <a:rPr lang="es-VE" sz="1600" dirty="0" smtClean="0"/>
                         <a:t>Librería para la programación web modular</a:t>
                       </a:r>
-                      <a:endParaRPr lang="es-VE" dirty="0"/>
+                      <a:endParaRPr lang="es-VE" sz="1600" dirty="0"/>
                     </a:p>
                   </a:txBody>
                   <a:tcPr/>
@@ -3892,26 +3887,26 @@
                         <a:defRPr/>
                       </a:pPr>
                       <a:r>
-                        <a:rPr lang="es-VE" baseline="0" dirty="0" smtClean="0"/>
+                        <a:rPr lang="es-VE" sz="1600" baseline="0" dirty="0" smtClean="0"/>
                         <a:t>NPM</a:t>
                       </a:r>
-                      <a:endParaRPr lang="es-VE" dirty="0" smtClean="0"/>
+                      <a:endParaRPr lang="es-VE" sz="1600" dirty="0" smtClean="0"/>
                     </a:p>
                   </a:txBody>
                   <a:tcPr/>
                 </a:tc>
               </a:tr>
-              <a:tr h="683793">
+              <a:tr h="359965">
                 <a:tc>
                   <a:txBody>
                     <a:bodyPr/>
                     <a:lstStyle/>
                     <a:p>
                       <a:r>
-                        <a:rPr lang="es-VE" dirty="0" err="1" smtClean="0"/>
+                        <a:rPr lang="es-VE" sz="1600" dirty="0" err="1" smtClean="0"/>
                         <a:t>Grunt</a:t>
                       </a:r>
-                      <a:endParaRPr lang="es-VE" dirty="0"/>
+                      <a:endParaRPr lang="es-VE" sz="1600" dirty="0"/>
                     </a:p>
                   </a:txBody>
                   <a:tcPr/>
@@ -3922,14 +3917,14 @@
                     <a:lstStyle/>
                     <a:p>
                       <a:r>
-                        <a:rPr lang="es-VE" dirty="0" smtClean="0"/>
-                        <a:t>Librería para la automatización de tareas de </a:t>
+                        <a:rPr lang="es-VE" sz="1600" dirty="0" smtClean="0"/>
+                        <a:t>Librería para la automatización de </a:t>
                       </a:r>
                       <a:r>
-                        <a:rPr lang="es-VE" dirty="0" err="1" smtClean="0"/>
-                        <a:t>deployment</a:t>
+                        <a:rPr lang="es-VE" sz="1600" dirty="0" smtClean="0"/>
+                        <a:t>tareas</a:t>
                       </a:r>
-                      <a:endParaRPr lang="es-VE" dirty="0"/>
+                      <a:endParaRPr lang="es-VE" sz="1600" dirty="0"/>
                     </a:p>
                   </a:txBody>
                   <a:tcPr/>
@@ -3957,10 +3952,10 @@
                         <a:defRPr/>
                       </a:pPr>
                       <a:r>
-                        <a:rPr lang="es-VE" baseline="0" dirty="0" smtClean="0"/>
+                        <a:rPr lang="es-VE" sz="1600" baseline="0" dirty="0" smtClean="0"/>
                         <a:t>NPM</a:t>
                       </a:r>
-                      <a:endParaRPr lang="es-VE" dirty="0" smtClean="0"/>
+                      <a:endParaRPr lang="es-VE" sz="1600" dirty="0" smtClean="0"/>
                     </a:p>
                   </a:txBody>
                   <a:tcPr/>
@@ -3973,12 +3968,12 @@
                     <a:lstStyle/>
                     <a:p>
                       <a:r>
-                        <a:rPr lang="en-US" dirty="0" err="1" smtClean="0">
+                        <a:rPr lang="en-US" sz="1600" dirty="0" err="1" smtClean="0">
                           <a:hlinkClick r:id="rId3"/>
                         </a:rPr>
                         <a:t>UglifyJS</a:t>
                       </a:r>
-                      <a:endParaRPr lang="es-VE" dirty="0"/>
+                      <a:endParaRPr lang="es-VE" sz="1600" dirty="0"/>
                     </a:p>
                   </a:txBody>
                   <a:tcPr/>
@@ -3989,18 +3984,18 @@
                     <a:lstStyle/>
                     <a:p>
                       <a:r>
-                        <a:rPr lang="en-US" dirty="0" err="1" smtClean="0"/>
+                        <a:rPr lang="en-US" sz="1600" dirty="0" err="1" smtClean="0"/>
                         <a:t>Javascript</a:t>
                       </a:r>
                       <a:r>
-                        <a:rPr lang="en-US" dirty="0" smtClean="0"/>
+                        <a:rPr lang="en-US" sz="1600" dirty="0" smtClean="0"/>
                         <a:t> </a:t>
                       </a:r>
                       <a:r>
-                        <a:rPr lang="en-US" dirty="0" err="1" smtClean="0"/>
+                        <a:rPr lang="en-US" sz="1600" dirty="0" err="1" smtClean="0"/>
                         <a:t>minification</a:t>
                       </a:r>
-                      <a:endParaRPr lang="es-VE" dirty="0"/>
+                      <a:endParaRPr lang="es-VE" sz="1600" dirty="0"/>
                     </a:p>
                   </a:txBody>
                   <a:tcPr/>
@@ -4028,10 +4023,10 @@
                         <a:defRPr/>
                       </a:pPr>
                       <a:r>
-                        <a:rPr lang="es-VE" baseline="0" dirty="0" smtClean="0"/>
+                        <a:rPr lang="es-VE" sz="1600" baseline="0" dirty="0" smtClean="0"/>
                         <a:t>NPM</a:t>
                       </a:r>
-                      <a:endParaRPr lang="es-VE" dirty="0" smtClean="0"/>
+                      <a:endParaRPr lang="es-VE" sz="1600" dirty="0" smtClean="0"/>
                     </a:p>
                   </a:txBody>
                   <a:tcPr/>
@@ -4044,10 +4039,10 @@
                     <a:lstStyle/>
                     <a:p>
                       <a:r>
-                        <a:rPr lang="en-US" dirty="0" err="1" smtClean="0"/>
+                        <a:rPr lang="en-US" sz="1600" dirty="0" err="1" smtClean="0"/>
                         <a:t>Jshint</a:t>
                       </a:r>
-                      <a:endParaRPr lang="es-VE" dirty="0"/>
+                      <a:endParaRPr lang="es-VE" sz="1600" dirty="0"/>
                     </a:p>
                   </a:txBody>
                   <a:tcPr/>
@@ -4058,22 +4053,22 @@
                     <a:lstStyle/>
                     <a:p>
                       <a:r>
-                        <a:rPr lang="en-US" dirty="0" err="1" smtClean="0"/>
+                        <a:rPr lang="en-US" sz="1600" dirty="0" err="1" smtClean="0"/>
                         <a:t>Valida</a:t>
                       </a:r>
                       <a:r>
-                        <a:rPr lang="en-US" dirty="0" smtClean="0"/>
+                        <a:rPr lang="en-US" sz="1600" dirty="0" smtClean="0"/>
                         <a:t> el </a:t>
                       </a:r>
                       <a:r>
-                        <a:rPr lang="en-US" dirty="0" err="1" smtClean="0"/>
+                        <a:rPr lang="en-US" sz="1600" dirty="0" err="1" smtClean="0"/>
                         <a:t>codigo</a:t>
                       </a:r>
                       <a:r>
-                        <a:rPr lang="en-US" dirty="0" smtClean="0"/>
+                        <a:rPr lang="en-US" sz="1600" dirty="0" smtClean="0"/>
                         <a:t> JavaScript</a:t>
                       </a:r>
-                      <a:endParaRPr lang="es-VE" dirty="0"/>
+                      <a:endParaRPr lang="es-VE" sz="1600" dirty="0"/>
                     </a:p>
                   </a:txBody>
                   <a:tcPr/>
@@ -4101,10 +4096,10 @@
                         <a:defRPr/>
                       </a:pPr>
                       <a:r>
-                        <a:rPr lang="es-VE" baseline="0" dirty="0" smtClean="0"/>
+                        <a:rPr lang="es-VE" sz="1600" baseline="0" dirty="0" smtClean="0"/>
                         <a:t>NPM</a:t>
                       </a:r>
-                      <a:endParaRPr lang="es-VE" dirty="0" smtClean="0"/>
+                      <a:endParaRPr lang="es-VE" sz="1600" dirty="0" smtClean="0"/>
                     </a:p>
                   </a:txBody>
                   <a:tcPr/>
@@ -4117,10 +4112,10 @@
                     <a:lstStyle/>
                     <a:p>
                       <a:r>
-                        <a:rPr lang="es-VE" sz="1800" dirty="0" err="1" smtClean="0"/>
+                        <a:rPr lang="es-VE" sz="1600" dirty="0" err="1" smtClean="0"/>
                         <a:t>Brackets</a:t>
                       </a:r>
-                      <a:endParaRPr lang="es-VE" dirty="0"/>
+                      <a:endParaRPr lang="es-VE" sz="1600" dirty="0"/>
                     </a:p>
                   </a:txBody>
                   <a:tcPr/>
@@ -4131,10 +4126,10 @@
                     <a:lstStyle/>
                     <a:p>
                       <a:r>
-                        <a:rPr lang="es-VE" sz="1800" dirty="0" smtClean="0"/>
+                        <a:rPr lang="es-VE" sz="1600" dirty="0" smtClean="0"/>
                         <a:t>editor de texto para desarrollo web</a:t>
                       </a:r>
-                      <a:endParaRPr lang="es-VE" dirty="0"/>
+                      <a:endParaRPr lang="es-VE" sz="1600" dirty="0"/>
                     </a:p>
                   </a:txBody>
                   <a:tcPr/>
@@ -4162,7 +4157,7 @@
                         <a:defRPr/>
                       </a:pPr>
                       <a:r>
-                        <a:rPr lang="es-VE" dirty="0" smtClean="0"/>
+                        <a:rPr lang="es-VE" sz="1600" dirty="0" smtClean="0"/>
                         <a:t>Instalador</a:t>
                       </a:r>
                     </a:p>
@@ -4177,10 +4172,10 @@
                     <a:lstStyle/>
                     <a:p>
                       <a:r>
-                        <a:rPr lang="es-VE" dirty="0" err="1" smtClean="0"/>
+                        <a:rPr lang="es-VE" sz="1600" dirty="0" err="1" smtClean="0"/>
                         <a:t>Emmet</a:t>
                       </a:r>
-                      <a:endParaRPr lang="es-VE" dirty="0"/>
+                      <a:endParaRPr lang="es-VE" sz="1600" dirty="0"/>
                     </a:p>
                   </a:txBody>
                   <a:tcPr/>
@@ -4191,14 +4186,18 @@
                     <a:lstStyle/>
                     <a:p>
                       <a:r>
-                        <a:rPr lang="es-VE" dirty="0" smtClean="0"/>
+                        <a:rPr lang="es-VE" sz="1600" dirty="0" smtClean="0"/>
                         <a:t>Extensión</a:t>
                       </a:r>
                       <a:r>
-                        <a:rPr lang="es-VE" baseline="0" dirty="0" smtClean="0"/>
-                        <a:t> recomendada para la edición de HTML y CSS (no obligatorio)</a:t>
+                        <a:rPr lang="es-VE" sz="1600" baseline="0" dirty="0" smtClean="0"/>
+                        <a:t> recomendada para la edición de </a:t>
                       </a:r>
-                      <a:endParaRPr lang="es-VE" dirty="0"/>
+                      <a:r>
+                        <a:rPr lang="es-VE" sz="1600" baseline="0" dirty="0" smtClean="0"/>
+                        <a:t>HTML</a:t>
+                      </a:r>
+                      <a:endParaRPr lang="es-VE" sz="1600" dirty="0"/>
                     </a:p>
                   </a:txBody>
                   <a:tcPr/>
@@ -4225,7 +4224,64 @@
                         <a:tabLst/>
                         <a:defRPr/>
                       </a:pPr>
-                      <a:endParaRPr lang="es-VE" dirty="0" smtClean="0"/>
+                      <a:endParaRPr lang="es-VE" sz="1600" dirty="0" smtClean="0"/>
+                    </a:p>
+                  </a:txBody>
+                  <a:tcPr/>
+                </a:tc>
+              </a:tr>
+              <a:tr h="396165">
+                <a:tc>
+                  <a:txBody>
+                    <a:bodyPr/>
+                    <a:lstStyle/>
+                    <a:p>
+                      <a:r>
+                        <a:rPr lang="es-VE" sz="1600" dirty="0" smtClean="0"/>
+                        <a:t>Jade</a:t>
+                      </a:r>
+                      <a:endParaRPr lang="es-VE" sz="1600" dirty="0"/>
+                    </a:p>
+                  </a:txBody>
+                  <a:tcPr/>
+                </a:tc>
+                <a:tc>
+                  <a:txBody>
+                    <a:bodyPr/>
+                    <a:lstStyle/>
+                    <a:p>
+                      <a:r>
+                        <a:rPr lang="es-VE" sz="1600" dirty="0" smtClean="0"/>
+                        <a:t>Manejo de plantillas HTML</a:t>
+                      </a:r>
+                      <a:endParaRPr lang="es-VE" sz="1600" dirty="0"/>
+                    </a:p>
+                  </a:txBody>
+                  <a:tcPr/>
+                </a:tc>
+                <a:tc>
+                  <a:txBody>
+                    <a:bodyPr/>
+                    <a:lstStyle/>
+                    <a:p>
+                      <a:pPr marL="0" marR="0" indent="0" algn="l" defTabSz="914400" rtl="0" eaLnBrk="1" fontAlgn="auto" latinLnBrk="0" hangingPunct="1">
+                        <a:lnSpc>
+                          <a:spcPct val="100000"/>
+                        </a:lnSpc>
+                        <a:spcBef>
+                          <a:spcPts val="0"/>
+                        </a:spcBef>
+                        <a:spcAft>
+                          <a:spcPts val="0"/>
+                        </a:spcAft>
+                        <a:buClrTx/>
+                        <a:buSzTx/>
+                        <a:buFontTx/>
+                        <a:buNone/>
+                        <a:tabLst/>
+                        <a:defRPr/>
+                      </a:pPr>
+                      <a:endParaRPr lang="es-VE" sz="1600" dirty="0" smtClean="0"/>
                     </a:p>
                   </a:txBody>
                   <a:tcPr/>
@@ -4238,7 +4294,7 @@
     </p:spTree>
     <p:extLst>
       <p:ext uri="{BB962C8B-B14F-4D97-AF65-F5344CB8AC3E}">
-        <p14:creationId xmlns:p14="http://schemas.microsoft.com/office/powerpoint/2010/main" val="2585810778"/>
+        <p14:creationId xmlns:p14="http://schemas.microsoft.com/office/powerpoint/2010/main" xmlns="" val="2585810778"/>
       </p:ext>
     </p:extLst>
   </p:cSld>
@@ -4256,6 +4312,94 @@
 </file>
 
 <file path=ppt/slides/slide10.xml><?xml version="1.0" encoding="utf-8"?>
+<p:sld xmlns:a="http://schemas.openxmlformats.org/drawingml/2006/main" xmlns:r="http://schemas.openxmlformats.org/officeDocument/2006/relationships" xmlns:p="http://schemas.openxmlformats.org/presentationml/2006/main">
+  <p:cSld>
+    <p:spTree>
+      <p:nvGrpSpPr>
+        <p:cNvPr id="1" name=""/>
+        <p:cNvGrpSpPr/>
+        <p:nvPr/>
+      </p:nvGrpSpPr>
+      <p:grpSpPr>
+        <a:xfrm>
+          <a:off x="0" y="0"/>
+          <a:ext cx="0" cy="0"/>
+          <a:chOff x="0" y="0"/>
+          <a:chExt cx="0" cy="0"/>
+        </a:xfrm>
+      </p:grpSpPr>
+      <p:sp>
+        <p:nvSpPr>
+          <p:cNvPr id="2" name="1 Título"/>
+          <p:cNvSpPr>
+            <a:spLocks noGrp="1"/>
+          </p:cNvSpPr>
+          <p:nvPr>
+            <p:ph type="title"/>
+          </p:nvPr>
+        </p:nvSpPr>
+        <p:spPr/>
+        <p:txBody>
+          <a:bodyPr/>
+          <a:lstStyle/>
+          <a:p>
+            <a:r>
+              <a:rPr lang="es-VE" dirty="0" smtClean="0"/>
+              <a:t>Sumar </a:t>
+            </a:r>
+            <a:r>
+              <a:rPr lang="es-VE" dirty="0" err="1" smtClean="0"/>
+              <a:t>grunt</a:t>
+            </a:r>
+            <a:r>
+              <a:rPr lang="es-VE" dirty="0" smtClean="0"/>
+              <a:t> al proyecto</a:t>
+            </a:r>
+            <a:endParaRPr lang="es-VE" dirty="0"/>
+          </a:p>
+        </p:txBody>
+      </p:sp>
+      <p:pic>
+        <p:nvPicPr>
+          <p:cNvPr id="22530" name="Picture 2"/>
+          <p:cNvPicPr>
+            <a:picLocks noChangeAspect="1" noChangeArrowheads="1"/>
+          </p:cNvPicPr>
+          <p:nvPr/>
+        </p:nvPicPr>
+        <p:blipFill>
+          <a:blip r:embed="rId2" cstate="print"/>
+          <a:srcRect/>
+          <a:stretch>
+            <a:fillRect/>
+          </a:stretch>
+        </p:blipFill>
+        <p:spPr bwMode="auto">
+          <a:xfrm>
+            <a:off x="1331640" y="2132856"/>
+            <a:ext cx="6305550" cy="3848100"/>
+          </a:xfrm>
+          <a:prstGeom prst="rect">
+            <a:avLst/>
+          </a:prstGeom>
+          <a:noFill/>
+          <a:ln w="9525">
+            <a:noFill/>
+            <a:miter lim="800000"/>
+            <a:headEnd/>
+            <a:tailEnd/>
+          </a:ln>
+        </p:spPr>
+      </p:pic>
+    </p:spTree>
+  </p:cSld>
+  <p:clrMapOvr>
+    <a:masterClrMapping/>
+  </p:clrMapOvr>
+</p:sld>
+</file>
+
+<file path=ppt/slides/slide11.xml><?xml version="1.0" encoding="utf-8"?>
 <p:sld xmlns:a="http://schemas.openxmlformats.org/drawingml/2006/main" xmlns:r="http://schemas.openxmlformats.org/officeDocument/2006/relationships" xmlns:p="http://schemas.openxmlformats.org/presentationml/2006/main">
   <p:cSld>
     <p:spTree>
@@ -4481,111 +4625,6 @@
 </p:sld>
 </file>
 
-<file path=ppt/slides/slide11.xml><?xml version="1.0" encoding="utf-8"?>
-<p:sld xmlns:a="http://schemas.openxmlformats.org/drawingml/2006/main" xmlns:r="http://schemas.openxmlformats.org/officeDocument/2006/relationships" xmlns:p="http://schemas.openxmlformats.org/presentationml/2006/main">
-  <p:cSld>
-    <p:spTree>
-      <p:nvGrpSpPr>
-        <p:cNvPr id="1" name=""/>
-        <p:cNvGrpSpPr/>
-        <p:nvPr/>
-      </p:nvGrpSpPr>
-      <p:grpSpPr>
-        <a:xfrm>
-          <a:off x="0" y="0"/>
-          <a:ext cx="0" cy="0"/>
-          <a:chOff x="0" y="0"/>
-          <a:chExt cx="0" cy="0"/>
-        </a:xfrm>
-      </p:grpSpPr>
-      <p:sp>
-        <p:nvSpPr>
-          <p:cNvPr id="2" name="1 Título"/>
-          <p:cNvSpPr>
-            <a:spLocks noGrp="1"/>
-          </p:cNvSpPr>
-          <p:nvPr>
-            <p:ph type="title"/>
-          </p:nvPr>
-        </p:nvSpPr>
-        <p:spPr/>
-        <p:txBody>
-          <a:bodyPr/>
-          <a:lstStyle/>
-          <a:p>
-            <a:r>
-              <a:rPr lang="es-VE" dirty="0" err="1" smtClean="0"/>
-              <a:t>DEPLOYdel</a:t>
-            </a:r>
-            <a:r>
-              <a:rPr lang="es-VE" dirty="0" smtClean="0"/>
-              <a:t> SITE con GRUNT</a:t>
-            </a:r>
-            <a:endParaRPr lang="es-VE" dirty="0"/>
-          </a:p>
-        </p:txBody>
-      </p:sp>
-      <p:sp>
-        <p:nvSpPr>
-          <p:cNvPr id="3" name="2 Marcador de contenido"/>
-          <p:cNvSpPr>
-            <a:spLocks noGrp="1"/>
-          </p:cNvSpPr>
-          <p:nvPr>
-            <p:ph idx="1"/>
-          </p:nvPr>
-        </p:nvSpPr>
-        <p:spPr/>
-        <p:txBody>
-          <a:bodyPr/>
-          <a:lstStyle/>
-          <a:p>
-            <a:r>
-              <a:rPr lang="es-VE" dirty="0" smtClean="0"/>
-              <a:t>Crear y Editar el archivo Gruntfile.js, ver documentación de GRUNT.</a:t>
-            </a:r>
-          </a:p>
-          <a:p>
-            <a:r>
-              <a:rPr lang="es-VE" dirty="0" smtClean="0"/>
-              <a:t>Ejecutar en el directorio </a:t>
-            </a:r>
-            <a:r>
-              <a:rPr lang="es-VE" dirty="0" err="1" smtClean="0"/>
-              <a:t>raiz</a:t>
-            </a:r>
-            <a:r>
-              <a:rPr lang="es-VE" dirty="0" smtClean="0"/>
-              <a:t> del proyecto:</a:t>
-            </a:r>
-          </a:p>
-          <a:p>
-            <a:pPr lvl="1"/>
-            <a:r>
-              <a:rPr lang="es-VE" dirty="0" err="1" smtClean="0"/>
-              <a:t>grunt</a:t>
-            </a:r>
-            <a:r>
-              <a:rPr lang="es-VE" dirty="0" smtClean="0"/>
-              <a:t> –v</a:t>
-            </a:r>
-          </a:p>
-          <a:p>
-            <a:pPr>
-              <a:buNone/>
-            </a:pPr>
-            <a:endParaRPr lang="es-VE" dirty="0"/>
-          </a:p>
-        </p:txBody>
-      </p:sp>
-    </p:spTree>
-  </p:cSld>
-  <p:clrMapOvr>
-    <a:masterClrMapping/>
-  </p:clrMapOvr>
-</p:sld>
-</file>
-
 <file path=ppt/slides/slide12.xml><?xml version="1.0" encoding="utf-8"?>
 <p:sld xmlns:a="http://schemas.openxmlformats.org/drawingml/2006/main" xmlns:r="http://schemas.openxmlformats.org/officeDocument/2006/relationships" xmlns:p="http://schemas.openxmlformats.org/presentationml/2006/main">
   <p:cSld>
@@ -4619,6 +4658,111 @@
           <a:lstStyle/>
           <a:p>
             <a:r>
+              <a:rPr lang="es-VE" dirty="0" err="1" smtClean="0"/>
+              <a:t>DEPLOYdel</a:t>
+            </a:r>
+            <a:r>
+              <a:rPr lang="es-VE" dirty="0" smtClean="0"/>
+              <a:t> SITE con GRUNT</a:t>
+            </a:r>
+            <a:endParaRPr lang="es-VE" dirty="0"/>
+          </a:p>
+        </p:txBody>
+      </p:sp>
+      <p:sp>
+        <p:nvSpPr>
+          <p:cNvPr id="3" name="2 Marcador de contenido"/>
+          <p:cNvSpPr>
+            <a:spLocks noGrp="1"/>
+          </p:cNvSpPr>
+          <p:nvPr>
+            <p:ph idx="1"/>
+          </p:nvPr>
+        </p:nvSpPr>
+        <p:spPr/>
+        <p:txBody>
+          <a:bodyPr/>
+          <a:lstStyle/>
+          <a:p>
+            <a:r>
+              <a:rPr lang="es-VE" dirty="0" smtClean="0"/>
+              <a:t>Crear y Editar el archivo Gruntfile.js, ver documentación de GRUNT.</a:t>
+            </a:r>
+          </a:p>
+          <a:p>
+            <a:r>
+              <a:rPr lang="es-VE" dirty="0" smtClean="0"/>
+              <a:t>Ejecutar en el directorio </a:t>
+            </a:r>
+            <a:r>
+              <a:rPr lang="es-VE" dirty="0" err="1" smtClean="0"/>
+              <a:t>raiz</a:t>
+            </a:r>
+            <a:r>
+              <a:rPr lang="es-VE" dirty="0" smtClean="0"/>
+              <a:t> del proyecto:</a:t>
+            </a:r>
+          </a:p>
+          <a:p>
+            <a:pPr lvl="1"/>
+            <a:r>
+              <a:rPr lang="es-VE" dirty="0" err="1" smtClean="0"/>
+              <a:t>grunt</a:t>
+            </a:r>
+            <a:r>
+              <a:rPr lang="es-VE" dirty="0" smtClean="0"/>
+              <a:t> –v</a:t>
+            </a:r>
+          </a:p>
+          <a:p>
+            <a:pPr>
+              <a:buNone/>
+            </a:pPr>
+            <a:endParaRPr lang="es-VE" dirty="0"/>
+          </a:p>
+        </p:txBody>
+      </p:sp>
+    </p:spTree>
+  </p:cSld>
+  <p:clrMapOvr>
+    <a:masterClrMapping/>
+  </p:clrMapOvr>
+</p:sld>
+</file>
+
+<file path=ppt/slides/slide13.xml><?xml version="1.0" encoding="utf-8"?>
+<p:sld xmlns:a="http://schemas.openxmlformats.org/drawingml/2006/main" xmlns:r="http://schemas.openxmlformats.org/officeDocument/2006/relationships" xmlns:p="http://schemas.openxmlformats.org/presentationml/2006/main">
+  <p:cSld>
+    <p:spTree>
+      <p:nvGrpSpPr>
+        <p:cNvPr id="1" name=""/>
+        <p:cNvGrpSpPr/>
+        <p:nvPr/>
+      </p:nvGrpSpPr>
+      <p:grpSpPr>
+        <a:xfrm>
+          <a:off x="0" y="0"/>
+          <a:ext cx="0" cy="0"/>
+          <a:chOff x="0" y="0"/>
+          <a:chExt cx="0" cy="0"/>
+        </a:xfrm>
+      </p:grpSpPr>
+      <p:sp>
+        <p:nvSpPr>
+          <p:cNvPr id="2" name="1 Título"/>
+          <p:cNvSpPr>
+            <a:spLocks noGrp="1"/>
+          </p:cNvSpPr>
+          <p:nvPr>
+            <p:ph type="title"/>
+          </p:nvPr>
+        </p:nvSpPr>
+        <p:spPr/>
+        <p:txBody>
+          <a:bodyPr/>
+          <a:lstStyle/>
+          <a:p>
+            <a:r>
               <a:rPr lang="es-VE" dirty="0" smtClean="0"/>
               <a:t>Páginas de Referencia</a:t>
             </a:r>
@@ -4666,7 +4810,7 @@
     </p:spTree>
     <p:extLst>
       <p:ext uri="{BB962C8B-B14F-4D97-AF65-F5344CB8AC3E}">
-        <p14:creationId xmlns:p14="http://schemas.microsoft.com/office/powerpoint/2010/main" val="2061773745"/>
+        <p14:creationId xmlns:p14="http://schemas.microsoft.com/office/powerpoint/2010/main" xmlns="" val="2061773745"/>
       </p:ext>
     </p:extLst>
   </p:cSld>
@@ -4864,8 +5008,8 @@
         </p:nvSpPr>
         <p:spPr>
           <a:xfrm>
-            <a:off x="467544" y="4149080"/>
-            <a:ext cx="8229600" cy="2448272"/>
+            <a:off x="467544" y="3861048"/>
+            <a:ext cx="8229600" cy="2736304"/>
           </a:xfrm>
           <a:prstGeom prst="rect">
             <a:avLst/>
@@ -4897,7 +5041,7 @@
               <a:defRPr/>
             </a:pPr>
             <a:r>
-              <a:rPr kumimoji="0" lang="es-VE" sz="2400" b="0" i="0" u="none" strike="noStrike" kern="1200" cap="none" spc="0" normalizeH="0" baseline="0" noProof="0" dirty="0" smtClean="0">
+              <a:rPr kumimoji="0" lang="es-VE" b="0" i="0" u="none" strike="noStrike" kern="1200" cap="none" spc="0" normalizeH="0" baseline="0" noProof="0" dirty="0" smtClean="0">
                 <a:ln>
                   <a:noFill/>
                 </a:ln>
@@ -4915,7 +5059,7 @@
               <a:t>http://blog.escuelaweb.net/manejar-paquetes-cliente-con-bower/  </a:t>
             </a:r>
             <a:r>
-              <a:rPr kumimoji="0" lang="es-VE" sz="3600" b="0" i="0" u="none" strike="noStrike" kern="1200" cap="none" spc="0" normalizeH="0" baseline="0" noProof="0" dirty="0" smtClean="0">
+              <a:rPr kumimoji="0" lang="es-VE" sz="2800" b="0" i="0" u="none" strike="noStrike" kern="1200" cap="none" spc="0" normalizeH="0" baseline="0" noProof="0" dirty="0" smtClean="0">
                 <a:ln>
                   <a:noFill/>
                 </a:ln>
@@ -4932,7 +5076,7 @@
               <a:t>- </a:t>
             </a:r>
             <a:r>
-              <a:rPr kumimoji="0" lang="es-VE" sz="2400" b="0" i="0" u="none" strike="noStrike" kern="1200" cap="none" spc="0" normalizeH="0" baseline="0" noProof="0" dirty="0" smtClean="0">
+              <a:rPr kumimoji="0" lang="es-VE" b="0" i="0" u="none" strike="noStrike" kern="1200" cap="none" spc="0" normalizeH="0" baseline="0" noProof="0" dirty="0" smtClean="0">
                 <a:ln>
                   <a:noFill/>
                 </a:ln>
@@ -4970,7 +5114,7 @@
               <a:defRPr/>
             </a:pPr>
             <a:r>
-              <a:rPr kumimoji="0" lang="es-VE" sz="1600" b="0" i="0" u="none" strike="noStrike" kern="1200" cap="none" spc="0" normalizeH="0" baseline="0" noProof="0" dirty="0" smtClean="0">
+              <a:rPr kumimoji="0" lang="es-VE" sz="1200" b="0" i="0" u="none" strike="noStrike" kern="1200" cap="none" spc="0" normalizeH="0" baseline="0" noProof="0" dirty="0" smtClean="0">
                 <a:ln>
                   <a:noFill/>
                 </a:ln>
@@ -4988,7 +5132,7 @@
               <a:t>http://brackets.io/</a:t>
             </a:r>
             <a:r>
-              <a:rPr kumimoji="0" lang="es-VE" sz="1600" b="0" i="0" u="none" strike="noStrike" kern="1200" cap="none" spc="0" normalizeH="0" baseline="0" noProof="0" dirty="0" smtClean="0">
+              <a:rPr kumimoji="0" lang="es-VE" sz="1200" b="0" i="0" u="none" strike="noStrike" kern="1200" cap="none" spc="0" normalizeH="0" baseline="0" noProof="0" dirty="0" smtClean="0">
                 <a:ln>
                   <a:noFill/>
                 </a:ln>
@@ -5005,7 +5149,7 @@
               <a:t> </a:t>
             </a:r>
             <a:r>
-              <a:rPr kumimoji="0" lang="es-VE" sz="2400" b="0" i="0" u="none" strike="noStrike" kern="1200" cap="none" spc="0" normalizeH="0" baseline="0" noProof="0" dirty="0" smtClean="0">
+              <a:rPr kumimoji="0" lang="es-VE" b="0" i="0" u="none" strike="noStrike" kern="1200" cap="none" spc="0" normalizeH="0" baseline="0" noProof="0" dirty="0" smtClean="0">
                 <a:ln>
                   <a:noFill/>
                 </a:ln>
@@ -5019,8 +5163,80 @@
                 <a:ea typeface="+mn-ea"/>
                 <a:cs typeface="+mn-cs"/>
               </a:rPr>
-              <a:t>- Editor Texto para desarrollo web</a:t>
-            </a:r>
+              <a:t>- Editor Texto para desarrollo </a:t>
+            </a:r>
+            <a:r>
+              <a:rPr kumimoji="0" lang="es-VE" b="0" i="0" u="none" strike="noStrike" kern="1200" cap="none" spc="0" normalizeH="0" baseline="0" noProof="0" dirty="0" smtClean="0">
+                <a:ln>
+                  <a:noFill/>
+                </a:ln>
+                <a:solidFill>
+                  <a:schemeClr val="tx1"/>
+                </a:solidFill>
+                <a:effectLst/>
+                <a:uLnTx/>
+                <a:uFillTx/>
+                <a:latin typeface="+mn-lt"/>
+                <a:ea typeface="+mn-ea"/>
+                <a:cs typeface="+mn-cs"/>
+              </a:rPr>
+              <a:t>web</a:t>
+            </a:r>
+          </a:p>
+          <a:p>
+            <a:pPr marL="285750" lvl="0" indent="-285750">
+              <a:spcBef>
+                <a:spcPct val="20000"/>
+              </a:spcBef>
+              <a:buClr>
+                <a:schemeClr val="accent1"/>
+              </a:buClr>
+              <a:buSzPct val="85000"/>
+              <a:buFont typeface="Arial" pitchFamily="34" charset="0"/>
+              <a:buChar char="•"/>
+              <a:defRPr/>
+            </a:pPr>
+            <a:r>
+              <a:rPr lang="es-VE" dirty="0" smtClean="0">
+                <a:hlinkClick r:id="rId4"/>
+              </a:rPr>
+              <a:t>http://frontendlabs.io/146--</a:t>
+            </a:r>
+            <a:r>
+              <a:rPr lang="es-VE" dirty="0" smtClean="0">
+                <a:hlinkClick r:id="rId4"/>
+              </a:rPr>
+              <a:t>grunt-js-espanol-tutorial-basico-primeros-pasos</a:t>
+            </a:r>
+            <a:endParaRPr lang="es-VE" dirty="0" smtClean="0"/>
+          </a:p>
+          <a:p>
+            <a:pPr marL="285750" lvl="0" indent="-285750">
+              <a:spcBef>
+                <a:spcPct val="20000"/>
+              </a:spcBef>
+              <a:buClr>
+                <a:schemeClr val="accent1"/>
+              </a:buClr>
+              <a:buSzPct val="85000"/>
+              <a:buFont typeface="Arial" pitchFamily="34" charset="0"/>
+              <a:buChar char="•"/>
+              <a:defRPr/>
+            </a:pPr>
+            <a:endParaRPr kumimoji="0" lang="es-VE" sz="2400" b="0" i="0" u="none" strike="noStrike" kern="1200" cap="none" spc="0" normalizeH="0" baseline="0" noProof="0" dirty="0" smtClean="0">
+              <a:ln>
+                <a:noFill/>
+              </a:ln>
+              <a:solidFill>
+                <a:schemeClr val="tx1"/>
+              </a:solidFill>
+              <a:effectLst/>
+              <a:uLnTx/>
+              <a:uFillTx/>
+              <a:latin typeface="+mn-lt"/>
+              <a:ea typeface="+mn-ea"/>
+              <a:cs typeface="+mn-cs"/>
+            </a:endParaRPr>
           </a:p>
           <a:p>
             <a:pPr marL="285750" marR="0" lvl="0" indent="-285750" algn="l" defTabSz="914400" rtl="0" eaLnBrk="1" fontAlgn="auto" latinLnBrk="0" hangingPunct="1">
@@ -5167,7 +5383,7 @@
     </p:spTree>
     <p:extLst>
       <p:ext uri="{BB962C8B-B14F-4D97-AF65-F5344CB8AC3E}">
-        <p14:creationId xmlns:p14="http://schemas.microsoft.com/office/powerpoint/2010/main" val="1503682371"/>
+        <p14:creationId xmlns:p14="http://schemas.microsoft.com/office/powerpoint/2010/main" xmlns="" val="1503682371"/>
       </p:ext>
     </p:extLst>
   </p:cSld>
@@ -5237,7 +5453,7 @@
         <p:spPr/>
         <p:txBody>
           <a:bodyPr>
-            <a:normAutofit/>
+            <a:normAutofit fontScale="92500" lnSpcReduction="20000"/>
           </a:bodyPr>
           <a:lstStyle/>
           <a:p>
@@ -5294,7 +5510,7 @@
             <a:endParaRPr lang="es-VE" sz="2400" dirty="0" smtClean="0"/>
           </a:p>
           <a:p>
-            <a:pPr marL="285750" indent="-285750"/>
+            <a:pPr marL="285750" lvl="1" indent="-285750"/>
             <a:r>
               <a:rPr lang="es-VE" sz="1600" b="1" dirty="0" smtClean="0"/>
               <a:t>Instalar BOWER </a:t>
@@ -5327,10 +5543,18 @@
               <a:rPr lang="es-VE" sz="1600" i="1" dirty="0"/>
               <a:t> </a:t>
             </a:r>
+            <a:r>
+              <a:rPr lang="en-US" sz="1600" i="1" dirty="0" smtClean="0"/>
+              <a:t>--</a:t>
+            </a:r>
+            <a:r>
+              <a:rPr lang="en-US" sz="1600" i="1" dirty="0" smtClean="0"/>
+              <a:t>save-dev</a:t>
+            </a:r>
             <a:endParaRPr lang="es-VE" sz="1600" i="1" dirty="0" smtClean="0"/>
           </a:p>
           <a:p>
-            <a:pPr marL="285750" indent="-285750"/>
+            <a:pPr marL="285750" lvl="1" indent="-285750"/>
             <a:r>
               <a:rPr lang="en-US" sz="1600" b="1" dirty="0" err="1" smtClean="0"/>
               <a:t>Instalar</a:t>
@@ -5354,6 +5578,14 @@
             <a:r>
               <a:rPr lang="en-US" sz="1600" i="1" dirty="0" err="1" smtClean="0"/>
               <a:t>browserify</a:t>
+            </a:r>
+            <a:r>
+              <a:rPr lang="en-US" sz="1600" i="1" dirty="0" smtClean="0"/>
+              <a:t> --</a:t>
+            </a:r>
+            <a:r>
+              <a:rPr lang="en-US" sz="1600" i="1" dirty="0" smtClean="0"/>
+              <a:t>save-dev</a:t>
             </a:r>
             <a:endParaRPr lang="en-US" sz="1600" i="1" dirty="0" smtClean="0"/>
           </a:p>
@@ -5383,9 +5615,8 @@
             </a:r>
             <a:r>
               <a:rPr lang="en-US" sz="1600" i="1" dirty="0" smtClean="0"/>
-              <a:t>uglify-js@1</a:t>
-            </a:r>
-            <a:endParaRPr lang="en-US" dirty="0" smtClean="0"/>
+              <a:t>uglify-js@1 --save-dev</a:t>
+            </a:r>
           </a:p>
           <a:p>
             <a:pPr marL="285750" indent="-285750"/>
@@ -5410,12 +5641,24 @@
             </a:r>
             <a:r>
               <a:rPr lang="en-US" sz="1600" i="1" dirty="0" smtClean="0"/>
-              <a:t> install -g grunt-</a:t>
+              <a:t> install -g </a:t>
+            </a:r>
+            <a:r>
+              <a:rPr lang="en-US" sz="1600" i="1" dirty="0" smtClean="0"/>
+              <a:t>grunt-</a:t>
             </a:r>
             <a:r>
               <a:rPr lang="en-US" sz="1600" i="1" dirty="0" err="1" smtClean="0"/>
               <a:t>cli</a:t>
             </a:r>
+            <a:r>
+              <a:rPr lang="en-US" sz="1600" i="1" dirty="0" smtClean="0"/>
+              <a:t> --</a:t>
+            </a:r>
+            <a:r>
+              <a:rPr lang="en-US" sz="1600" i="1" dirty="0" smtClean="0"/>
+              <a:t>save-dev</a:t>
+            </a:r>
             <a:endParaRPr lang="en-US" sz="1600" i="1" dirty="0" smtClean="0"/>
           </a:p>
           <a:p>
@@ -5426,7 +5669,37 @@
             </a:r>
             <a:r>
               <a:rPr lang="en-US" sz="1600" i="1" dirty="0" smtClean="0"/>
-              <a:t> install grunt --</a:t>
+              <a:t> install grunt --save-dev</a:t>
+            </a:r>
+          </a:p>
+          <a:p>
+            <a:pPr marL="285750" indent="-285750"/>
+            <a:r>
+              <a:rPr lang="en-US" sz="1600" b="1" dirty="0" err="1" smtClean="0"/>
+              <a:t>Instalar</a:t>
+            </a:r>
+            <a:r>
+              <a:rPr lang="en-US" sz="1600" b="1" dirty="0" smtClean="0"/>
+              <a:t> PLUGINS DE GRUNT</a:t>
+            </a:r>
+          </a:p>
+          <a:p>
+            <a:pPr marL="560070" lvl="1" indent="-285750"/>
+            <a:r>
+              <a:rPr lang="en-US" sz="1600" i="1" dirty="0" err="1" smtClean="0"/>
+              <a:t>npm</a:t>
+            </a:r>
+            <a:r>
+              <a:rPr lang="en-US" sz="1600" i="1" dirty="0" smtClean="0"/>
+              <a:t> install grunt-</a:t>
+            </a:r>
+            <a:r>
+              <a:rPr lang="en-US" sz="1600" i="1" dirty="0" err="1" smtClean="0"/>
+              <a:t>contrib</a:t>
+            </a:r>
+            <a:r>
+              <a:rPr lang="en-US" sz="1600" i="1" dirty="0" smtClean="0"/>
+              <a:t>-copy --</a:t>
             </a:r>
             <a:r>
               <a:rPr lang="en-US" sz="1600" i="1" dirty="0" smtClean="0"/>
@@ -5434,21 +5707,6 @@
             </a:r>
           </a:p>
           <a:p>
-            <a:pPr marL="285750" indent="-285750"/>
-            <a:r>
-              <a:rPr lang="en-US" sz="1600" b="1" dirty="0" err="1" smtClean="0"/>
-              <a:t>Instalar</a:t>
-            </a:r>
-            <a:r>
-              <a:rPr lang="en-US" sz="1600" b="1" dirty="0" smtClean="0"/>
-              <a:t> </a:t>
-            </a:r>
-            <a:r>
-              <a:rPr lang="en-US" sz="1600" b="1" dirty="0" smtClean="0"/>
-              <a:t>PLUGINS DE GRUNT</a:t>
-            </a:r>
-          </a:p>
-          <a:p>
             <a:pPr marL="560070" lvl="1" indent="-285750"/>
             <a:r>
               <a:rPr lang="en-US" sz="1600" i="1" dirty="0" err="1" smtClean="0"/>
@@ -5464,7 +5722,7 @@
             </a:r>
             <a:r>
               <a:rPr lang="en-US" sz="1600" i="1" dirty="0" smtClean="0"/>
-              <a:t>-watch --save-dev</a:t>
+              <a:t>-clean --save-dev</a:t>
             </a:r>
           </a:p>
           <a:p>
@@ -5475,6 +5733,29 @@
             </a:r>
             <a:r>
               <a:rPr lang="en-US" sz="1600" i="1" dirty="0" smtClean="0"/>
+              <a:t> </a:t>
+            </a:r>
+            <a:r>
+              <a:rPr lang="en-US" sz="1600" i="1" dirty="0" smtClean="0"/>
+              <a:t>install grunt-</a:t>
+            </a:r>
+            <a:r>
+              <a:rPr lang="en-US" sz="1600" i="1" dirty="0" err="1" smtClean="0"/>
+              <a:t>contrib</a:t>
+            </a:r>
+            <a:r>
+              <a:rPr lang="en-US" sz="1600" i="1" dirty="0" smtClean="0"/>
+              <a:t>-watch --save-dev</a:t>
+            </a:r>
+          </a:p>
+          <a:p>
+            <a:pPr marL="560070" lvl="1" indent="-285750"/>
+            <a:r>
+              <a:rPr lang="en-US" sz="1600" i="1" dirty="0" err="1" smtClean="0"/>
+              <a:t>npm</a:t>
+            </a:r>
+            <a:r>
+              <a:rPr lang="en-US" sz="1600" i="1" dirty="0" smtClean="0"/>
               <a:t> install grunt-</a:t>
             </a:r>
             <a:r>
@@ -5541,7 +5822,30 @@
             </a:r>
             <a:r>
               <a:rPr lang="en-US" sz="1600" i="1" dirty="0"/>
-              <a:t> --save-dev</a:t>
+              <a:t> --</a:t>
+            </a:r>
+            <a:r>
+              <a:rPr lang="en-US" sz="1600" i="1" dirty="0" smtClean="0"/>
+              <a:t>save-dev</a:t>
+            </a:r>
+          </a:p>
+          <a:p>
+            <a:pPr marL="560070" lvl="1" indent="-285750"/>
+            <a:r>
+              <a:rPr lang="en-US" sz="1600" i="1" dirty="0" err="1" smtClean="0"/>
+              <a:t>npm</a:t>
+            </a:r>
+            <a:r>
+              <a:rPr lang="en-US" sz="1600" i="1" dirty="0" smtClean="0"/>
+              <a:t> install grunt-</a:t>
+            </a:r>
+            <a:r>
+              <a:rPr lang="en-US" sz="1600" i="1" dirty="0" err="1" smtClean="0"/>
+              <a:t>contrib</a:t>
+            </a:r>
+            <a:r>
+              <a:rPr lang="en-US" sz="1600" i="1" dirty="0" smtClean="0"/>
+              <a:t>-jade --save-dev</a:t>
             </a:r>
             <a:endParaRPr lang="en-US" sz="1600" i="1" dirty="0" smtClean="0"/>
           </a:p>
@@ -5558,14 +5862,41 @@
             <a:endParaRPr lang="es-VE" sz="2400" dirty="0"/>
           </a:p>
           <a:p>
-            <a:endParaRPr lang="es-VE" dirty="0"/>
+            <a:pPr>
+              <a:buNone/>
+            </a:pPr>
+            <a:r>
+              <a:rPr lang="es-VE" sz="1900" b="1" dirty="0" smtClean="0"/>
+              <a:t>NOTA: </a:t>
+            </a:r>
+            <a:r>
+              <a:rPr lang="es-VE" sz="1900" dirty="0" smtClean="0"/>
+              <a:t>La opción --</a:t>
+            </a:r>
+            <a:r>
+              <a:rPr lang="es-VE" sz="1900" dirty="0" err="1" smtClean="0"/>
+              <a:t>save</a:t>
+            </a:r>
+            <a:r>
+              <a:rPr lang="es-VE" sz="1900" dirty="0" err="1" smtClean="0"/>
+              <a:t>-dev</a:t>
+            </a:r>
+            <a:r>
+              <a:rPr lang="es-VE" sz="1900" dirty="0" smtClean="0"/>
+              <a:t> añade la dependencia al archivo </a:t>
+            </a:r>
+            <a:r>
+              <a:rPr lang="es-VE" sz="1900" dirty="0" err="1" smtClean="0"/>
+              <a:t>package.json</a:t>
+            </a:r>
+            <a:endParaRPr lang="es-VE" sz="1900" dirty="0"/>
           </a:p>
         </p:txBody>
       </p:sp>
     </p:spTree>
     <p:extLst>
       <p:ext uri="{BB962C8B-B14F-4D97-AF65-F5344CB8AC3E}">
-        <p14:creationId xmlns:p14="http://schemas.microsoft.com/office/powerpoint/2010/main" val="1407232196"/>
+        <p14:creationId xmlns:p14="http://schemas.microsoft.com/office/powerpoint/2010/main" xmlns="" val="1407232196"/>
       </p:ext>
     </p:extLst>
   </p:cSld>
@@ -5611,83 +5942,365 @@
         </p:nvSpPr>
         <p:spPr/>
         <p:txBody>
+          <a:bodyPr>
+            <a:normAutofit fontScale="90000"/>
+          </a:bodyPr>
+          <a:lstStyle/>
+          <a:p>
+            <a:r>
+              <a:rPr lang="es-VE" dirty="0" smtClean="0"/>
+              <a:t>Pasos Mínimos para preparación del ambiente</a:t>
+            </a:r>
+            <a:endParaRPr lang="es-VE" dirty="0"/>
+          </a:p>
+        </p:txBody>
+      </p:sp>
+      <p:sp>
+        <p:nvSpPr>
+          <p:cNvPr id="3" name="2 Marcador de contenido"/>
+          <p:cNvSpPr>
+            <a:spLocks noGrp="1"/>
+          </p:cNvSpPr>
+          <p:nvPr>
+            <p:ph idx="1"/>
+          </p:nvPr>
+        </p:nvSpPr>
+        <p:spPr>
+          <a:xfrm>
+            <a:off x="251520" y="1600200"/>
+            <a:ext cx="8640960" cy="4876800"/>
+          </a:xfrm>
+        </p:spPr>
+        <p:txBody>
           <a:bodyPr/>
           <a:lstStyle/>
           <a:p>
-            <a:r>
-              <a:rPr lang="es-VE" dirty="0" smtClean="0"/>
-              <a:t>Instalación de </a:t>
-            </a:r>
-            <a:r>
-              <a:rPr lang="es-VE" dirty="0" err="1" smtClean="0"/>
-              <a:t>Bower</a:t>
-            </a:r>
-            <a:r>
-              <a:rPr lang="es-VE" dirty="0" smtClean="0"/>
+            <a:pPr marL="285750" indent="-285750"/>
+            <a:r>
+              <a:rPr lang="es-VE" sz="1800" b="1" dirty="0" smtClean="0"/>
+              <a:t>Instalar NODE </a:t>
+            </a:r>
+            <a:r>
+              <a:rPr lang="es-VE" sz="2000" dirty="0" smtClean="0"/>
+              <a:t>- </a:t>
+            </a:r>
+            <a:r>
+              <a:rPr lang="es-VE" sz="1600" dirty="0" smtClean="0">
+                <a:hlinkClick r:id="rId2"/>
+              </a:rPr>
+              <a:t>https://nodejs.org/en/</a:t>
+            </a:r>
+            <a:r>
+              <a:rPr lang="es-VE" sz="1600" dirty="0" smtClean="0">
+                <a:hlinkClick r:id="rId3"/>
+              </a:rPr>
               <a:t> </a:t>
             </a:r>
+            <a:endParaRPr lang="es-VE" dirty="0" smtClean="0">
+              <a:hlinkClick r:id="rId3"/>
+            </a:endParaRPr>
+          </a:p>
+          <a:p>
+            <a:pPr marL="285750" indent="-285750"/>
+            <a:r>
+              <a:rPr lang="es-VE" sz="1800" b="1" dirty="0" smtClean="0"/>
+              <a:t>Instalar MSGIT </a:t>
+            </a:r>
+            <a:r>
+              <a:rPr lang="es-VE" sz="1800" dirty="0" smtClean="0"/>
+              <a:t>- </a:t>
+            </a:r>
+            <a:r>
+              <a:rPr lang="es-VE" sz="1600" dirty="0" smtClean="0">
+                <a:hlinkClick r:id="rId3"/>
+              </a:rPr>
+              <a:t>https://</a:t>
+            </a:r>
+            <a:r>
+              <a:rPr lang="es-VE" sz="1600" dirty="0" smtClean="0">
+                <a:hlinkClick r:id="rId3"/>
+              </a:rPr>
+              <a:t>github.com/git-for-windows/git/releases/tag/v2.5.3.windows.1</a:t>
+            </a:r>
+            <a:endParaRPr lang="es-VE" dirty="0" smtClean="0"/>
+          </a:p>
+          <a:p>
+            <a:pPr marL="285750" indent="-285750"/>
+            <a:r>
+              <a:rPr lang="es-VE" sz="1800" b="1" dirty="0" smtClean="0"/>
+              <a:t>Clonar en tu ambiente la rama GIT </a:t>
+            </a:r>
+            <a:r>
+              <a:rPr lang="es-VE" sz="1800" b="1" dirty="0" smtClean="0"/>
+              <a:t>- </a:t>
+            </a:r>
+            <a:r>
+              <a:rPr lang="es-VE" sz="1600" dirty="0" smtClean="0">
+                <a:hlinkClick r:id="rId4"/>
+              </a:rPr>
+              <a:t>https</a:t>
+            </a:r>
+            <a:r>
+              <a:rPr lang="es-VE" sz="1600" dirty="0" smtClean="0">
+                <a:hlinkClick r:id="rId4"/>
+              </a:rPr>
+              <a:t>://</a:t>
+            </a:r>
+            <a:r>
+              <a:rPr lang="es-VE" sz="1600" dirty="0" smtClean="0">
+                <a:hlinkClick r:id="rId4"/>
+              </a:rPr>
+              <a:t>github.com/AcordeGroup/portal.git</a:t>
+            </a:r>
+            <a:endParaRPr lang="es-VE" dirty="0" smtClean="0"/>
+          </a:p>
+          <a:p>
+            <a:pPr marL="285750" indent="-285750"/>
+            <a:r>
+              <a:rPr lang="es-VE" sz="1800" b="1" dirty="0" smtClean="0"/>
+              <a:t>Abrir una consola e ir hasta </a:t>
+            </a:r>
+            <a:r>
+              <a:rPr lang="es-VE" sz="1800" b="1" dirty="0" smtClean="0"/>
+              <a:t>el directorio </a:t>
+            </a:r>
+            <a:r>
+              <a:rPr lang="es-VE" sz="1800" b="1" dirty="0" smtClean="0"/>
+              <a:t>\portal\</a:t>
+            </a:r>
+            <a:r>
+              <a:rPr lang="es-VE" sz="1800" b="1" dirty="0" err="1" smtClean="0"/>
+              <a:t>acordeweb</a:t>
+            </a:r>
+            <a:r>
+              <a:rPr lang="es-VE" sz="1800" b="1" dirty="0" smtClean="0"/>
+              <a:t>  - </a:t>
+            </a:r>
+            <a:r>
+              <a:rPr lang="es-VE" sz="1800" dirty="0" smtClean="0"/>
+              <a:t>donde se encuentra </a:t>
+            </a:r>
+            <a:r>
+              <a:rPr lang="es-VE" sz="1800" dirty="0" smtClean="0"/>
+              <a:t>el archivo </a:t>
+            </a:r>
+            <a:r>
+              <a:rPr lang="es-VE" sz="1800" i="1" dirty="0" err="1" smtClean="0">
+                <a:solidFill>
+                  <a:srgbClr val="FF0000"/>
+                </a:solidFill>
+              </a:rPr>
+              <a:t>package.json</a:t>
+            </a:r>
+            <a:r>
+              <a:rPr lang="es-VE" sz="1800" dirty="0" smtClean="0"/>
+              <a:t> (Ya tiene configuradas todas las dependencias NPM del proyecto)</a:t>
+            </a:r>
+          </a:p>
+          <a:p>
+            <a:pPr marL="560070" lvl="1" indent="-285750"/>
+            <a:r>
+              <a:rPr lang="es-VE" sz="1600" b="1" dirty="0" smtClean="0"/>
+              <a:t>EJECUTAR </a:t>
+            </a:r>
+            <a:r>
+              <a:rPr lang="es-VE" sz="1600" b="1" i="1" dirty="0" err="1" smtClean="0">
+                <a:solidFill>
+                  <a:srgbClr val="0070C0"/>
+                </a:solidFill>
+              </a:rPr>
+              <a:t>npm</a:t>
+            </a:r>
+            <a:r>
+              <a:rPr lang="es-VE" sz="1600" b="1" i="1" dirty="0" smtClean="0">
+                <a:solidFill>
+                  <a:srgbClr val="0070C0"/>
+                </a:solidFill>
+              </a:rPr>
+              <a:t> – </a:t>
+            </a:r>
+            <a:r>
+              <a:rPr lang="es-VE" sz="1600" b="1" i="1" dirty="0" err="1" smtClean="0">
+                <a:solidFill>
+                  <a:srgbClr val="0070C0"/>
+                </a:solidFill>
+              </a:rPr>
+              <a:t>install</a:t>
+            </a:r>
+            <a:endParaRPr lang="es-VE" sz="1600" b="1" i="1" dirty="0" smtClean="0">
+              <a:solidFill>
+                <a:srgbClr val="0070C0"/>
+              </a:solidFill>
+            </a:endParaRPr>
+          </a:p>
+          <a:p>
+            <a:pPr marL="834390" lvl="2" indent="-285750"/>
+            <a:r>
+              <a:rPr lang="es-VE" sz="1400" b="1" dirty="0" smtClean="0"/>
+              <a:t>Esto instalará </a:t>
+            </a:r>
+            <a:r>
+              <a:rPr lang="es-VE" sz="1400" b="1" dirty="0" err="1" smtClean="0"/>
+              <a:t>bower</a:t>
+            </a:r>
+            <a:r>
+              <a:rPr lang="es-VE" sz="1400" b="1" dirty="0" smtClean="0"/>
+              <a:t>, </a:t>
+            </a:r>
+            <a:r>
+              <a:rPr lang="es-VE" sz="1400" b="1" dirty="0" err="1" smtClean="0"/>
+              <a:t>browserify</a:t>
+            </a:r>
+            <a:r>
+              <a:rPr lang="es-VE" sz="1400" b="1" dirty="0" smtClean="0"/>
+              <a:t>, </a:t>
+            </a:r>
+            <a:r>
+              <a:rPr lang="es-VE" sz="1400" b="1" dirty="0" err="1" smtClean="0"/>
+              <a:t>uglify</a:t>
+            </a:r>
+            <a:r>
+              <a:rPr lang="es-VE" sz="1400" b="1" dirty="0" smtClean="0"/>
+              <a:t>, </a:t>
+            </a:r>
+            <a:r>
+              <a:rPr lang="es-VE" sz="1400" b="1" dirty="0" err="1" smtClean="0"/>
+              <a:t>etc</a:t>
+            </a:r>
+            <a:endParaRPr lang="es-VE" sz="1400" b="1" dirty="0" smtClean="0"/>
+          </a:p>
+          <a:p>
+            <a:pPr marL="560070" lvl="1" indent="-285750"/>
+            <a:r>
+              <a:rPr lang="es-VE" b="1" dirty="0" smtClean="0"/>
+              <a:t>EJECUTAR </a:t>
+            </a:r>
+            <a:r>
+              <a:rPr lang="es-VE" sz="1600" b="1" i="1" dirty="0" err="1" smtClean="0">
+                <a:solidFill>
+                  <a:srgbClr val="0070C0"/>
+                </a:solidFill>
+              </a:rPr>
+              <a:t>bower</a:t>
+            </a:r>
+            <a:r>
+              <a:rPr lang="es-VE" sz="1600" b="1" i="1" dirty="0" smtClean="0">
+                <a:solidFill>
+                  <a:srgbClr val="0070C0"/>
+                </a:solidFill>
+              </a:rPr>
+              <a:t> </a:t>
+            </a:r>
+            <a:r>
+              <a:rPr lang="es-VE" sz="1600" b="1" i="1" dirty="0" smtClean="0">
+                <a:solidFill>
+                  <a:srgbClr val="0070C0"/>
+                </a:solidFill>
+              </a:rPr>
+              <a:t>–</a:t>
+            </a:r>
+            <a:r>
+              <a:rPr lang="es-VE" sz="1600" b="1" i="1" dirty="0" err="1" smtClean="0">
+                <a:solidFill>
+                  <a:srgbClr val="0070C0"/>
+                </a:solidFill>
+              </a:rPr>
+              <a:t>install</a:t>
+            </a:r>
+            <a:endParaRPr lang="es-VE" sz="1600" b="1" i="1" dirty="0" smtClean="0">
+              <a:solidFill>
+                <a:srgbClr val="0070C0"/>
+              </a:solidFill>
+            </a:endParaRPr>
+          </a:p>
+          <a:p>
+            <a:pPr marL="834390" lvl="2" indent="-285750"/>
+            <a:r>
+              <a:rPr lang="es-VE" sz="1400" b="1" dirty="0" smtClean="0"/>
+              <a:t>Esto descargará las librerías </a:t>
+            </a:r>
+            <a:r>
+              <a:rPr lang="es-VE" sz="1400" b="1" dirty="0" err="1" smtClean="0"/>
+              <a:t>javascript</a:t>
+            </a:r>
+            <a:r>
+              <a:rPr lang="es-VE" sz="1400" b="1" dirty="0" smtClean="0"/>
+              <a:t> de </a:t>
+            </a:r>
+            <a:r>
+              <a:rPr lang="es-VE" sz="1400" b="1" dirty="0" err="1" smtClean="0"/>
+              <a:t>bootstrap</a:t>
+            </a:r>
+            <a:r>
+              <a:rPr lang="es-VE" sz="1400" b="1" dirty="0" smtClean="0"/>
+              <a:t> y </a:t>
+            </a:r>
+            <a:r>
+              <a:rPr lang="es-VE" sz="1400" b="1" dirty="0" err="1" smtClean="0"/>
+              <a:t>jqyery</a:t>
+            </a:r>
+            <a:endParaRPr lang="es-VE" sz="1400" b="1" dirty="0" smtClean="0"/>
+          </a:p>
+          <a:p>
+            <a:pPr marL="285750" indent="-285750"/>
+            <a:r>
+              <a:rPr lang="es-VE" sz="1800" b="1" dirty="0" smtClean="0"/>
+              <a:t>Instalar </a:t>
+            </a:r>
+            <a:r>
+              <a:rPr lang="es-VE" sz="1800" b="1" dirty="0" err="1" smtClean="0"/>
+              <a:t>Brackets</a:t>
+            </a:r>
+            <a:endParaRPr lang="es-VE" sz="1800" b="1" dirty="0" smtClean="0"/>
+          </a:p>
+          <a:p>
+            <a:pPr marL="560070" lvl="1" indent="-285750"/>
+            <a:r>
+              <a:rPr lang="es-VE" sz="1400" b="1" dirty="0" smtClean="0"/>
+              <a:t>Instalar el </a:t>
+            </a:r>
+            <a:r>
+              <a:rPr lang="es-VE" sz="1400" b="1" dirty="0" err="1" smtClean="0"/>
+              <a:t>plugin</a:t>
+            </a:r>
+            <a:r>
+              <a:rPr lang="es-VE" sz="1400" b="1" dirty="0" smtClean="0"/>
+              <a:t> de </a:t>
+            </a:r>
+            <a:r>
+              <a:rPr lang="es-VE" sz="1400" b="1" dirty="0" err="1" smtClean="0"/>
+              <a:t>brackets</a:t>
+            </a:r>
+            <a:r>
+              <a:rPr lang="es-VE" sz="1400" b="1" dirty="0" smtClean="0"/>
+              <a:t> de </a:t>
+            </a:r>
+            <a:r>
+              <a:rPr lang="es-VE" sz="1400" b="1" dirty="0" err="1" smtClean="0"/>
+              <a:t>grunt</a:t>
+            </a:r>
+            <a:endParaRPr lang="es-VE" sz="1400" b="1" dirty="0" smtClean="0"/>
+          </a:p>
+          <a:p>
+            <a:pPr marL="285750" indent="-285750">
+              <a:buNone/>
+            </a:pPr>
+            <a:endParaRPr lang="es-VE" b="1" dirty="0" smtClean="0"/>
+          </a:p>
+          <a:p>
+            <a:pPr marL="560070" lvl="1" indent="-285750"/>
+            <a:endParaRPr lang="es-VE" sz="1400" b="1" dirty="0" smtClean="0"/>
+          </a:p>
+          <a:p>
             <a:endParaRPr lang="es-VE" dirty="0"/>
           </a:p>
         </p:txBody>
       </p:sp>
-      <p:pic>
-        <p:nvPicPr>
-          <p:cNvPr id="2050" name="Picture 2" descr="C:\Users\cmoh\AppData\Local\Temp\SNAGHTML48fedc78.PNG"/>
-          <p:cNvPicPr>
-            <a:picLocks noChangeAspect="1" noChangeArrowheads="1"/>
-          </p:cNvPicPr>
-          <p:nvPr/>
-        </p:nvPicPr>
-        <p:blipFill>
-          <a:blip r:embed="rId2" cstate="print">
-            <a:extLst>
-              <a:ext uri="{28A0092B-C50C-407E-A947-70E740481C1C}">
-                <a14:useLocalDpi xmlns:a14="http://schemas.microsoft.com/office/drawing/2010/main" val="0"/>
-              </a:ext>
-            </a:extLst>
-          </a:blip>
-          <a:srcRect/>
-          <a:stretch>
-            <a:fillRect/>
-          </a:stretch>
-        </p:blipFill>
-        <p:spPr bwMode="auto">
-          <a:xfrm>
-            <a:off x="539552" y="1556792"/>
-            <a:ext cx="7137311" cy="4999536"/>
-          </a:xfrm>
-          <a:prstGeom prst="rect">
-            <a:avLst/>
-          </a:prstGeom>
-          <a:noFill/>
-          <a:extLst>
-            <a:ext uri="{909E8E84-426E-40DD-AFC4-6F175D3DCCD1}">
-              <a14:hiddenFill xmlns:a14="http://schemas.microsoft.com/office/drawing/2010/main">
-                <a:solidFill>
-                  <a:srgbClr val="FFFFFF"/>
-                </a:solidFill>
-              </a14:hiddenFill>
-            </a:ext>
-          </a:extLst>
-        </p:spPr>
-      </p:pic>
     </p:spTree>
-    <p:extLst>
-      <p:ext uri="{BB962C8B-B14F-4D97-AF65-F5344CB8AC3E}">
-        <p14:creationId xmlns:p14="http://schemas.microsoft.com/office/powerpoint/2010/main" val="1034331391"/>
-      </p:ext>
-    </p:extLst>
   </p:cSld>
   <p:clrMapOvr>
     <a:masterClrMapping/>
   </p:clrMapOvr>
-  <p:timing>
-    <p:tnLst>
-      <p:par>
-        <p:cTn id="1" dur="indefinite" restart="never" nodeType="tmRoot"/>
-      </p:par>
-    </p:tnLst>
-  </p:timing>
 </p:sld>
 </file>
 
@@ -5724,12 +6337,16 @@
           <a:lstStyle/>
           <a:p>
             <a:r>
+              <a:rPr lang="es-VE" dirty="0" smtClean="0"/>
+              <a:t>Instalación de </a:t>
+            </a:r>
+            <a:r>
               <a:rPr lang="es-VE" dirty="0" err="1" smtClean="0"/>
               <a:t>Bower</a:t>
             </a:r>
             <a:r>
               <a:rPr lang="es-VE" dirty="0" smtClean="0"/>
-              <a:t> INIT</a:t>
+              <a:t> </a:t>
             </a:r>
             <a:endParaRPr lang="es-VE" dirty="0"/>
           </a:p>
@@ -5737,7 +6354,7 @@
       </p:sp>
       <p:pic>
         <p:nvPicPr>
-          <p:cNvPr id="3074" name="Picture 2"/>
+          <p:cNvPr id="2050" name="Picture 2" descr="C:\Users\cmoh\AppData\Local\Temp\SNAGHTML48fedc78.PNG"/>
           <p:cNvPicPr>
             <a:picLocks noChangeAspect="1" noChangeArrowheads="1"/>
           </p:cNvPicPr>
@@ -5747,7 +6364,7 @@
           <a:blip r:embed="rId2" cstate="print">
             <a:extLst>
               <a:ext uri="{28A0092B-C50C-407E-A947-70E740481C1C}">
-                <a14:useLocalDpi xmlns:a14="http://schemas.microsoft.com/office/drawing/2010/main" val="0"/>
+                <a14:useLocalDpi xmlns:a14="http://schemas.microsoft.com/office/drawing/2010/main" xmlns="" val="0"/>
               </a:ext>
             </a:extLst>
           </a:blip>
@@ -5758,33 +6375,20 @@
         </p:blipFill>
         <p:spPr bwMode="auto">
           <a:xfrm>
-            <a:off x="539552" y="1772816"/>
-            <a:ext cx="8150687" cy="4285074"/>
+            <a:off x="539552" y="1556792"/>
+            <a:ext cx="7137311" cy="4999536"/>
           </a:xfrm>
           <a:prstGeom prst="rect">
             <a:avLst/>
           </a:prstGeom>
           <a:noFill/>
-          <a:ln>
-            <a:noFill/>
-          </a:ln>
           <a:extLst>
             <a:ext uri="{909E8E84-426E-40DD-AFC4-6F175D3DCCD1}">
-              <a14:hiddenFill xmlns:a14="http://schemas.microsoft.com/office/drawing/2010/main">
+              <a14:hiddenFill xmlns:a14="http://schemas.microsoft.com/office/drawing/2010/main" xmlns="">
                 <a:solidFill>
-                  <a:schemeClr val="accent1"/>
+                  <a:srgbClr val="FFFFFF"/>
                 </a:solidFill>
               </a14:hiddenFill>
-            </a:ext>
-            <a:ext uri="{91240B29-F687-4F45-9708-019B960494DF}">
-              <a14:hiddenLine xmlns:a14="http://schemas.microsoft.com/office/drawing/2010/main" w="9525">
-                <a:solidFill>
-                  <a:schemeClr val="tx1"/>
-                </a:solidFill>
-                <a:miter lim="800000"/>
-                <a:headEnd/>
-                <a:tailEnd/>
-              </a14:hiddenLine>
             </a:ext>
           </a:extLst>
         </p:spPr>
@@ -5792,7 +6396,7 @@
     </p:spTree>
     <p:extLst>
       <p:ext uri="{BB962C8B-B14F-4D97-AF65-F5344CB8AC3E}">
-        <p14:creationId xmlns:p14="http://schemas.microsoft.com/office/powerpoint/2010/main" val="2020869238"/>
+        <p14:creationId xmlns:p14="http://schemas.microsoft.com/office/powerpoint/2010/main" xmlns="" val="1034331391"/>
       </p:ext>
     </p:extLst>
   </p:cSld>
@@ -5842,6 +6446,124 @@
           <a:lstStyle/>
           <a:p>
             <a:r>
+              <a:rPr lang="es-VE" dirty="0" err="1" smtClean="0"/>
+              <a:t>Bower</a:t>
+            </a:r>
+            <a:r>
+              <a:rPr lang="es-VE" dirty="0" smtClean="0"/>
+              <a:t> INIT</a:t>
+            </a:r>
+            <a:endParaRPr lang="es-VE" dirty="0"/>
+          </a:p>
+        </p:txBody>
+      </p:sp>
+      <p:pic>
+        <p:nvPicPr>
+          <p:cNvPr id="3074" name="Picture 2"/>
+          <p:cNvPicPr>
+            <a:picLocks noChangeAspect="1" noChangeArrowheads="1"/>
+          </p:cNvPicPr>
+          <p:nvPr/>
+        </p:nvPicPr>
+        <p:blipFill>
+          <a:blip r:embed="rId2" cstate="print">
+            <a:extLst>
+              <a:ext uri="{28A0092B-C50C-407E-A947-70E740481C1C}">
+                <a14:useLocalDpi xmlns:a14="http://schemas.microsoft.com/office/drawing/2010/main" xmlns="" val="0"/>
+              </a:ext>
+            </a:extLst>
+          </a:blip>
+          <a:srcRect/>
+          <a:stretch>
+            <a:fillRect/>
+          </a:stretch>
+        </p:blipFill>
+        <p:spPr bwMode="auto">
+          <a:xfrm>
+            <a:off x="539552" y="1772816"/>
+            <a:ext cx="8150687" cy="4285074"/>
+          </a:xfrm>
+          <a:prstGeom prst="rect">
+            <a:avLst/>
+          </a:prstGeom>
+          <a:noFill/>
+          <a:ln>
+            <a:noFill/>
+          </a:ln>
+          <a:extLst>
+            <a:ext uri="{909E8E84-426E-40DD-AFC4-6F175D3DCCD1}">
+              <a14:hiddenFill xmlns:a14="http://schemas.microsoft.com/office/drawing/2010/main" xmlns="">
+                <a:solidFill>
+                  <a:schemeClr val="accent1"/>
+                </a:solidFill>
+              </a14:hiddenFill>
+            </a:ext>
+            <a:ext uri="{91240B29-F687-4F45-9708-019B960494DF}">
+              <a14:hiddenLine xmlns:a14="http://schemas.microsoft.com/office/drawing/2010/main" xmlns="" w="9525">
+                <a:solidFill>
+                  <a:schemeClr val="tx1"/>
+                </a:solidFill>
+                <a:miter lim="800000"/>
+                <a:headEnd/>
+                <a:tailEnd/>
+              </a14:hiddenLine>
+            </a:ext>
+          </a:extLst>
+        </p:spPr>
+      </p:pic>
+    </p:spTree>
+    <p:extLst>
+      <p:ext uri="{BB962C8B-B14F-4D97-AF65-F5344CB8AC3E}">
+        <p14:creationId xmlns:p14="http://schemas.microsoft.com/office/powerpoint/2010/main" xmlns="" val="2020869238"/>
+      </p:ext>
+    </p:extLst>
+  </p:cSld>
+  <p:clrMapOvr>
+    <a:masterClrMapping/>
+  </p:clrMapOvr>
+  <p:timing>
+    <p:tnLst>
+      <p:par>
+        <p:cTn id="1" dur="indefinite" restart="never" nodeType="tmRoot"/>
+      </p:par>
+    </p:tnLst>
+  </p:timing>
+</p:sld>
+</file>
+
+<file path=ppt/slides/slide7.xml><?xml version="1.0" encoding="utf-8"?>
+<p:sld xmlns:a="http://schemas.openxmlformats.org/drawingml/2006/main" xmlns:r="http://schemas.openxmlformats.org/officeDocument/2006/relationships" xmlns:p="http://schemas.openxmlformats.org/presentationml/2006/main">
+  <p:cSld>
+    <p:spTree>
+      <p:nvGrpSpPr>
+        <p:cNvPr id="1" name=""/>
+        <p:cNvGrpSpPr/>
+        <p:nvPr/>
+      </p:nvGrpSpPr>
+      <p:grpSpPr>
+        <a:xfrm>
+          <a:off x="0" y="0"/>
+          <a:ext cx="0" cy="0"/>
+          <a:chOff x="0" y="0"/>
+          <a:chExt cx="0" cy="0"/>
+        </a:xfrm>
+      </p:grpSpPr>
+      <p:sp>
+        <p:nvSpPr>
+          <p:cNvPr id="2" name="1 Título"/>
+          <p:cNvSpPr>
+            <a:spLocks noGrp="1"/>
+          </p:cNvSpPr>
+          <p:nvPr>
+            <p:ph type="title"/>
+          </p:nvPr>
+        </p:nvSpPr>
+        <p:spPr/>
+        <p:txBody>
+          <a:bodyPr/>
+          <a:lstStyle/>
+          <a:p>
+            <a:r>
               <a:rPr lang="es-VE" dirty="0" smtClean="0"/>
               <a:t>Instalar </a:t>
             </a:r>
@@ -5873,7 +6595,7 @@
           <a:blip r:embed="rId2" cstate="print">
             <a:extLst>
               <a:ext uri="{28A0092B-C50C-407E-A947-70E740481C1C}">
-                <a14:useLocalDpi xmlns:a14="http://schemas.microsoft.com/office/drawing/2010/main" val="0"/>
+                <a14:useLocalDpi xmlns:a14="http://schemas.microsoft.com/office/drawing/2010/main" xmlns="" val="0"/>
               </a:ext>
             </a:extLst>
           </a:blip>
@@ -5896,14 +6618,14 @@
           </a:ln>
           <a:extLst>
             <a:ext uri="{909E8E84-426E-40DD-AFC4-6F175D3DCCD1}">
-              <a14:hiddenFill xmlns:a14="http://schemas.microsoft.com/office/drawing/2010/main">
+              <a14:hiddenFill xmlns:a14="http://schemas.microsoft.com/office/drawing/2010/main" xmlns="">
                 <a:solidFill>
                   <a:schemeClr val="accent1"/>
                 </a:solidFill>
               </a14:hiddenFill>
             </a:ext>
             <a:ext uri="{91240B29-F687-4F45-9708-019B960494DF}">
-              <a14:hiddenLine xmlns:a14="http://schemas.microsoft.com/office/drawing/2010/main" w="9525">
+              <a14:hiddenLine xmlns:a14="http://schemas.microsoft.com/office/drawing/2010/main" xmlns="" w="9525">
                 <a:solidFill>
                   <a:schemeClr val="tx1"/>
                 </a:solidFill>
@@ -5927,7 +6649,7 @@
           <a:blip r:embed="rId3" cstate="print">
             <a:extLst>
               <a:ext uri="{28A0092B-C50C-407E-A947-70E740481C1C}">
-                <a14:useLocalDpi xmlns:a14="http://schemas.microsoft.com/office/drawing/2010/main" val="0"/>
+                <a14:useLocalDpi xmlns:a14="http://schemas.microsoft.com/office/drawing/2010/main" xmlns="" val="0"/>
               </a:ext>
             </a:extLst>
           </a:blip>
@@ -5950,14 +6672,14 @@
           </a:ln>
           <a:extLst>
             <a:ext uri="{909E8E84-426E-40DD-AFC4-6F175D3DCCD1}">
-              <a14:hiddenFill xmlns:a14="http://schemas.microsoft.com/office/drawing/2010/main">
+              <a14:hiddenFill xmlns:a14="http://schemas.microsoft.com/office/drawing/2010/main" xmlns="">
                 <a:solidFill>
                   <a:schemeClr val="accent1"/>
                 </a:solidFill>
               </a14:hiddenFill>
             </a:ext>
             <a:ext uri="{91240B29-F687-4F45-9708-019B960494DF}">
-              <a14:hiddenLine xmlns:a14="http://schemas.microsoft.com/office/drawing/2010/main" w="9525">
+              <a14:hiddenLine xmlns:a14="http://schemas.microsoft.com/office/drawing/2010/main" xmlns="" w="9525">
                 <a:solidFill>
                   <a:schemeClr val="tx1"/>
                 </a:solidFill>
@@ -6093,7 +6815,7 @@
     </p:spTree>
     <p:extLst>
       <p:ext uri="{BB962C8B-B14F-4D97-AF65-F5344CB8AC3E}">
-        <p14:creationId xmlns:p14="http://schemas.microsoft.com/office/powerpoint/2010/main" val="3608842146"/>
+        <p14:creationId xmlns:p14="http://schemas.microsoft.com/office/powerpoint/2010/main" xmlns="" val="3608842146"/>
       </p:ext>
     </p:extLst>
   </p:cSld>
@@ -6110,7 +6832,7 @@
 </p:sld>
 </file>
 
-<file path=ppt/slides/slide7.xml><?xml version="1.0" encoding="utf-8"?>
+<file path=ppt/slides/slide8.xml><?xml version="1.0" encoding="utf-8"?>
 <p:sld xmlns:a="http://schemas.openxmlformats.org/drawingml/2006/main" xmlns:r="http://schemas.openxmlformats.org/officeDocument/2006/relationships" xmlns:p="http://schemas.openxmlformats.org/presentationml/2006/main">
   <p:cSld>
     <p:spTree>
@@ -6188,7 +6910,7 @@
 </p:sld>
 </file>
 
-<file path=ppt/slides/slide8.xml><?xml version="1.0" encoding="utf-8"?>
+<file path=ppt/slides/slide9.xml><?xml version="1.0" encoding="utf-8"?>
 <p:sld xmlns:a="http://schemas.openxmlformats.org/drawingml/2006/main" xmlns:r="http://schemas.openxmlformats.org/officeDocument/2006/relationships" xmlns:p="http://schemas.openxmlformats.org/presentationml/2006/main">
   <p:cSld>
     <p:spTree>
@@ -6252,94 +6974,6 @@
             <a:avLst/>
           </a:prstGeom>
           <a:noFill/>
-        </p:spPr>
-      </p:pic>
-    </p:spTree>
-  </p:cSld>
-  <p:clrMapOvr>
-    <a:masterClrMapping/>
-  </p:clrMapOvr>
-</p:sld>
-</file>
-
-<file path=ppt/slides/slide9.xml><?xml version="1.0" encoding="utf-8"?>
-<p:sld xmlns:a="http://schemas.openxmlformats.org/drawingml/2006/main" xmlns:r="http://schemas.openxmlformats.org/officeDocument/2006/relationships" xmlns:p="http://schemas.openxmlformats.org/presentationml/2006/main">
-  <p:cSld>
-    <p:spTree>
-      <p:nvGrpSpPr>
-        <p:cNvPr id="1" name=""/>
-        <p:cNvGrpSpPr/>
-        <p:nvPr/>
-      </p:nvGrpSpPr>
-      <p:grpSpPr>
-        <a:xfrm>
-          <a:off x="0" y="0"/>
-          <a:ext cx="0" cy="0"/>
-          <a:chOff x="0" y="0"/>
-          <a:chExt cx="0" cy="0"/>
-        </a:xfrm>
-      </p:grpSpPr>
-      <p:sp>
-        <p:nvSpPr>
-          <p:cNvPr id="2" name="1 Título"/>
-          <p:cNvSpPr>
-            <a:spLocks noGrp="1"/>
-          </p:cNvSpPr>
-          <p:nvPr>
-            <p:ph type="title"/>
-          </p:nvPr>
-        </p:nvSpPr>
-        <p:spPr/>
-        <p:txBody>
-          <a:bodyPr/>
-          <a:lstStyle/>
-          <a:p>
-            <a:r>
-              <a:rPr lang="es-VE" dirty="0" smtClean="0"/>
-              <a:t>Sumar </a:t>
-            </a:r>
-            <a:r>
-              <a:rPr lang="es-VE" dirty="0" err="1" smtClean="0"/>
-              <a:t>grunt</a:t>
-            </a:r>
-            <a:r>
-              <a:rPr lang="es-VE" dirty="0" smtClean="0"/>
-              <a:t> al proyecto</a:t>
-            </a:r>
-            <a:endParaRPr lang="es-VE" dirty="0"/>
-          </a:p>
-        </p:txBody>
-      </p:sp>
-      <p:pic>
-        <p:nvPicPr>
-          <p:cNvPr id="22530" name="Picture 2"/>
-          <p:cNvPicPr>
-            <a:picLocks noChangeAspect="1" noChangeArrowheads="1"/>
-          </p:cNvPicPr>
-          <p:nvPr/>
-        </p:nvPicPr>
-        <p:blipFill>
-          <a:blip r:embed="rId2" cstate="print"/>
-          <a:srcRect/>
-          <a:stretch>
-            <a:fillRect/>
-          </a:stretch>
-        </p:blipFill>
-        <p:spPr bwMode="auto">
-          <a:xfrm>
-            <a:off x="1331640" y="2132856"/>
-            <a:ext cx="6305550" cy="3848100"/>
-          </a:xfrm>
-          <a:prstGeom prst="rect">
-            <a:avLst/>
-          </a:prstGeom>
-          <a:noFill/>
-          <a:ln w="9525">
-            <a:noFill/>
-            <a:miter lim="800000"/>
-            <a:headEnd/>
-            <a:tailEnd/>
-          </a:ln>
         </p:spPr>
       </p:pic>
     </p:spTree>

</xml_diff>

<commit_message>
se agrega sección de preparación del ambiente de desarrollo rapido se agrega instalación de plugin de GRUNT: Clean y COPY
</commit_message>
<xml_diff>
--- a/bitacora_desarrollo.pptx
+++ b/bitacora_desarrollo.pptx
@@ -308,7 +308,7 @@
             <a:fld id="{7A847CFC-816F-41D0-AAC0-9BF4FEBC753E}" type="datetimeFigureOut">
               <a:rPr lang="es-ES" smtClean="0"/>
               <a:pPr/>
-              <a:t>27/10/2015</a:t>
+              <a:t>28/10/2015</a:t>
             </a:fld>
             <a:endParaRPr lang="es-ES"/>
           </a:p>
@@ -510,7 +510,7 @@
             <a:fld id="{7A847CFC-816F-41D0-AAC0-9BF4FEBC753E}" type="datetimeFigureOut">
               <a:rPr lang="es-ES" smtClean="0"/>
               <a:pPr/>
-              <a:t>27/10/2015</a:t>
+              <a:t>28/10/2015</a:t>
             </a:fld>
             <a:endParaRPr lang="es-ES"/>
           </a:p>
@@ -687,7 +687,7 @@
             <a:fld id="{7A847CFC-816F-41D0-AAC0-9BF4FEBC753E}" type="datetimeFigureOut">
               <a:rPr lang="es-ES" smtClean="0"/>
               <a:pPr/>
-              <a:t>27/10/2015</a:t>
+              <a:t>28/10/2015</a:t>
             </a:fld>
             <a:endParaRPr lang="es-ES"/>
           </a:p>
@@ -854,7 +854,7 @@
             <a:fld id="{7A847CFC-816F-41D0-AAC0-9BF4FEBC753E}" type="datetimeFigureOut">
               <a:rPr lang="es-ES" smtClean="0"/>
               <a:pPr/>
-              <a:t>27/10/2015</a:t>
+              <a:t>28/10/2015</a:t>
             </a:fld>
             <a:endParaRPr lang="es-ES"/>
           </a:p>
@@ -1104,7 +1104,7 @@
             <a:fld id="{7A847CFC-816F-41D0-AAC0-9BF4FEBC753E}" type="datetimeFigureOut">
               <a:rPr lang="es-ES" smtClean="0"/>
               <a:pPr/>
-              <a:t>27/10/2015</a:t>
+              <a:t>28/10/2015</a:t>
             </a:fld>
             <a:endParaRPr lang="es-ES"/>
           </a:p>
@@ -1424,7 +1424,7 @@
             <a:fld id="{7A847CFC-816F-41D0-AAC0-9BF4FEBC753E}" type="datetimeFigureOut">
               <a:rPr lang="es-ES" smtClean="0"/>
               <a:pPr/>
-              <a:t>27/10/2015</a:t>
+              <a:t>28/10/2015</a:t>
             </a:fld>
             <a:endParaRPr lang="es-ES"/>
           </a:p>
@@ -1892,7 +1892,7 @@
             <a:fld id="{7A847CFC-816F-41D0-AAC0-9BF4FEBC753E}" type="datetimeFigureOut">
               <a:rPr lang="es-ES" smtClean="0"/>
               <a:pPr/>
-              <a:t>27/10/2015</a:t>
+              <a:t>28/10/2015</a:t>
             </a:fld>
             <a:endParaRPr lang="es-ES"/>
           </a:p>
@@ -2042,7 +2042,7 @@
             <a:fld id="{7A847CFC-816F-41D0-AAC0-9BF4FEBC753E}" type="datetimeFigureOut">
               <a:rPr lang="es-ES" smtClean="0"/>
               <a:pPr/>
-              <a:t>27/10/2015</a:t>
+              <a:t>28/10/2015</a:t>
             </a:fld>
             <a:endParaRPr lang="es-ES"/>
           </a:p>
@@ -2134,7 +2134,7 @@
             <a:fld id="{7A847CFC-816F-41D0-AAC0-9BF4FEBC753E}" type="datetimeFigureOut">
               <a:rPr lang="es-ES" smtClean="0"/>
               <a:pPr/>
-              <a:t>27/10/2015</a:t>
+              <a:t>28/10/2015</a:t>
             </a:fld>
             <a:endParaRPr lang="es-ES"/>
           </a:p>
@@ -2410,7 +2410,7 @@
             <a:fld id="{7A847CFC-816F-41D0-AAC0-9BF4FEBC753E}" type="datetimeFigureOut">
               <a:rPr lang="es-ES" smtClean="0"/>
               <a:pPr/>
-              <a:t>27/10/2015</a:t>
+              <a:t>28/10/2015</a:t>
             </a:fld>
             <a:endParaRPr lang="es-ES"/>
           </a:p>
@@ -2717,7 +2717,7 @@
             <a:fld id="{7A847CFC-816F-41D0-AAC0-9BF4FEBC753E}" type="datetimeFigureOut">
               <a:rPr lang="es-ES" smtClean="0"/>
               <a:pPr/>
-              <a:t>27/10/2015</a:t>
+              <a:t>28/10/2015</a:t>
             </a:fld>
             <a:endParaRPr lang="es-ES"/>
           </a:p>
@@ -3017,7 +3017,7 @@
             <a:fld id="{7A847CFC-816F-41D0-AAC0-9BF4FEBC753E}" type="datetimeFigureOut">
               <a:rPr lang="es-ES" smtClean="0"/>
               <a:pPr/>
-              <a:t>27/10/2015</a:t>
+              <a:t>28/10/2015</a:t>
             </a:fld>
             <a:endParaRPr lang="es-ES"/>
           </a:p>
@@ -3431,8 +3431,8 @@
           <a:lstStyle/>
           <a:p>
             <a:r>
-              <a:rPr lang="es-VE" dirty="0" smtClean="0"/>
-              <a:t>Herramientas</a:t>
+              <a:rPr lang="es-VE" smtClean="0"/>
+              <a:t>Herramientas </a:t>
             </a:r>
             <a:endParaRPr lang="es-VE" dirty="0"/>
           </a:p>
@@ -3918,11 +3918,7 @@
                     <a:p>
                       <a:r>
                         <a:rPr lang="es-VE" sz="1600" dirty="0" smtClean="0"/>
-                        <a:t>Librería para la automatización de </a:t>
-                      </a:r>
-                      <a:r>
-                        <a:rPr lang="es-VE" sz="1600" dirty="0" smtClean="0"/>
-                        <a:t>tareas</a:t>
+                        <a:t>Librería para la automatización de tareas</a:t>
                       </a:r>
                       <a:endParaRPr lang="es-VE" sz="1600" dirty="0"/>
                     </a:p>
@@ -4191,11 +4187,7 @@
                       </a:r>
                       <a:r>
                         <a:rPr lang="es-VE" sz="1600" baseline="0" dirty="0" smtClean="0"/>
-                        <a:t> recomendada para la edición de </a:t>
-                      </a:r>
-                      <a:r>
-                        <a:rPr lang="es-VE" sz="1600" baseline="0" dirty="0" smtClean="0"/>
-                        <a:t>HTML</a:t>
+                        <a:t> recomendada para la edición de HTML</a:t>
                       </a:r>
                       <a:endParaRPr lang="es-VE" sz="1600" dirty="0"/>
                     </a:p>
@@ -4294,7 +4286,7 @@
     </p:spTree>
     <p:extLst>
       <p:ext uri="{BB962C8B-B14F-4D97-AF65-F5344CB8AC3E}">
-        <p14:creationId xmlns:p14="http://schemas.microsoft.com/office/powerpoint/2010/main" xmlns="" val="2585810778"/>
+        <p14:creationId xmlns="" xmlns:p14="http://schemas.microsoft.com/office/powerpoint/2010/main" val="2585810778"/>
       </p:ext>
     </p:extLst>
   </p:cSld>
@@ -4810,7 +4802,7 @@
     </p:spTree>
     <p:extLst>
       <p:ext uri="{BB962C8B-B14F-4D97-AF65-F5344CB8AC3E}">
-        <p14:creationId xmlns:p14="http://schemas.microsoft.com/office/powerpoint/2010/main" xmlns="" val="2061773745"/>
+        <p14:creationId xmlns="" xmlns:p14="http://schemas.microsoft.com/office/powerpoint/2010/main" val="2061773745"/>
       </p:ext>
     </p:extLst>
   </p:cSld>
@@ -5163,24 +5155,7 @@
                 <a:ea typeface="+mn-ea"/>
                 <a:cs typeface="+mn-cs"/>
               </a:rPr>
-              <a:t>- Editor Texto para desarrollo </a:t>
-            </a:r>
-            <a:r>
-              <a:rPr kumimoji="0" lang="es-VE" b="0" i="0" u="none" strike="noStrike" kern="1200" cap="none" spc="0" normalizeH="0" baseline="0" noProof="0" dirty="0" smtClean="0">
-                <a:ln>
-                  <a:noFill/>
-                </a:ln>
-                <a:solidFill>
-                  <a:schemeClr val="tx1"/>
-                </a:solidFill>
-                <a:effectLst/>
-                <a:uLnTx/>
-                <a:uFillTx/>
-                <a:latin typeface="+mn-lt"/>
-                <a:ea typeface="+mn-ea"/>
-                <a:cs typeface="+mn-cs"/>
-              </a:rPr>
-              <a:t>web</a:t>
+              <a:t>- Editor Texto para desarrollo web</a:t>
             </a:r>
           </a:p>
           <a:p>
@@ -5200,13 +5175,7 @@
               <a:rPr lang="es-VE" dirty="0" smtClean="0">
                 <a:hlinkClick r:id="rId4"/>
               </a:rPr>
-              <a:t>http://frontendlabs.io/146--</a:t>
-            </a:r>
-            <a:r>
-              <a:rPr lang="es-VE" dirty="0" smtClean="0">
-                <a:hlinkClick r:id="rId4"/>
-              </a:rPr>
-              <a:t>grunt-js-espanol-tutorial-basico-primeros-pasos</a:t>
+              <a:t>http://frontendlabs.io/146--grunt-js-espanol-tutorial-basico-primeros-pasos</a:t>
             </a:r>
             <a:endParaRPr lang="es-VE" dirty="0" smtClean="0"/>
           </a:p>
@@ -5383,7 +5352,7 @@
     </p:spTree>
     <p:extLst>
       <p:ext uri="{BB962C8B-B14F-4D97-AF65-F5344CB8AC3E}">
-        <p14:creationId xmlns:p14="http://schemas.microsoft.com/office/powerpoint/2010/main" xmlns="" val="1503682371"/>
+        <p14:creationId xmlns="" xmlns:p14="http://schemas.microsoft.com/office/powerpoint/2010/main" val="1503682371"/>
       </p:ext>
     </p:extLst>
   </p:cSld>
@@ -5545,11 +5514,7 @@
             </a:r>
             <a:r>
               <a:rPr lang="en-US" sz="1600" i="1" dirty="0" smtClean="0"/>
-              <a:t>--</a:t>
-            </a:r>
-            <a:r>
-              <a:rPr lang="en-US" sz="1600" i="1" dirty="0" smtClean="0"/>
-              <a:t>save-dev</a:t>
+              <a:t>--save-dev</a:t>
             </a:r>
             <a:endParaRPr lang="es-VE" sz="1600" i="1" dirty="0" smtClean="0"/>
           </a:p>
@@ -5581,13 +5546,8 @@
             </a:r>
             <a:r>
               <a:rPr lang="en-US" sz="1600" i="1" dirty="0" smtClean="0"/>
-              <a:t> --</a:t>
-            </a:r>
-            <a:r>
-              <a:rPr lang="en-US" sz="1600" i="1" dirty="0" smtClean="0"/>
-              <a:t>save-dev</a:t>
-            </a:r>
-            <a:endParaRPr lang="en-US" sz="1600" i="1" dirty="0" smtClean="0"/>
+              <a:t> --save-dev</a:t>
+            </a:r>
           </a:p>
           <a:p>
             <a:pPr marL="285750" lvl="2" indent="-285750">
@@ -5641,11 +5601,7 @@
             </a:r>
             <a:r>
               <a:rPr lang="en-US" sz="1600" i="1" dirty="0" smtClean="0"/>
-              <a:t> install -g </a:t>
-            </a:r>
-            <a:r>
-              <a:rPr lang="en-US" sz="1600" i="1" dirty="0" smtClean="0"/>
-              <a:t>grunt-</a:t>
+              <a:t> install -g grunt-</a:t>
             </a:r>
             <a:r>
               <a:rPr lang="en-US" sz="1600" i="1" dirty="0" err="1" smtClean="0"/>
@@ -5653,44 +5609,177 @@
             </a:r>
             <a:r>
               <a:rPr lang="en-US" sz="1600" i="1" dirty="0" smtClean="0"/>
+              <a:t> --save-dev</a:t>
+            </a:r>
+          </a:p>
+          <a:p>
+            <a:pPr marL="560070" lvl="2" indent="-285750"/>
+            <a:r>
+              <a:rPr lang="en-US" sz="1600" i="1" dirty="0" err="1" smtClean="0"/>
+              <a:t>npm</a:t>
+            </a:r>
+            <a:r>
+              <a:rPr lang="en-US" sz="1600" i="1" dirty="0" smtClean="0"/>
+              <a:t> install grunt --save-dev</a:t>
+            </a:r>
+          </a:p>
+          <a:p>
+            <a:pPr marL="285750" indent="-285750"/>
+            <a:r>
+              <a:rPr lang="en-US" sz="1600" b="1" dirty="0" err="1" smtClean="0"/>
+              <a:t>Instalar</a:t>
+            </a:r>
+            <a:r>
+              <a:rPr lang="en-US" sz="1600" b="1" dirty="0" smtClean="0"/>
+              <a:t> PLUGINS DE GRUNT</a:t>
+            </a:r>
+          </a:p>
+          <a:p>
+            <a:pPr marL="560070" lvl="1" indent="-285750"/>
+            <a:r>
+              <a:rPr lang="en-US" sz="1600" i="1" dirty="0" err="1" smtClean="0"/>
+              <a:t>npm</a:t>
+            </a:r>
+            <a:r>
+              <a:rPr lang="en-US" sz="1600" i="1" dirty="0" smtClean="0"/>
+              <a:t> install grunt-</a:t>
+            </a:r>
+            <a:r>
+              <a:rPr lang="en-US" sz="1600" i="1" dirty="0" err="1" smtClean="0"/>
+              <a:t>contrib</a:t>
+            </a:r>
+            <a:r>
+              <a:rPr lang="en-US" sz="1600" i="1" dirty="0" smtClean="0"/>
+              <a:t>-copy --save-dev</a:t>
+            </a:r>
+          </a:p>
+          <a:p>
+            <a:pPr marL="560070" lvl="1" indent="-285750"/>
+            <a:r>
+              <a:rPr lang="en-US" sz="1600" i="1" dirty="0" err="1" smtClean="0"/>
+              <a:t>npm</a:t>
+            </a:r>
+            <a:r>
+              <a:rPr lang="en-US" sz="1600" i="1" dirty="0" smtClean="0"/>
+              <a:t> install grunt-</a:t>
+            </a:r>
+            <a:r>
+              <a:rPr lang="en-US" sz="1600" i="1" dirty="0" err="1" smtClean="0"/>
+              <a:t>contrib</a:t>
+            </a:r>
+            <a:r>
+              <a:rPr lang="en-US" sz="1600" i="1" dirty="0" smtClean="0"/>
+              <a:t>-clean --save-dev</a:t>
+            </a:r>
+          </a:p>
+          <a:p>
+            <a:pPr marL="560070" lvl="1" indent="-285750"/>
+            <a:r>
+              <a:rPr lang="en-US" sz="1600" i="1" dirty="0" err="1" smtClean="0"/>
+              <a:t>npm</a:t>
+            </a:r>
+            <a:r>
+              <a:rPr lang="en-US" sz="1600" i="1" dirty="0" smtClean="0"/>
+              <a:t> install grunt-</a:t>
+            </a:r>
+            <a:r>
+              <a:rPr lang="en-US" sz="1600" i="1" dirty="0" err="1" smtClean="0"/>
+              <a:t>contrib</a:t>
+            </a:r>
+            <a:r>
+              <a:rPr lang="en-US" sz="1600" i="1" dirty="0" smtClean="0"/>
+              <a:t>-watch --save-dev</a:t>
+            </a:r>
+          </a:p>
+          <a:p>
+            <a:pPr marL="560070" lvl="1" indent="-285750"/>
+            <a:r>
+              <a:rPr lang="en-US" sz="1600" i="1" dirty="0" err="1" smtClean="0"/>
+              <a:t>npm</a:t>
+            </a:r>
+            <a:r>
+              <a:rPr lang="en-US" sz="1600" i="1" dirty="0" smtClean="0"/>
+              <a:t> install grunt-</a:t>
+            </a:r>
+            <a:r>
+              <a:rPr lang="en-US" sz="1600" i="1" dirty="0" err="1" smtClean="0"/>
+              <a:t>browserify</a:t>
+            </a:r>
+            <a:r>
+              <a:rPr lang="en-US" sz="1600" i="1" dirty="0" smtClean="0"/>
+              <a:t> --save-dev</a:t>
+            </a:r>
+          </a:p>
+          <a:p>
+            <a:pPr marL="560070" lvl="1" indent="-285750"/>
+            <a:r>
+              <a:rPr lang="en-US" sz="1600" i="1" dirty="0" err="1" smtClean="0"/>
+              <a:t>npm</a:t>
+            </a:r>
+            <a:r>
+              <a:rPr lang="en-US" sz="1600" i="1" dirty="0" smtClean="0"/>
+              <a:t> install grunt-</a:t>
+            </a:r>
+            <a:r>
+              <a:rPr lang="en-US" sz="1600" i="1" dirty="0" err="1" smtClean="0"/>
+              <a:t>contrib</a:t>
+            </a:r>
+            <a:r>
+              <a:rPr lang="en-US" sz="1600" i="1" dirty="0" smtClean="0"/>
+              <a:t>-</a:t>
+            </a:r>
+            <a:r>
+              <a:rPr lang="en-US" sz="1600" i="1" dirty="0" err="1" smtClean="0"/>
+              <a:t>jshint</a:t>
+            </a:r>
+            <a:r>
+              <a:rPr lang="en-US" sz="1600" i="1" dirty="0" smtClean="0"/>
+              <a:t> --save-dev</a:t>
+            </a:r>
+          </a:p>
+          <a:p>
+            <a:pPr marL="560070" lvl="1" indent="-285750"/>
+            <a:r>
+              <a:rPr lang="en-US" sz="1600" i="1" dirty="0" err="1" smtClean="0"/>
+              <a:t>npm</a:t>
+            </a:r>
+            <a:r>
+              <a:rPr lang="en-US" sz="1600" i="1" dirty="0" smtClean="0"/>
+              <a:t> </a:t>
+            </a:r>
+            <a:r>
+              <a:rPr lang="en-US" sz="1600" i="1" dirty="0"/>
+              <a:t>install grunt-</a:t>
+            </a:r>
+            <a:r>
+              <a:rPr lang="en-US" sz="1600" i="1" dirty="0" err="1"/>
+              <a:t>contrib</a:t>
+            </a:r>
+            <a:r>
+              <a:rPr lang="en-US" sz="1600" i="1" dirty="0"/>
+              <a:t>-</a:t>
+            </a:r>
+            <a:r>
+              <a:rPr lang="en-US" sz="1600" i="1" dirty="0" err="1"/>
+              <a:t>uglify</a:t>
+            </a:r>
+            <a:r>
+              <a:rPr lang="en-US" sz="1600" i="1" dirty="0"/>
               <a:t> --</a:t>
             </a:r>
             <a:r>
               <a:rPr lang="en-US" sz="1600" i="1" dirty="0" smtClean="0"/>
               <a:t>save-dev</a:t>
             </a:r>
-            <a:endParaRPr lang="en-US" sz="1600" i="1" dirty="0" smtClean="0"/>
-          </a:p>
-          <a:p>
-            <a:pPr marL="560070" lvl="2" indent="-285750"/>
+          </a:p>
+          <a:p>
+            <a:pPr marL="560070" lvl="1" indent="-285750"/>
             <a:r>
               <a:rPr lang="en-US" sz="1600" i="1" dirty="0" err="1" smtClean="0"/>
               <a:t>npm</a:t>
             </a:r>
             <a:r>
               <a:rPr lang="en-US" sz="1600" i="1" dirty="0" smtClean="0"/>
-              <a:t> install grunt --save-dev</a:t>
-            </a:r>
-          </a:p>
-          <a:p>
-            <a:pPr marL="285750" indent="-285750"/>
-            <a:r>
-              <a:rPr lang="en-US" sz="1600" b="1" dirty="0" err="1" smtClean="0"/>
-              <a:t>Instalar</a:t>
-            </a:r>
-            <a:r>
-              <a:rPr lang="en-US" sz="1600" b="1" dirty="0" smtClean="0"/>
-              <a:t> PLUGINS DE GRUNT</a:t>
-            </a:r>
-          </a:p>
-          <a:p>
-            <a:pPr marL="560070" lvl="1" indent="-285750"/>
-            <a:r>
-              <a:rPr lang="en-US" sz="1600" i="1" dirty="0" err="1" smtClean="0"/>
-              <a:t>npm</a:t>
-            </a:r>
-            <a:r>
-              <a:rPr lang="en-US" sz="1600" i="1" dirty="0" smtClean="0"/>
               <a:t> install grunt-</a:t>
             </a:r>
             <a:r>
@@ -5699,155 +5788,8 @@
             </a:r>
             <a:r>
               <a:rPr lang="en-US" sz="1600" i="1" dirty="0" smtClean="0"/>
-              <a:t>-copy --</a:t>
-            </a:r>
-            <a:r>
-              <a:rPr lang="en-US" sz="1600" i="1" dirty="0" smtClean="0"/>
-              <a:t>save-dev</a:t>
-            </a:r>
-          </a:p>
-          <a:p>
-            <a:pPr marL="560070" lvl="1" indent="-285750"/>
-            <a:r>
-              <a:rPr lang="en-US" sz="1600" i="1" dirty="0" err="1" smtClean="0"/>
-              <a:t>npm</a:t>
-            </a:r>
-            <a:r>
-              <a:rPr lang="en-US" sz="1600" i="1" dirty="0" smtClean="0"/>
-              <a:t> install grunt-</a:t>
-            </a:r>
-            <a:r>
-              <a:rPr lang="en-US" sz="1600" i="1" dirty="0" err="1" smtClean="0"/>
-              <a:t>contrib</a:t>
-            </a:r>
-            <a:r>
-              <a:rPr lang="en-US" sz="1600" i="1" dirty="0" smtClean="0"/>
-              <a:t>-clean --save-dev</a:t>
-            </a:r>
-          </a:p>
-          <a:p>
-            <a:pPr marL="560070" lvl="1" indent="-285750"/>
-            <a:r>
-              <a:rPr lang="en-US" sz="1600" i="1" dirty="0" err="1" smtClean="0"/>
-              <a:t>npm</a:t>
-            </a:r>
-            <a:r>
-              <a:rPr lang="en-US" sz="1600" i="1" dirty="0" smtClean="0"/>
-              <a:t> </a:t>
-            </a:r>
-            <a:r>
-              <a:rPr lang="en-US" sz="1600" i="1" dirty="0" smtClean="0"/>
-              <a:t>install grunt-</a:t>
-            </a:r>
-            <a:r>
-              <a:rPr lang="en-US" sz="1600" i="1" dirty="0" err="1" smtClean="0"/>
-              <a:t>contrib</a:t>
-            </a:r>
-            <a:r>
-              <a:rPr lang="en-US" sz="1600" i="1" dirty="0" smtClean="0"/>
-              <a:t>-watch --save-dev</a:t>
-            </a:r>
-          </a:p>
-          <a:p>
-            <a:pPr marL="560070" lvl="1" indent="-285750"/>
-            <a:r>
-              <a:rPr lang="en-US" sz="1600" i="1" dirty="0" err="1" smtClean="0"/>
-              <a:t>npm</a:t>
-            </a:r>
-            <a:r>
-              <a:rPr lang="en-US" sz="1600" i="1" dirty="0" smtClean="0"/>
-              <a:t> install grunt-</a:t>
-            </a:r>
-            <a:r>
-              <a:rPr lang="en-US" sz="1600" i="1" dirty="0" err="1" smtClean="0"/>
-              <a:t>browserify</a:t>
-            </a:r>
-            <a:r>
-              <a:rPr lang="en-US" sz="1600" i="1" dirty="0" smtClean="0"/>
-              <a:t> --save-dev</a:t>
-            </a:r>
-          </a:p>
-          <a:p>
-            <a:pPr marL="560070" lvl="1" indent="-285750"/>
-            <a:r>
-              <a:rPr lang="en-US" sz="1600" i="1" dirty="0" err="1" smtClean="0"/>
-              <a:t>npm</a:t>
-            </a:r>
-            <a:r>
-              <a:rPr lang="en-US" sz="1600" i="1" dirty="0" smtClean="0"/>
-              <a:t> install grunt-</a:t>
-            </a:r>
-            <a:r>
-              <a:rPr lang="en-US" sz="1600" i="1" dirty="0" err="1" smtClean="0"/>
-              <a:t>contrib</a:t>
-            </a:r>
-            <a:r>
-              <a:rPr lang="en-US" sz="1600" i="1" dirty="0" smtClean="0"/>
-              <a:t>-</a:t>
-            </a:r>
-            <a:r>
-              <a:rPr lang="en-US" sz="1600" i="1" dirty="0" err="1" smtClean="0"/>
-              <a:t>jshint</a:t>
-            </a:r>
-            <a:r>
-              <a:rPr lang="en-US" sz="1600" i="1" dirty="0" smtClean="0"/>
-              <a:t> --save-dev</a:t>
-            </a:r>
-          </a:p>
-          <a:p>
-            <a:pPr marL="560070" lvl="1" indent="-285750"/>
-            <a:r>
-              <a:rPr lang="en-US" sz="1600" i="1" dirty="0" err="1" smtClean="0"/>
-              <a:t>npm</a:t>
-            </a:r>
-            <a:r>
-              <a:rPr lang="en-US" sz="1600" i="1" dirty="0" smtClean="0"/>
-              <a:t> </a:t>
-            </a:r>
-            <a:r>
-              <a:rPr lang="en-US" sz="1600" i="1" dirty="0"/>
-              <a:t>install grunt-</a:t>
-            </a:r>
-            <a:r>
-              <a:rPr lang="en-US" sz="1600" i="1" dirty="0" err="1"/>
-              <a:t>contrib</a:t>
-            </a:r>
-            <a:r>
-              <a:rPr lang="en-US" sz="1600" i="1" dirty="0"/>
-              <a:t>-</a:t>
-            </a:r>
-            <a:r>
-              <a:rPr lang="en-US" sz="1600" i="1" dirty="0" err="1"/>
-              <a:t>uglify</a:t>
-            </a:r>
-            <a:r>
-              <a:rPr lang="en-US" sz="1600" i="1" dirty="0"/>
-              <a:t> --</a:t>
-            </a:r>
-            <a:r>
-              <a:rPr lang="en-US" sz="1600" i="1" dirty="0" smtClean="0"/>
-              <a:t>save-dev</a:t>
-            </a:r>
-          </a:p>
-          <a:p>
-            <a:pPr marL="560070" lvl="1" indent="-285750"/>
-            <a:r>
-              <a:rPr lang="en-US" sz="1600" i="1" dirty="0" err="1" smtClean="0"/>
-              <a:t>npm</a:t>
-            </a:r>
-            <a:r>
-              <a:rPr lang="en-US" sz="1600" i="1" dirty="0" smtClean="0"/>
-              <a:t> install grunt-</a:t>
-            </a:r>
-            <a:r>
-              <a:rPr lang="en-US" sz="1600" i="1" dirty="0" err="1" smtClean="0"/>
-              <a:t>contrib</a:t>
-            </a:r>
-            <a:r>
-              <a:rPr lang="en-US" sz="1600" i="1" dirty="0" smtClean="0"/>
               <a:t>-jade --save-dev</a:t>
             </a:r>
-            <a:endParaRPr lang="en-US" sz="1600" i="1" dirty="0" smtClean="0"/>
           </a:p>
           <a:p>
             <a:pPr marL="285750" indent="-285750"/>
@@ -5875,11 +5817,7 @@
             </a:r>
             <a:r>
               <a:rPr lang="es-VE" sz="1900" dirty="0" err="1" smtClean="0"/>
-              <a:t>save</a:t>
-            </a:r>
-            <a:r>
-              <a:rPr lang="es-VE" sz="1900" dirty="0" err="1" smtClean="0"/>
-              <a:t>-dev</a:t>
+              <a:t>save-dev</a:t>
             </a:r>
             <a:r>
               <a:rPr lang="es-VE" sz="1900" dirty="0" smtClean="0"/>
@@ -5896,7 +5834,7 @@
     </p:spTree>
     <p:extLst>
       <p:ext uri="{BB962C8B-B14F-4D97-AF65-F5344CB8AC3E}">
-        <p14:creationId xmlns:p14="http://schemas.microsoft.com/office/powerpoint/2010/main" xmlns="" val="1407232196"/>
+        <p14:creationId xmlns="" xmlns:p14="http://schemas.microsoft.com/office/powerpoint/2010/main" val="1407232196"/>
       </p:ext>
     </p:extLst>
   </p:cSld>
@@ -6014,13 +5952,7 @@
               <a:rPr lang="es-VE" sz="1600" dirty="0" smtClean="0">
                 <a:hlinkClick r:id="rId3"/>
               </a:rPr>
-              <a:t>https://</a:t>
-            </a:r>
-            <a:r>
-              <a:rPr lang="es-VE" sz="1600" dirty="0" smtClean="0">
-                <a:hlinkClick r:id="rId3"/>
-              </a:rPr>
-              <a:t>github.com/git-for-windows/git/releases/tag/v2.5.3.windows.1</a:t>
+              <a:t>https://github.com/git-for-windows/git/releases/tag/v2.5.3.windows.1</a:t>
             </a:r>
             <a:endParaRPr lang="es-VE" dirty="0" smtClean="0"/>
           </a:p>
@@ -6028,29 +5960,13 @@
             <a:pPr marL="285750" indent="-285750"/>
             <a:r>
               <a:rPr lang="es-VE" sz="1800" b="1" dirty="0" smtClean="0"/>
-              <a:t>Clonar en tu ambiente la rama GIT </a:t>
-            </a:r>
-            <a:r>
-              <a:rPr lang="es-VE" sz="1800" b="1" dirty="0" smtClean="0"/>
-              <a:t>- </a:t>
+              <a:t>Clonar en tu ambiente la rama GIT - </a:t>
             </a:r>
             <a:r>
               <a:rPr lang="es-VE" sz="1600" dirty="0" smtClean="0">
                 <a:hlinkClick r:id="rId4"/>
               </a:rPr>
-              <a:t>https</a:t>
-            </a:r>
-            <a:r>
-              <a:rPr lang="es-VE" sz="1600" dirty="0" smtClean="0">
-                <a:hlinkClick r:id="rId4"/>
-              </a:rPr>
-              <a:t>://</a:t>
-            </a:r>
-            <a:r>
-              <a:rPr lang="es-VE" sz="1600" dirty="0" smtClean="0">
-                <a:hlinkClick r:id="rId4"/>
-              </a:rPr>
-              <a:t>github.com/AcordeGroup/portal.git</a:t>
+              <a:t>https://github.com/AcordeGroup/portal.git</a:t>
             </a:r>
             <a:endParaRPr lang="es-VE" dirty="0" smtClean="0"/>
           </a:p>
@@ -6058,15 +5974,7 @@
             <a:pPr marL="285750" indent="-285750"/>
             <a:r>
               <a:rPr lang="es-VE" sz="1800" b="1" dirty="0" smtClean="0"/>
-              <a:t>Abrir una consola e ir hasta </a:t>
-            </a:r>
-            <a:r>
-              <a:rPr lang="es-VE" sz="1800" b="1" dirty="0" smtClean="0"/>
-              <a:t>el directorio </a:t>
-            </a:r>
-            <a:r>
-              <a:rPr lang="es-VE" sz="1800" b="1" dirty="0" smtClean="0"/>
-              <a:t>\portal\</a:t>
+              <a:t>Abrir una consola e ir hasta el directorio \portal\</a:t>
             </a:r>
             <a:r>
               <a:rPr lang="es-VE" sz="1800" b="1" dirty="0" err="1" smtClean="0"/>
@@ -6078,11 +5986,7 @@
             </a:r>
             <a:r>
               <a:rPr lang="es-VE" sz="1800" dirty="0" smtClean="0"/>
-              <a:t>donde se encuentra </a:t>
-            </a:r>
-            <a:r>
-              <a:rPr lang="es-VE" sz="1800" dirty="0" smtClean="0"/>
-              <a:t>el archivo </a:t>
+              <a:t>donde se encuentra el archivo </a:t>
             </a:r>
             <a:r>
               <a:rPr lang="es-VE" sz="1800" i="1" dirty="0" err="1" smtClean="0">
@@ -6189,15 +6093,7 @@
                   <a:srgbClr val="0070C0"/>
                 </a:solidFill>
               </a:rPr>
-              <a:t> </a:t>
-            </a:r>
-            <a:r>
-              <a:rPr lang="es-VE" sz="1600" b="1" i="1" dirty="0" smtClean="0">
-                <a:solidFill>
-                  <a:srgbClr val="0070C0"/>
-                </a:solidFill>
-              </a:rPr>
-              <a:t>–</a:t>
+              <a:t> –</a:t>
             </a:r>
             <a:r>
               <a:rPr lang="es-VE" sz="1600" b="1" i="1" dirty="0" err="1" smtClean="0">
@@ -6364,7 +6260,7 @@
           <a:blip r:embed="rId2" cstate="print">
             <a:extLst>
               <a:ext uri="{28A0092B-C50C-407E-A947-70E740481C1C}">
-                <a14:useLocalDpi xmlns:a14="http://schemas.microsoft.com/office/drawing/2010/main" xmlns="" val="0"/>
+                <a14:useLocalDpi xmlns="" xmlns:a14="http://schemas.microsoft.com/office/drawing/2010/main" val="0"/>
               </a:ext>
             </a:extLst>
           </a:blip>
@@ -6384,7 +6280,7 @@
           <a:noFill/>
           <a:extLst>
             <a:ext uri="{909E8E84-426E-40DD-AFC4-6F175D3DCCD1}">
-              <a14:hiddenFill xmlns:a14="http://schemas.microsoft.com/office/drawing/2010/main" xmlns="">
+              <a14:hiddenFill xmlns="" xmlns:a14="http://schemas.microsoft.com/office/drawing/2010/main">
                 <a:solidFill>
                   <a:srgbClr val="FFFFFF"/>
                 </a:solidFill>
@@ -6396,7 +6292,7 @@
     </p:spTree>
     <p:extLst>
       <p:ext uri="{BB962C8B-B14F-4D97-AF65-F5344CB8AC3E}">
-        <p14:creationId xmlns:p14="http://schemas.microsoft.com/office/powerpoint/2010/main" xmlns="" val="1034331391"/>
+        <p14:creationId xmlns="" xmlns:p14="http://schemas.microsoft.com/office/powerpoint/2010/main" val="1034331391"/>
       </p:ext>
     </p:extLst>
   </p:cSld>
@@ -6469,7 +6365,7 @@
           <a:blip r:embed="rId2" cstate="print">
             <a:extLst>
               <a:ext uri="{28A0092B-C50C-407E-A947-70E740481C1C}">
-                <a14:useLocalDpi xmlns:a14="http://schemas.microsoft.com/office/drawing/2010/main" xmlns="" val="0"/>
+                <a14:useLocalDpi xmlns="" xmlns:a14="http://schemas.microsoft.com/office/drawing/2010/main" val="0"/>
               </a:ext>
             </a:extLst>
           </a:blip>
@@ -6492,14 +6388,14 @@
           </a:ln>
           <a:extLst>
             <a:ext uri="{909E8E84-426E-40DD-AFC4-6F175D3DCCD1}">
-              <a14:hiddenFill xmlns:a14="http://schemas.microsoft.com/office/drawing/2010/main" xmlns="">
+              <a14:hiddenFill xmlns="" xmlns:a14="http://schemas.microsoft.com/office/drawing/2010/main">
                 <a:solidFill>
                   <a:schemeClr val="accent1"/>
                 </a:solidFill>
               </a14:hiddenFill>
             </a:ext>
             <a:ext uri="{91240B29-F687-4F45-9708-019B960494DF}">
-              <a14:hiddenLine xmlns:a14="http://schemas.microsoft.com/office/drawing/2010/main" xmlns="" w="9525">
+              <a14:hiddenLine xmlns="" xmlns:a14="http://schemas.microsoft.com/office/drawing/2010/main" w="9525">
                 <a:solidFill>
                   <a:schemeClr val="tx1"/>
                 </a:solidFill>
@@ -6514,7 +6410,7 @@
     </p:spTree>
     <p:extLst>
       <p:ext uri="{BB962C8B-B14F-4D97-AF65-F5344CB8AC3E}">
-        <p14:creationId xmlns:p14="http://schemas.microsoft.com/office/powerpoint/2010/main" xmlns="" val="2020869238"/>
+        <p14:creationId xmlns="" xmlns:p14="http://schemas.microsoft.com/office/powerpoint/2010/main" val="2020869238"/>
       </p:ext>
     </p:extLst>
   </p:cSld>
@@ -6595,7 +6491,7 @@
           <a:blip r:embed="rId2" cstate="print">
             <a:extLst>
               <a:ext uri="{28A0092B-C50C-407E-A947-70E740481C1C}">
-                <a14:useLocalDpi xmlns:a14="http://schemas.microsoft.com/office/drawing/2010/main" xmlns="" val="0"/>
+                <a14:useLocalDpi xmlns="" xmlns:a14="http://schemas.microsoft.com/office/drawing/2010/main" val="0"/>
               </a:ext>
             </a:extLst>
           </a:blip>
@@ -6618,14 +6514,14 @@
           </a:ln>
           <a:extLst>
             <a:ext uri="{909E8E84-426E-40DD-AFC4-6F175D3DCCD1}">
-              <a14:hiddenFill xmlns:a14="http://schemas.microsoft.com/office/drawing/2010/main" xmlns="">
+              <a14:hiddenFill xmlns="" xmlns:a14="http://schemas.microsoft.com/office/drawing/2010/main">
                 <a:solidFill>
                   <a:schemeClr val="accent1"/>
                 </a:solidFill>
               </a14:hiddenFill>
             </a:ext>
             <a:ext uri="{91240B29-F687-4F45-9708-019B960494DF}">
-              <a14:hiddenLine xmlns:a14="http://schemas.microsoft.com/office/drawing/2010/main" xmlns="" w="9525">
+              <a14:hiddenLine xmlns="" xmlns:a14="http://schemas.microsoft.com/office/drawing/2010/main" w="9525">
                 <a:solidFill>
                   <a:schemeClr val="tx1"/>
                 </a:solidFill>
@@ -6649,7 +6545,7 @@
           <a:blip r:embed="rId3" cstate="print">
             <a:extLst>
               <a:ext uri="{28A0092B-C50C-407E-A947-70E740481C1C}">
-                <a14:useLocalDpi xmlns:a14="http://schemas.microsoft.com/office/drawing/2010/main" xmlns="" val="0"/>
+                <a14:useLocalDpi xmlns="" xmlns:a14="http://schemas.microsoft.com/office/drawing/2010/main" val="0"/>
               </a:ext>
             </a:extLst>
           </a:blip>
@@ -6672,14 +6568,14 @@
           </a:ln>
           <a:extLst>
             <a:ext uri="{909E8E84-426E-40DD-AFC4-6F175D3DCCD1}">
-              <a14:hiddenFill xmlns:a14="http://schemas.microsoft.com/office/drawing/2010/main" xmlns="">
+              <a14:hiddenFill xmlns="" xmlns:a14="http://schemas.microsoft.com/office/drawing/2010/main">
                 <a:solidFill>
                   <a:schemeClr val="accent1"/>
                 </a:solidFill>
               </a14:hiddenFill>
             </a:ext>
             <a:ext uri="{91240B29-F687-4F45-9708-019B960494DF}">
-              <a14:hiddenLine xmlns:a14="http://schemas.microsoft.com/office/drawing/2010/main" xmlns="" w="9525">
+              <a14:hiddenLine xmlns="" xmlns:a14="http://schemas.microsoft.com/office/drawing/2010/main" w="9525">
                 <a:solidFill>
                   <a:schemeClr val="tx1"/>
                 </a:solidFill>
@@ -6815,7 +6711,7 @@
     </p:spTree>
     <p:extLst>
       <p:ext uri="{BB962C8B-B14F-4D97-AF65-F5344CB8AC3E}">
-        <p14:creationId xmlns:p14="http://schemas.microsoft.com/office/powerpoint/2010/main" xmlns="" val="3608842146"/>
+        <p14:creationId xmlns="" xmlns:p14="http://schemas.microsoft.com/office/powerpoint/2010/main" val="3608842146"/>
       </p:ext>
     </p:extLst>
   </p:cSld>

</xml_diff>

<commit_message>
se actualiza la sección de instalación rápida para quitar el guión de el comando "install" para npm y bower
</commit_message>
<xml_diff>
--- a/bitacora_desarrollo.pptx
+++ b/bitacora_desarrollo.pptx
@@ -308,7 +308,7 @@
             <a:fld id="{7A847CFC-816F-41D0-AAC0-9BF4FEBC753E}" type="datetimeFigureOut">
               <a:rPr lang="es-ES" smtClean="0"/>
               <a:pPr/>
-              <a:t>28/10/2015</a:t>
+              <a:t>29/10/2015</a:t>
             </a:fld>
             <a:endParaRPr lang="es-ES"/>
           </a:p>
@@ -510,7 +510,7 @@
             <a:fld id="{7A847CFC-816F-41D0-AAC0-9BF4FEBC753E}" type="datetimeFigureOut">
               <a:rPr lang="es-ES" smtClean="0"/>
               <a:pPr/>
-              <a:t>28/10/2015</a:t>
+              <a:t>29/10/2015</a:t>
             </a:fld>
             <a:endParaRPr lang="es-ES"/>
           </a:p>
@@ -687,7 +687,7 @@
             <a:fld id="{7A847CFC-816F-41D0-AAC0-9BF4FEBC753E}" type="datetimeFigureOut">
               <a:rPr lang="es-ES" smtClean="0"/>
               <a:pPr/>
-              <a:t>28/10/2015</a:t>
+              <a:t>29/10/2015</a:t>
             </a:fld>
             <a:endParaRPr lang="es-ES"/>
           </a:p>
@@ -854,7 +854,7 @@
             <a:fld id="{7A847CFC-816F-41D0-AAC0-9BF4FEBC753E}" type="datetimeFigureOut">
               <a:rPr lang="es-ES" smtClean="0"/>
               <a:pPr/>
-              <a:t>28/10/2015</a:t>
+              <a:t>29/10/2015</a:t>
             </a:fld>
             <a:endParaRPr lang="es-ES"/>
           </a:p>
@@ -1104,7 +1104,7 @@
             <a:fld id="{7A847CFC-816F-41D0-AAC0-9BF4FEBC753E}" type="datetimeFigureOut">
               <a:rPr lang="es-ES" smtClean="0"/>
               <a:pPr/>
-              <a:t>28/10/2015</a:t>
+              <a:t>29/10/2015</a:t>
             </a:fld>
             <a:endParaRPr lang="es-ES"/>
           </a:p>
@@ -1424,7 +1424,7 @@
             <a:fld id="{7A847CFC-816F-41D0-AAC0-9BF4FEBC753E}" type="datetimeFigureOut">
               <a:rPr lang="es-ES" smtClean="0"/>
               <a:pPr/>
-              <a:t>28/10/2015</a:t>
+              <a:t>29/10/2015</a:t>
             </a:fld>
             <a:endParaRPr lang="es-ES"/>
           </a:p>
@@ -1892,7 +1892,7 @@
             <a:fld id="{7A847CFC-816F-41D0-AAC0-9BF4FEBC753E}" type="datetimeFigureOut">
               <a:rPr lang="es-ES" smtClean="0"/>
               <a:pPr/>
-              <a:t>28/10/2015</a:t>
+              <a:t>29/10/2015</a:t>
             </a:fld>
             <a:endParaRPr lang="es-ES"/>
           </a:p>
@@ -2042,7 +2042,7 @@
             <a:fld id="{7A847CFC-816F-41D0-AAC0-9BF4FEBC753E}" type="datetimeFigureOut">
               <a:rPr lang="es-ES" smtClean="0"/>
               <a:pPr/>
-              <a:t>28/10/2015</a:t>
+              <a:t>29/10/2015</a:t>
             </a:fld>
             <a:endParaRPr lang="es-ES"/>
           </a:p>
@@ -2134,7 +2134,7 @@
             <a:fld id="{7A847CFC-816F-41D0-AAC0-9BF4FEBC753E}" type="datetimeFigureOut">
               <a:rPr lang="es-ES" smtClean="0"/>
               <a:pPr/>
-              <a:t>28/10/2015</a:t>
+              <a:t>29/10/2015</a:t>
             </a:fld>
             <a:endParaRPr lang="es-ES"/>
           </a:p>
@@ -2410,7 +2410,7 @@
             <a:fld id="{7A847CFC-816F-41D0-AAC0-9BF4FEBC753E}" type="datetimeFigureOut">
               <a:rPr lang="es-ES" smtClean="0"/>
               <a:pPr/>
-              <a:t>28/10/2015</a:t>
+              <a:t>29/10/2015</a:t>
             </a:fld>
             <a:endParaRPr lang="es-ES"/>
           </a:p>
@@ -2717,7 +2717,7 @@
             <a:fld id="{7A847CFC-816F-41D0-AAC0-9BF4FEBC753E}" type="datetimeFigureOut">
               <a:rPr lang="es-ES" smtClean="0"/>
               <a:pPr/>
-              <a:t>28/10/2015</a:t>
+              <a:t>29/10/2015</a:t>
             </a:fld>
             <a:endParaRPr lang="es-ES"/>
           </a:p>
@@ -3017,7 +3017,7 @@
             <a:fld id="{7A847CFC-816F-41D0-AAC0-9BF4FEBC753E}" type="datetimeFigureOut">
               <a:rPr lang="es-ES" smtClean="0"/>
               <a:pPr/>
-              <a:t>28/10/2015</a:t>
+              <a:t>29/10/2015</a:t>
             </a:fld>
             <a:endParaRPr lang="es-ES"/>
           </a:p>
@@ -4286,7 +4286,7 @@
     </p:spTree>
     <p:extLst>
       <p:ext uri="{BB962C8B-B14F-4D97-AF65-F5344CB8AC3E}">
-        <p14:creationId xmlns="" xmlns:p14="http://schemas.microsoft.com/office/powerpoint/2010/main" val="2585810778"/>
+        <p14:creationId xmlns:p14="http://schemas.microsoft.com/office/powerpoint/2010/main" val="2585810778"/>
       </p:ext>
     </p:extLst>
   </p:cSld>
@@ -4802,7 +4802,7 @@
     </p:spTree>
     <p:extLst>
       <p:ext uri="{BB962C8B-B14F-4D97-AF65-F5344CB8AC3E}">
-        <p14:creationId xmlns="" xmlns:p14="http://schemas.microsoft.com/office/powerpoint/2010/main" val="2061773745"/>
+        <p14:creationId xmlns:p14="http://schemas.microsoft.com/office/powerpoint/2010/main" val="2061773745"/>
       </p:ext>
     </p:extLst>
   </p:cSld>
@@ -5352,7 +5352,7 @@
     </p:spTree>
     <p:extLst>
       <p:ext uri="{BB962C8B-B14F-4D97-AF65-F5344CB8AC3E}">
-        <p14:creationId xmlns="" xmlns:p14="http://schemas.microsoft.com/office/powerpoint/2010/main" val="1503682371"/>
+        <p14:creationId xmlns:p14="http://schemas.microsoft.com/office/powerpoint/2010/main" val="1503682371"/>
       </p:ext>
     </p:extLst>
   </p:cSld>
@@ -5834,7 +5834,7 @@
     </p:spTree>
     <p:extLst>
       <p:ext uri="{BB962C8B-B14F-4D97-AF65-F5344CB8AC3E}">
-        <p14:creationId xmlns="" xmlns:p14="http://schemas.microsoft.com/office/powerpoint/2010/main" val="1407232196"/>
+        <p14:creationId xmlns:p14="http://schemas.microsoft.com/office/powerpoint/2010/main" val="1407232196"/>
       </p:ext>
     </p:extLst>
   </p:cSld>
@@ -6021,7 +6021,7 @@
                   <a:srgbClr val="0070C0"/>
                 </a:solidFill>
               </a:rPr>
-              <a:t> – </a:t>
+              <a:t> </a:t>
             </a:r>
             <a:r>
               <a:rPr lang="es-VE" sz="1600" b="1" i="1" dirty="0" err="1" smtClean="0">
@@ -6093,7 +6093,7 @@
                   <a:srgbClr val="0070C0"/>
                 </a:solidFill>
               </a:rPr>
-              <a:t> –</a:t>
+              <a:t> </a:t>
             </a:r>
             <a:r>
               <a:rPr lang="es-VE" sz="1600" b="1" i="1" dirty="0" err="1" smtClean="0">
@@ -6260,7 +6260,7 @@
           <a:blip r:embed="rId2" cstate="print">
             <a:extLst>
               <a:ext uri="{28A0092B-C50C-407E-A947-70E740481C1C}">
-                <a14:useLocalDpi xmlns="" xmlns:a14="http://schemas.microsoft.com/office/drawing/2010/main" val="0"/>
+                <a14:useLocalDpi xmlns:a14="http://schemas.microsoft.com/office/drawing/2010/main" val="0"/>
               </a:ext>
             </a:extLst>
           </a:blip>
@@ -6280,7 +6280,7 @@
           <a:noFill/>
           <a:extLst>
             <a:ext uri="{909E8E84-426E-40DD-AFC4-6F175D3DCCD1}">
-              <a14:hiddenFill xmlns="" xmlns:a14="http://schemas.microsoft.com/office/drawing/2010/main">
+              <a14:hiddenFill xmlns:a14="http://schemas.microsoft.com/office/drawing/2010/main">
                 <a:solidFill>
                   <a:srgbClr val="FFFFFF"/>
                 </a:solidFill>
@@ -6292,7 +6292,7 @@
     </p:spTree>
     <p:extLst>
       <p:ext uri="{BB962C8B-B14F-4D97-AF65-F5344CB8AC3E}">
-        <p14:creationId xmlns="" xmlns:p14="http://schemas.microsoft.com/office/powerpoint/2010/main" val="1034331391"/>
+        <p14:creationId xmlns:p14="http://schemas.microsoft.com/office/powerpoint/2010/main" val="1034331391"/>
       </p:ext>
     </p:extLst>
   </p:cSld>
@@ -6365,7 +6365,7 @@
           <a:blip r:embed="rId2" cstate="print">
             <a:extLst>
               <a:ext uri="{28A0092B-C50C-407E-A947-70E740481C1C}">
-                <a14:useLocalDpi xmlns="" xmlns:a14="http://schemas.microsoft.com/office/drawing/2010/main" val="0"/>
+                <a14:useLocalDpi xmlns:a14="http://schemas.microsoft.com/office/drawing/2010/main" val="0"/>
               </a:ext>
             </a:extLst>
           </a:blip>
@@ -6388,14 +6388,14 @@
           </a:ln>
           <a:extLst>
             <a:ext uri="{909E8E84-426E-40DD-AFC4-6F175D3DCCD1}">
-              <a14:hiddenFill xmlns="" xmlns:a14="http://schemas.microsoft.com/office/drawing/2010/main">
+              <a14:hiddenFill xmlns:a14="http://schemas.microsoft.com/office/drawing/2010/main">
                 <a:solidFill>
                   <a:schemeClr val="accent1"/>
                 </a:solidFill>
               </a14:hiddenFill>
             </a:ext>
             <a:ext uri="{91240B29-F687-4F45-9708-019B960494DF}">
-              <a14:hiddenLine xmlns="" xmlns:a14="http://schemas.microsoft.com/office/drawing/2010/main" w="9525">
+              <a14:hiddenLine xmlns:a14="http://schemas.microsoft.com/office/drawing/2010/main" w="9525">
                 <a:solidFill>
                   <a:schemeClr val="tx1"/>
                 </a:solidFill>
@@ -6410,7 +6410,7 @@
     </p:spTree>
     <p:extLst>
       <p:ext uri="{BB962C8B-B14F-4D97-AF65-F5344CB8AC3E}">
-        <p14:creationId xmlns="" xmlns:p14="http://schemas.microsoft.com/office/powerpoint/2010/main" val="2020869238"/>
+        <p14:creationId xmlns:p14="http://schemas.microsoft.com/office/powerpoint/2010/main" val="2020869238"/>
       </p:ext>
     </p:extLst>
   </p:cSld>
@@ -6491,7 +6491,7 @@
           <a:blip r:embed="rId2" cstate="print">
             <a:extLst>
               <a:ext uri="{28A0092B-C50C-407E-A947-70E740481C1C}">
-                <a14:useLocalDpi xmlns="" xmlns:a14="http://schemas.microsoft.com/office/drawing/2010/main" val="0"/>
+                <a14:useLocalDpi xmlns:a14="http://schemas.microsoft.com/office/drawing/2010/main" val="0"/>
               </a:ext>
             </a:extLst>
           </a:blip>
@@ -6514,14 +6514,14 @@
           </a:ln>
           <a:extLst>
             <a:ext uri="{909E8E84-426E-40DD-AFC4-6F175D3DCCD1}">
-              <a14:hiddenFill xmlns="" xmlns:a14="http://schemas.microsoft.com/office/drawing/2010/main">
+              <a14:hiddenFill xmlns:a14="http://schemas.microsoft.com/office/drawing/2010/main">
                 <a:solidFill>
                   <a:schemeClr val="accent1"/>
                 </a:solidFill>
               </a14:hiddenFill>
             </a:ext>
             <a:ext uri="{91240B29-F687-4F45-9708-019B960494DF}">
-              <a14:hiddenLine xmlns="" xmlns:a14="http://schemas.microsoft.com/office/drawing/2010/main" w="9525">
+              <a14:hiddenLine xmlns:a14="http://schemas.microsoft.com/office/drawing/2010/main" w="9525">
                 <a:solidFill>
                   <a:schemeClr val="tx1"/>
                 </a:solidFill>
@@ -6545,7 +6545,7 @@
           <a:blip r:embed="rId3" cstate="print">
             <a:extLst>
               <a:ext uri="{28A0092B-C50C-407E-A947-70E740481C1C}">
-                <a14:useLocalDpi xmlns="" xmlns:a14="http://schemas.microsoft.com/office/drawing/2010/main" val="0"/>
+                <a14:useLocalDpi xmlns:a14="http://schemas.microsoft.com/office/drawing/2010/main" val="0"/>
               </a:ext>
             </a:extLst>
           </a:blip>
@@ -6568,14 +6568,14 @@
           </a:ln>
           <a:extLst>
             <a:ext uri="{909E8E84-426E-40DD-AFC4-6F175D3DCCD1}">
-              <a14:hiddenFill xmlns="" xmlns:a14="http://schemas.microsoft.com/office/drawing/2010/main">
+              <a14:hiddenFill xmlns:a14="http://schemas.microsoft.com/office/drawing/2010/main">
                 <a:solidFill>
                   <a:schemeClr val="accent1"/>
                 </a:solidFill>
               </a14:hiddenFill>
             </a:ext>
             <a:ext uri="{91240B29-F687-4F45-9708-019B960494DF}">
-              <a14:hiddenLine xmlns="" xmlns:a14="http://schemas.microsoft.com/office/drawing/2010/main" w="9525">
+              <a14:hiddenLine xmlns:a14="http://schemas.microsoft.com/office/drawing/2010/main" w="9525">
                 <a:solidFill>
                   <a:schemeClr val="tx1"/>
                 </a:solidFill>
@@ -6711,7 +6711,7 @@
     </p:spTree>
     <p:extLst>
       <p:ext uri="{BB962C8B-B14F-4D97-AF65-F5344CB8AC3E}">
-        <p14:creationId xmlns="" xmlns:p14="http://schemas.microsoft.com/office/powerpoint/2010/main" val="3608842146"/>
+        <p14:creationId xmlns:p14="http://schemas.microsoft.com/office/powerpoint/2010/main" val="3608842146"/>
       </p:ext>
     </p:extLst>
   </p:cSld>

</xml_diff>

<commit_message>
Modificaciones en la sección INICIO
se inicia el uso de LESS

package.json - Se suma less
Gruntfile.js - se suma tarea less
</commit_message>
<xml_diff>
--- a/bitacora_desarrollo.pptx
+++ b/bitacora_desarrollo.pptx
@@ -308,7 +308,7 @@
             <a:fld id="{7A847CFC-816F-41D0-AAC0-9BF4FEBC753E}" type="datetimeFigureOut">
               <a:rPr lang="es-ES" smtClean="0"/>
               <a:pPr/>
-              <a:t>29/10/2015</a:t>
+              <a:t>31/10/2015</a:t>
             </a:fld>
             <a:endParaRPr lang="es-ES"/>
           </a:p>
@@ -510,7 +510,7 @@
             <a:fld id="{7A847CFC-816F-41D0-AAC0-9BF4FEBC753E}" type="datetimeFigureOut">
               <a:rPr lang="es-ES" smtClean="0"/>
               <a:pPr/>
-              <a:t>29/10/2015</a:t>
+              <a:t>31/10/2015</a:t>
             </a:fld>
             <a:endParaRPr lang="es-ES"/>
           </a:p>
@@ -687,7 +687,7 @@
             <a:fld id="{7A847CFC-816F-41D0-AAC0-9BF4FEBC753E}" type="datetimeFigureOut">
               <a:rPr lang="es-ES" smtClean="0"/>
               <a:pPr/>
-              <a:t>29/10/2015</a:t>
+              <a:t>31/10/2015</a:t>
             </a:fld>
             <a:endParaRPr lang="es-ES"/>
           </a:p>
@@ -854,7 +854,7 @@
             <a:fld id="{7A847CFC-816F-41D0-AAC0-9BF4FEBC753E}" type="datetimeFigureOut">
               <a:rPr lang="es-ES" smtClean="0"/>
               <a:pPr/>
-              <a:t>29/10/2015</a:t>
+              <a:t>31/10/2015</a:t>
             </a:fld>
             <a:endParaRPr lang="es-ES"/>
           </a:p>
@@ -1104,7 +1104,7 @@
             <a:fld id="{7A847CFC-816F-41D0-AAC0-9BF4FEBC753E}" type="datetimeFigureOut">
               <a:rPr lang="es-ES" smtClean="0"/>
               <a:pPr/>
-              <a:t>29/10/2015</a:t>
+              <a:t>31/10/2015</a:t>
             </a:fld>
             <a:endParaRPr lang="es-ES"/>
           </a:p>
@@ -1424,7 +1424,7 @@
             <a:fld id="{7A847CFC-816F-41D0-AAC0-9BF4FEBC753E}" type="datetimeFigureOut">
               <a:rPr lang="es-ES" smtClean="0"/>
               <a:pPr/>
-              <a:t>29/10/2015</a:t>
+              <a:t>31/10/2015</a:t>
             </a:fld>
             <a:endParaRPr lang="es-ES"/>
           </a:p>
@@ -1892,7 +1892,7 @@
             <a:fld id="{7A847CFC-816F-41D0-AAC0-9BF4FEBC753E}" type="datetimeFigureOut">
               <a:rPr lang="es-ES" smtClean="0"/>
               <a:pPr/>
-              <a:t>29/10/2015</a:t>
+              <a:t>31/10/2015</a:t>
             </a:fld>
             <a:endParaRPr lang="es-ES"/>
           </a:p>
@@ -2042,7 +2042,7 @@
             <a:fld id="{7A847CFC-816F-41D0-AAC0-9BF4FEBC753E}" type="datetimeFigureOut">
               <a:rPr lang="es-ES" smtClean="0"/>
               <a:pPr/>
-              <a:t>29/10/2015</a:t>
+              <a:t>31/10/2015</a:t>
             </a:fld>
             <a:endParaRPr lang="es-ES"/>
           </a:p>
@@ -2134,7 +2134,7 @@
             <a:fld id="{7A847CFC-816F-41D0-AAC0-9BF4FEBC753E}" type="datetimeFigureOut">
               <a:rPr lang="es-ES" smtClean="0"/>
               <a:pPr/>
-              <a:t>29/10/2015</a:t>
+              <a:t>31/10/2015</a:t>
             </a:fld>
             <a:endParaRPr lang="es-ES"/>
           </a:p>
@@ -2410,7 +2410,7 @@
             <a:fld id="{7A847CFC-816F-41D0-AAC0-9BF4FEBC753E}" type="datetimeFigureOut">
               <a:rPr lang="es-ES" smtClean="0"/>
               <a:pPr/>
-              <a:t>29/10/2015</a:t>
+              <a:t>31/10/2015</a:t>
             </a:fld>
             <a:endParaRPr lang="es-ES"/>
           </a:p>
@@ -2717,7 +2717,7 @@
             <a:fld id="{7A847CFC-816F-41D0-AAC0-9BF4FEBC753E}" type="datetimeFigureOut">
               <a:rPr lang="es-ES" smtClean="0"/>
               <a:pPr/>
-              <a:t>29/10/2015</a:t>
+              <a:t>31/10/2015</a:t>
             </a:fld>
             <a:endParaRPr lang="es-ES"/>
           </a:p>
@@ -3017,7 +3017,7 @@
             <a:fld id="{7A847CFC-816F-41D0-AAC0-9BF4FEBC753E}" type="datetimeFigureOut">
               <a:rPr lang="es-ES" smtClean="0"/>
               <a:pPr/>
-              <a:t>29/10/2015</a:t>
+              <a:t>31/10/2015</a:t>
             </a:fld>
             <a:endParaRPr lang="es-ES"/>
           </a:p>
@@ -4286,7 +4286,7 @@
     </p:spTree>
     <p:extLst>
       <p:ext uri="{BB962C8B-B14F-4D97-AF65-F5344CB8AC3E}">
-        <p14:creationId xmlns:p14="http://schemas.microsoft.com/office/powerpoint/2010/main" val="2585810778"/>
+        <p14:creationId xmlns:p14="http://schemas.microsoft.com/office/powerpoint/2010/main" xmlns="" val="2585810778"/>
       </p:ext>
     </p:extLst>
   </p:cSld>
@@ -4802,7 +4802,7 @@
     </p:spTree>
     <p:extLst>
       <p:ext uri="{BB962C8B-B14F-4D97-AF65-F5344CB8AC3E}">
-        <p14:creationId xmlns:p14="http://schemas.microsoft.com/office/powerpoint/2010/main" val="2061773745"/>
+        <p14:creationId xmlns:p14="http://schemas.microsoft.com/office/powerpoint/2010/main" xmlns="" val="2061773745"/>
       </p:ext>
     </p:extLst>
   </p:cSld>
@@ -5352,7 +5352,7 @@
     </p:spTree>
     <p:extLst>
       <p:ext uri="{BB962C8B-B14F-4D97-AF65-F5344CB8AC3E}">
-        <p14:creationId xmlns:p14="http://schemas.microsoft.com/office/powerpoint/2010/main" val="1503682371"/>
+        <p14:creationId xmlns:p14="http://schemas.microsoft.com/office/powerpoint/2010/main" xmlns="" val="1503682371"/>
       </p:ext>
     </p:extLst>
   </p:cSld>
@@ -5422,7 +5422,7 @@
         <p:spPr/>
         <p:txBody>
           <a:bodyPr>
-            <a:normAutofit fontScale="92500" lnSpcReduction="20000"/>
+            <a:normAutofit fontScale="85000" lnSpcReduction="20000"/>
           </a:bodyPr>
           <a:lstStyle/>
           <a:p>
@@ -5575,17 +5575,55 @@
             </a:r>
             <a:r>
               <a:rPr lang="en-US" sz="1600" i="1" dirty="0" smtClean="0"/>
-              <a:t>uglify-js@1 --save-dev</a:t>
-            </a:r>
-          </a:p>
-          <a:p>
-            <a:pPr marL="285750" indent="-285750"/>
+              <a:t>uglify-js@1 --</a:t>
+            </a:r>
+            <a:r>
+              <a:rPr lang="en-US" sz="1600" i="1" dirty="0" smtClean="0"/>
+              <a:t>save-dev</a:t>
+            </a:r>
+          </a:p>
+          <a:p>
+            <a:pPr marL="285750" lvl="2" indent="-285750">
+              <a:buSzPct val="85000"/>
+            </a:pPr>
             <a:r>
               <a:rPr lang="en-US" sz="1600" b="1" dirty="0" err="1" smtClean="0"/>
               <a:t>Instalar</a:t>
             </a:r>
             <a:r>
               <a:rPr lang="en-US" sz="1600" b="1" dirty="0" smtClean="0"/>
+              <a:t> LESS </a:t>
+            </a:r>
+            <a:r>
+              <a:rPr lang="en-US" sz="1600" i="1" dirty="0" smtClean="0"/>
+              <a:t>-  </a:t>
+            </a:r>
+            <a:r>
+              <a:rPr lang="en-US" sz="1600" i="1" dirty="0" err="1" smtClean="0"/>
+              <a:t>npm</a:t>
+            </a:r>
+            <a:r>
+              <a:rPr lang="en-US" sz="1600" i="1" dirty="0" smtClean="0"/>
+              <a:t> </a:t>
+            </a:r>
+            <a:r>
+              <a:rPr lang="en-US" sz="1600" i="1" dirty="0" smtClean="0"/>
+              <a:t>install -g less </a:t>
+            </a:r>
+            <a:r>
+              <a:rPr lang="en-US" sz="1600" i="1" dirty="0" smtClean="0"/>
+              <a:t>--save-dev</a:t>
+            </a:r>
+            <a:endParaRPr lang="en-US" sz="1600" i="1" dirty="0" smtClean="0"/>
+          </a:p>
+          <a:p>
+            <a:pPr marL="285750" indent="-285750"/>
+            <a:r>
+              <a:rPr lang="en-US" sz="1600" b="1" dirty="0" err="1" smtClean="0"/>
+              <a:t>Instalar</a:t>
+            </a:r>
+            <a:r>
+              <a:rPr lang="en-US" sz="1600" b="1" dirty="0" smtClean="0"/>
               <a:t> GRUNT </a:t>
             </a:r>
             <a:r>
@@ -5788,7 +5826,38 @@
             </a:r>
             <a:r>
               <a:rPr lang="en-US" sz="1600" i="1" dirty="0" smtClean="0"/>
-              <a:t>-jade --save-dev</a:t>
+              <a:t>-jade --</a:t>
+            </a:r>
+            <a:r>
+              <a:rPr lang="en-US" sz="1600" i="1" dirty="0" smtClean="0"/>
+              <a:t>save-dev</a:t>
+            </a:r>
+          </a:p>
+          <a:p>
+            <a:pPr marL="560070" lvl="1" indent="-285750"/>
+            <a:r>
+              <a:rPr lang="en-US" sz="1600" i="1" dirty="0" err="1" smtClean="0"/>
+              <a:t>npm</a:t>
+            </a:r>
+            <a:r>
+              <a:rPr lang="en-US" sz="1600" i="1" dirty="0" smtClean="0"/>
+              <a:t> install </a:t>
+            </a:r>
+            <a:r>
+              <a:rPr lang="en-US" sz="1600" i="1" dirty="0" smtClean="0"/>
+              <a:t>grunt-</a:t>
+            </a:r>
+            <a:r>
+              <a:rPr lang="en-US" sz="1600" i="1" dirty="0" err="1" smtClean="0"/>
+              <a:t>contrib</a:t>
+            </a:r>
+            <a:r>
+              <a:rPr lang="en-US" sz="1600" i="1" dirty="0" smtClean="0"/>
+              <a:t>-less --</a:t>
+            </a:r>
+            <a:r>
+              <a:rPr lang="en-US" sz="1600" i="1" dirty="0" smtClean="0"/>
+              <a:t>save-dev</a:t>
             </a:r>
           </a:p>
           <a:p>
@@ -5834,7 +5903,7 @@
     </p:spTree>
     <p:extLst>
       <p:ext uri="{BB962C8B-B14F-4D97-AF65-F5344CB8AC3E}">
-        <p14:creationId xmlns:p14="http://schemas.microsoft.com/office/powerpoint/2010/main" val="1407232196"/>
+        <p14:creationId xmlns:p14="http://schemas.microsoft.com/office/powerpoint/2010/main" xmlns="" val="1407232196"/>
       </p:ext>
     </p:extLst>
   </p:cSld>
@@ -6260,7 +6329,7 @@
           <a:blip r:embed="rId2" cstate="print">
             <a:extLst>
               <a:ext uri="{28A0092B-C50C-407E-A947-70E740481C1C}">
-                <a14:useLocalDpi xmlns:a14="http://schemas.microsoft.com/office/drawing/2010/main" val="0"/>
+                <a14:useLocalDpi xmlns:a14="http://schemas.microsoft.com/office/drawing/2010/main" xmlns="" val="0"/>
               </a:ext>
             </a:extLst>
           </a:blip>
@@ -6280,7 +6349,7 @@
           <a:noFill/>
           <a:extLst>
             <a:ext uri="{909E8E84-426E-40DD-AFC4-6F175D3DCCD1}">
-              <a14:hiddenFill xmlns:a14="http://schemas.microsoft.com/office/drawing/2010/main">
+              <a14:hiddenFill xmlns:a14="http://schemas.microsoft.com/office/drawing/2010/main" xmlns="">
                 <a:solidFill>
                   <a:srgbClr val="FFFFFF"/>
                 </a:solidFill>
@@ -6292,7 +6361,7 @@
     </p:spTree>
     <p:extLst>
       <p:ext uri="{BB962C8B-B14F-4D97-AF65-F5344CB8AC3E}">
-        <p14:creationId xmlns:p14="http://schemas.microsoft.com/office/powerpoint/2010/main" val="1034331391"/>
+        <p14:creationId xmlns:p14="http://schemas.microsoft.com/office/powerpoint/2010/main" xmlns="" val="1034331391"/>
       </p:ext>
     </p:extLst>
   </p:cSld>
@@ -6365,7 +6434,7 @@
           <a:blip r:embed="rId2" cstate="print">
             <a:extLst>
               <a:ext uri="{28A0092B-C50C-407E-A947-70E740481C1C}">
-                <a14:useLocalDpi xmlns:a14="http://schemas.microsoft.com/office/drawing/2010/main" val="0"/>
+                <a14:useLocalDpi xmlns:a14="http://schemas.microsoft.com/office/drawing/2010/main" xmlns="" val="0"/>
               </a:ext>
             </a:extLst>
           </a:blip>
@@ -6388,14 +6457,14 @@
           </a:ln>
           <a:extLst>
             <a:ext uri="{909E8E84-426E-40DD-AFC4-6F175D3DCCD1}">
-              <a14:hiddenFill xmlns:a14="http://schemas.microsoft.com/office/drawing/2010/main">
+              <a14:hiddenFill xmlns:a14="http://schemas.microsoft.com/office/drawing/2010/main" xmlns="">
                 <a:solidFill>
                   <a:schemeClr val="accent1"/>
                 </a:solidFill>
               </a14:hiddenFill>
             </a:ext>
             <a:ext uri="{91240B29-F687-4F45-9708-019B960494DF}">
-              <a14:hiddenLine xmlns:a14="http://schemas.microsoft.com/office/drawing/2010/main" w="9525">
+              <a14:hiddenLine xmlns:a14="http://schemas.microsoft.com/office/drawing/2010/main" xmlns="" w="9525">
                 <a:solidFill>
                   <a:schemeClr val="tx1"/>
                 </a:solidFill>
@@ -6410,7 +6479,7 @@
     </p:spTree>
     <p:extLst>
       <p:ext uri="{BB962C8B-B14F-4D97-AF65-F5344CB8AC3E}">
-        <p14:creationId xmlns:p14="http://schemas.microsoft.com/office/powerpoint/2010/main" val="2020869238"/>
+        <p14:creationId xmlns:p14="http://schemas.microsoft.com/office/powerpoint/2010/main" xmlns="" val="2020869238"/>
       </p:ext>
     </p:extLst>
   </p:cSld>
@@ -6491,7 +6560,7 @@
           <a:blip r:embed="rId2" cstate="print">
             <a:extLst>
               <a:ext uri="{28A0092B-C50C-407E-A947-70E740481C1C}">
-                <a14:useLocalDpi xmlns:a14="http://schemas.microsoft.com/office/drawing/2010/main" val="0"/>
+                <a14:useLocalDpi xmlns:a14="http://schemas.microsoft.com/office/drawing/2010/main" xmlns="" val="0"/>
               </a:ext>
             </a:extLst>
           </a:blip>
@@ -6514,14 +6583,14 @@
           </a:ln>
           <a:extLst>
             <a:ext uri="{909E8E84-426E-40DD-AFC4-6F175D3DCCD1}">
-              <a14:hiddenFill xmlns:a14="http://schemas.microsoft.com/office/drawing/2010/main">
+              <a14:hiddenFill xmlns:a14="http://schemas.microsoft.com/office/drawing/2010/main" xmlns="">
                 <a:solidFill>
                   <a:schemeClr val="accent1"/>
                 </a:solidFill>
               </a14:hiddenFill>
             </a:ext>
             <a:ext uri="{91240B29-F687-4F45-9708-019B960494DF}">
-              <a14:hiddenLine xmlns:a14="http://schemas.microsoft.com/office/drawing/2010/main" w="9525">
+              <a14:hiddenLine xmlns:a14="http://schemas.microsoft.com/office/drawing/2010/main" xmlns="" w="9525">
                 <a:solidFill>
                   <a:schemeClr val="tx1"/>
                 </a:solidFill>
@@ -6545,7 +6614,7 @@
           <a:blip r:embed="rId3" cstate="print">
             <a:extLst>
               <a:ext uri="{28A0092B-C50C-407E-A947-70E740481C1C}">
-                <a14:useLocalDpi xmlns:a14="http://schemas.microsoft.com/office/drawing/2010/main" val="0"/>
+                <a14:useLocalDpi xmlns:a14="http://schemas.microsoft.com/office/drawing/2010/main" xmlns="" val="0"/>
               </a:ext>
             </a:extLst>
           </a:blip>
@@ -6568,14 +6637,14 @@
           </a:ln>
           <a:extLst>
             <a:ext uri="{909E8E84-426E-40DD-AFC4-6F175D3DCCD1}">
-              <a14:hiddenFill xmlns:a14="http://schemas.microsoft.com/office/drawing/2010/main">
+              <a14:hiddenFill xmlns:a14="http://schemas.microsoft.com/office/drawing/2010/main" xmlns="">
                 <a:solidFill>
                   <a:schemeClr val="accent1"/>
                 </a:solidFill>
               </a14:hiddenFill>
             </a:ext>
             <a:ext uri="{91240B29-F687-4F45-9708-019B960494DF}">
-              <a14:hiddenLine xmlns:a14="http://schemas.microsoft.com/office/drawing/2010/main" w="9525">
+              <a14:hiddenLine xmlns:a14="http://schemas.microsoft.com/office/drawing/2010/main" xmlns="" w="9525">
                 <a:solidFill>
                   <a:schemeClr val="tx1"/>
                 </a:solidFill>
@@ -6711,7 +6780,7 @@
     </p:spTree>
     <p:extLst>
       <p:ext uri="{BB962C8B-B14F-4D97-AF65-F5344CB8AC3E}">
-        <p14:creationId xmlns:p14="http://schemas.microsoft.com/office/powerpoint/2010/main" val="3608842146"/>
+        <p14:creationId xmlns:p14="http://schemas.microsoft.com/office/powerpoint/2010/main" xmlns="" val="3608842146"/>
       </p:ext>
     </p:extLst>
   </p:cSld>

</xml_diff>

<commit_message>
bitacora_desarrollo.pptx - Se actualiza para indicar que se incluye tambien jquery-ui Gruntfile.js - se actualiza para incluir copia de jquery-ui bower.json - se actualiza para incluir instalacion de jquery-ui acorde.less - cambios varios para asegurar el responsive de las opciones index.html - Se comenta la sección de people por razones de prueba, mejoras varias en el resto de opciones acorde.js - se suma opciones evento click a caption del carousel
</commit_message>
<xml_diff>
--- a/bitacora_desarrollo.pptx
+++ b/bitacora_desarrollo.pptx
@@ -308,7 +308,7 @@
             <a:fld id="{7A847CFC-816F-41D0-AAC0-9BF4FEBC753E}" type="datetimeFigureOut">
               <a:rPr lang="es-ES" smtClean="0"/>
               <a:pPr/>
-              <a:t>31/10/2015</a:t>
+              <a:t>08/11/2015</a:t>
             </a:fld>
             <a:endParaRPr lang="es-ES"/>
           </a:p>
@@ -510,7 +510,7 @@
             <a:fld id="{7A847CFC-816F-41D0-AAC0-9BF4FEBC753E}" type="datetimeFigureOut">
               <a:rPr lang="es-ES" smtClean="0"/>
               <a:pPr/>
-              <a:t>31/10/2015</a:t>
+              <a:t>08/11/2015</a:t>
             </a:fld>
             <a:endParaRPr lang="es-ES"/>
           </a:p>
@@ -687,7 +687,7 @@
             <a:fld id="{7A847CFC-816F-41D0-AAC0-9BF4FEBC753E}" type="datetimeFigureOut">
               <a:rPr lang="es-ES" smtClean="0"/>
               <a:pPr/>
-              <a:t>31/10/2015</a:t>
+              <a:t>08/11/2015</a:t>
             </a:fld>
             <a:endParaRPr lang="es-ES"/>
           </a:p>
@@ -854,7 +854,7 @@
             <a:fld id="{7A847CFC-816F-41D0-AAC0-9BF4FEBC753E}" type="datetimeFigureOut">
               <a:rPr lang="es-ES" smtClean="0"/>
               <a:pPr/>
-              <a:t>31/10/2015</a:t>
+              <a:t>08/11/2015</a:t>
             </a:fld>
             <a:endParaRPr lang="es-ES"/>
           </a:p>
@@ -1104,7 +1104,7 @@
             <a:fld id="{7A847CFC-816F-41D0-AAC0-9BF4FEBC753E}" type="datetimeFigureOut">
               <a:rPr lang="es-ES" smtClean="0"/>
               <a:pPr/>
-              <a:t>31/10/2015</a:t>
+              <a:t>08/11/2015</a:t>
             </a:fld>
             <a:endParaRPr lang="es-ES"/>
           </a:p>
@@ -1424,7 +1424,7 @@
             <a:fld id="{7A847CFC-816F-41D0-AAC0-9BF4FEBC753E}" type="datetimeFigureOut">
               <a:rPr lang="es-ES" smtClean="0"/>
               <a:pPr/>
-              <a:t>31/10/2015</a:t>
+              <a:t>08/11/2015</a:t>
             </a:fld>
             <a:endParaRPr lang="es-ES"/>
           </a:p>
@@ -1892,7 +1892,7 @@
             <a:fld id="{7A847CFC-816F-41D0-AAC0-9BF4FEBC753E}" type="datetimeFigureOut">
               <a:rPr lang="es-ES" smtClean="0"/>
               <a:pPr/>
-              <a:t>31/10/2015</a:t>
+              <a:t>08/11/2015</a:t>
             </a:fld>
             <a:endParaRPr lang="es-ES"/>
           </a:p>
@@ -2042,7 +2042,7 @@
             <a:fld id="{7A847CFC-816F-41D0-AAC0-9BF4FEBC753E}" type="datetimeFigureOut">
               <a:rPr lang="es-ES" smtClean="0"/>
               <a:pPr/>
-              <a:t>31/10/2015</a:t>
+              <a:t>08/11/2015</a:t>
             </a:fld>
             <a:endParaRPr lang="es-ES"/>
           </a:p>
@@ -2134,7 +2134,7 @@
             <a:fld id="{7A847CFC-816F-41D0-AAC0-9BF4FEBC753E}" type="datetimeFigureOut">
               <a:rPr lang="es-ES" smtClean="0"/>
               <a:pPr/>
-              <a:t>31/10/2015</a:t>
+              <a:t>08/11/2015</a:t>
             </a:fld>
             <a:endParaRPr lang="es-ES"/>
           </a:p>
@@ -2410,7 +2410,7 @@
             <a:fld id="{7A847CFC-816F-41D0-AAC0-9BF4FEBC753E}" type="datetimeFigureOut">
               <a:rPr lang="es-ES" smtClean="0"/>
               <a:pPr/>
-              <a:t>31/10/2015</a:t>
+              <a:t>08/11/2015</a:t>
             </a:fld>
             <a:endParaRPr lang="es-ES"/>
           </a:p>
@@ -2717,7 +2717,7 @@
             <a:fld id="{7A847CFC-816F-41D0-AAC0-9BF4FEBC753E}" type="datetimeFigureOut">
               <a:rPr lang="es-ES" smtClean="0"/>
               <a:pPr/>
-              <a:t>31/10/2015</a:t>
+              <a:t>08/11/2015</a:t>
             </a:fld>
             <a:endParaRPr lang="es-ES"/>
           </a:p>
@@ -3017,7 +3017,7 @@
             <a:fld id="{7A847CFC-816F-41D0-AAC0-9BF4FEBC753E}" type="datetimeFigureOut">
               <a:rPr lang="es-ES" smtClean="0"/>
               <a:pPr/>
-              <a:t>31/10/2015</a:t>
+              <a:t>08/11/2015</a:t>
             </a:fld>
             <a:endParaRPr lang="es-ES"/>
           </a:p>
@@ -4286,7 +4286,7 @@
     </p:spTree>
     <p:extLst>
       <p:ext uri="{BB962C8B-B14F-4D97-AF65-F5344CB8AC3E}">
-        <p14:creationId xmlns:p14="http://schemas.microsoft.com/office/powerpoint/2010/main" xmlns="" val="2585810778"/>
+        <p14:creationId xmlns="" xmlns:p14="http://schemas.microsoft.com/office/powerpoint/2010/main" val="2585810778"/>
       </p:ext>
     </p:extLst>
   </p:cSld>
@@ -4802,7 +4802,7 @@
     </p:spTree>
     <p:extLst>
       <p:ext uri="{BB962C8B-B14F-4D97-AF65-F5344CB8AC3E}">
-        <p14:creationId xmlns:p14="http://schemas.microsoft.com/office/powerpoint/2010/main" xmlns="" val="2061773745"/>
+        <p14:creationId xmlns="" xmlns:p14="http://schemas.microsoft.com/office/powerpoint/2010/main" val="2061773745"/>
       </p:ext>
     </p:extLst>
   </p:cSld>
@@ -5352,7 +5352,7 @@
     </p:spTree>
     <p:extLst>
       <p:ext uri="{BB962C8B-B14F-4D97-AF65-F5344CB8AC3E}">
-        <p14:creationId xmlns:p14="http://schemas.microsoft.com/office/powerpoint/2010/main" xmlns="" val="1503682371"/>
+        <p14:creationId xmlns="" xmlns:p14="http://schemas.microsoft.com/office/powerpoint/2010/main" val="1503682371"/>
       </p:ext>
     </p:extLst>
   </p:cSld>
@@ -5575,11 +5575,7 @@
             </a:r>
             <a:r>
               <a:rPr lang="en-US" sz="1600" i="1" dirty="0" smtClean="0"/>
-              <a:t>uglify-js@1 --</a:t>
-            </a:r>
-            <a:r>
-              <a:rPr lang="en-US" sz="1600" i="1" dirty="0" smtClean="0"/>
-              <a:t>save-dev</a:t>
+              <a:t>uglify-js@1 --save-dev</a:t>
             </a:r>
           </a:p>
           <a:p>
@@ -5604,17 +5600,8 @@
             </a:r>
             <a:r>
               <a:rPr lang="en-US" sz="1600" i="1" dirty="0" smtClean="0"/>
-              <a:t> </a:t>
-            </a:r>
-            <a:r>
-              <a:rPr lang="en-US" sz="1600" i="1" dirty="0" smtClean="0"/>
-              <a:t>install -g less </a:t>
-            </a:r>
-            <a:r>
-              <a:rPr lang="en-US" sz="1600" i="1" dirty="0" smtClean="0"/>
-              <a:t>--save-dev</a:t>
-            </a:r>
-            <a:endParaRPr lang="en-US" sz="1600" i="1" dirty="0" smtClean="0"/>
+              <a:t> install -g less --save-dev</a:t>
+            </a:r>
           </a:p>
           <a:p>
             <a:pPr marL="285750" indent="-285750"/>
@@ -5826,11 +5813,7 @@
             </a:r>
             <a:r>
               <a:rPr lang="en-US" sz="1600" i="1" dirty="0" smtClean="0"/>
-              <a:t>-jade --</a:t>
-            </a:r>
-            <a:r>
-              <a:rPr lang="en-US" sz="1600" i="1" dirty="0" smtClean="0"/>
-              <a:t>save-dev</a:t>
+              <a:t>-jade --save-dev</a:t>
             </a:r>
           </a:p>
           <a:p>
@@ -5841,11 +5824,7 @@
             </a:r>
             <a:r>
               <a:rPr lang="en-US" sz="1600" i="1" dirty="0" smtClean="0"/>
-              <a:t> install </a:t>
-            </a:r>
-            <a:r>
-              <a:rPr lang="en-US" sz="1600" i="1" dirty="0" smtClean="0"/>
-              <a:t>grunt-</a:t>
+              <a:t> install grunt-</a:t>
             </a:r>
             <a:r>
               <a:rPr lang="en-US" sz="1600" i="1" dirty="0" err="1" smtClean="0"/>
@@ -5853,11 +5832,7 @@
             </a:r>
             <a:r>
               <a:rPr lang="en-US" sz="1600" i="1" dirty="0" smtClean="0"/>
-              <a:t>-less --</a:t>
-            </a:r>
-            <a:r>
-              <a:rPr lang="en-US" sz="1600" i="1" dirty="0" smtClean="0"/>
-              <a:t>save-dev</a:t>
+              <a:t>-less --save-dev</a:t>
             </a:r>
           </a:p>
           <a:p>
@@ -5903,7 +5878,7 @@
     </p:spTree>
     <p:extLst>
       <p:ext uri="{BB962C8B-B14F-4D97-AF65-F5344CB8AC3E}">
-        <p14:creationId xmlns:p14="http://schemas.microsoft.com/office/powerpoint/2010/main" xmlns="" val="1407232196"/>
+        <p14:creationId xmlns="" xmlns:p14="http://schemas.microsoft.com/office/powerpoint/2010/main" val="1407232196"/>
       </p:ext>
     </p:extLst>
   </p:cSld>
@@ -6198,11 +6173,19 @@
             </a:r>
             <a:r>
               <a:rPr lang="es-VE" sz="1400" b="1" dirty="0" smtClean="0"/>
+              <a:t>, </a:t>
+            </a:r>
+            <a:r>
+              <a:rPr lang="es-VE" sz="1400" b="1" dirty="0" err="1" smtClean="0"/>
+              <a:t>jquery</a:t>
+            </a:r>
+            <a:r>
+              <a:rPr lang="es-VE" sz="1400" b="1" dirty="0" smtClean="0"/>
               <a:t> y </a:t>
             </a:r>
             <a:r>
               <a:rPr lang="es-VE" sz="1400" b="1" dirty="0" err="1" smtClean="0"/>
-              <a:t>jqyery</a:t>
+              <a:t>jquery-ui</a:t>
             </a:r>
             <a:endParaRPr lang="es-VE" sz="1400" b="1" dirty="0" smtClean="0"/>
           </a:p>
@@ -6329,7 +6312,7 @@
           <a:blip r:embed="rId2" cstate="print">
             <a:extLst>
               <a:ext uri="{28A0092B-C50C-407E-A947-70E740481C1C}">
-                <a14:useLocalDpi xmlns:a14="http://schemas.microsoft.com/office/drawing/2010/main" xmlns="" val="0"/>
+                <a14:useLocalDpi xmlns="" xmlns:a14="http://schemas.microsoft.com/office/drawing/2010/main" val="0"/>
               </a:ext>
             </a:extLst>
           </a:blip>
@@ -6349,7 +6332,7 @@
           <a:noFill/>
           <a:extLst>
             <a:ext uri="{909E8E84-426E-40DD-AFC4-6F175D3DCCD1}">
-              <a14:hiddenFill xmlns:a14="http://schemas.microsoft.com/office/drawing/2010/main" xmlns="">
+              <a14:hiddenFill xmlns="" xmlns:a14="http://schemas.microsoft.com/office/drawing/2010/main">
                 <a:solidFill>
                   <a:srgbClr val="FFFFFF"/>
                 </a:solidFill>
@@ -6361,7 +6344,7 @@
     </p:spTree>
     <p:extLst>
       <p:ext uri="{BB962C8B-B14F-4D97-AF65-F5344CB8AC3E}">
-        <p14:creationId xmlns:p14="http://schemas.microsoft.com/office/powerpoint/2010/main" xmlns="" val="1034331391"/>
+        <p14:creationId xmlns="" xmlns:p14="http://schemas.microsoft.com/office/powerpoint/2010/main" val="1034331391"/>
       </p:ext>
     </p:extLst>
   </p:cSld>
@@ -6434,7 +6417,7 @@
           <a:blip r:embed="rId2" cstate="print">
             <a:extLst>
               <a:ext uri="{28A0092B-C50C-407E-A947-70E740481C1C}">
-                <a14:useLocalDpi xmlns:a14="http://schemas.microsoft.com/office/drawing/2010/main" xmlns="" val="0"/>
+                <a14:useLocalDpi xmlns="" xmlns:a14="http://schemas.microsoft.com/office/drawing/2010/main" val="0"/>
               </a:ext>
             </a:extLst>
           </a:blip>
@@ -6457,14 +6440,14 @@
           </a:ln>
           <a:extLst>
             <a:ext uri="{909E8E84-426E-40DD-AFC4-6F175D3DCCD1}">
-              <a14:hiddenFill xmlns:a14="http://schemas.microsoft.com/office/drawing/2010/main" xmlns="">
+              <a14:hiddenFill xmlns="" xmlns:a14="http://schemas.microsoft.com/office/drawing/2010/main">
                 <a:solidFill>
                   <a:schemeClr val="accent1"/>
                 </a:solidFill>
               </a14:hiddenFill>
             </a:ext>
             <a:ext uri="{91240B29-F687-4F45-9708-019B960494DF}">
-              <a14:hiddenLine xmlns:a14="http://schemas.microsoft.com/office/drawing/2010/main" xmlns="" w="9525">
+              <a14:hiddenLine xmlns="" xmlns:a14="http://schemas.microsoft.com/office/drawing/2010/main" w="9525">
                 <a:solidFill>
                   <a:schemeClr val="tx1"/>
                 </a:solidFill>
@@ -6479,7 +6462,7 @@
     </p:spTree>
     <p:extLst>
       <p:ext uri="{BB962C8B-B14F-4D97-AF65-F5344CB8AC3E}">
-        <p14:creationId xmlns:p14="http://schemas.microsoft.com/office/powerpoint/2010/main" xmlns="" val="2020869238"/>
+        <p14:creationId xmlns="" xmlns:p14="http://schemas.microsoft.com/office/powerpoint/2010/main" val="2020869238"/>
       </p:ext>
     </p:extLst>
   </p:cSld>
@@ -6560,7 +6543,7 @@
           <a:blip r:embed="rId2" cstate="print">
             <a:extLst>
               <a:ext uri="{28A0092B-C50C-407E-A947-70E740481C1C}">
-                <a14:useLocalDpi xmlns:a14="http://schemas.microsoft.com/office/drawing/2010/main" xmlns="" val="0"/>
+                <a14:useLocalDpi xmlns="" xmlns:a14="http://schemas.microsoft.com/office/drawing/2010/main" val="0"/>
               </a:ext>
             </a:extLst>
           </a:blip>
@@ -6583,14 +6566,14 @@
           </a:ln>
           <a:extLst>
             <a:ext uri="{909E8E84-426E-40DD-AFC4-6F175D3DCCD1}">
-              <a14:hiddenFill xmlns:a14="http://schemas.microsoft.com/office/drawing/2010/main" xmlns="">
+              <a14:hiddenFill xmlns="" xmlns:a14="http://schemas.microsoft.com/office/drawing/2010/main">
                 <a:solidFill>
                   <a:schemeClr val="accent1"/>
                 </a:solidFill>
               </a14:hiddenFill>
             </a:ext>
             <a:ext uri="{91240B29-F687-4F45-9708-019B960494DF}">
-              <a14:hiddenLine xmlns:a14="http://schemas.microsoft.com/office/drawing/2010/main" xmlns="" w="9525">
+              <a14:hiddenLine xmlns="" xmlns:a14="http://schemas.microsoft.com/office/drawing/2010/main" w="9525">
                 <a:solidFill>
                   <a:schemeClr val="tx1"/>
                 </a:solidFill>
@@ -6614,7 +6597,7 @@
           <a:blip r:embed="rId3" cstate="print">
             <a:extLst>
               <a:ext uri="{28A0092B-C50C-407E-A947-70E740481C1C}">
-                <a14:useLocalDpi xmlns:a14="http://schemas.microsoft.com/office/drawing/2010/main" xmlns="" val="0"/>
+                <a14:useLocalDpi xmlns="" xmlns:a14="http://schemas.microsoft.com/office/drawing/2010/main" val="0"/>
               </a:ext>
             </a:extLst>
           </a:blip>
@@ -6637,14 +6620,14 @@
           </a:ln>
           <a:extLst>
             <a:ext uri="{909E8E84-426E-40DD-AFC4-6F175D3DCCD1}">
-              <a14:hiddenFill xmlns:a14="http://schemas.microsoft.com/office/drawing/2010/main" xmlns="">
+              <a14:hiddenFill xmlns="" xmlns:a14="http://schemas.microsoft.com/office/drawing/2010/main">
                 <a:solidFill>
                   <a:schemeClr val="accent1"/>
                 </a:solidFill>
               </a14:hiddenFill>
             </a:ext>
             <a:ext uri="{91240B29-F687-4F45-9708-019B960494DF}">
-              <a14:hiddenLine xmlns:a14="http://schemas.microsoft.com/office/drawing/2010/main" xmlns="" w="9525">
+              <a14:hiddenLine xmlns="" xmlns:a14="http://schemas.microsoft.com/office/drawing/2010/main" w="9525">
                 <a:solidFill>
                   <a:schemeClr val="tx1"/>
                 </a:solidFill>
@@ -6780,7 +6763,7 @@
     </p:spTree>
     <p:extLst>
       <p:ext uri="{BB962C8B-B14F-4D97-AF65-F5344CB8AC3E}">
-        <p14:creationId xmlns:p14="http://schemas.microsoft.com/office/powerpoint/2010/main" xmlns="" val="3608842146"/>
+        <p14:creationId xmlns="" xmlns:p14="http://schemas.microsoft.com/office/powerpoint/2010/main" val="3608842146"/>
       </p:ext>
     </p:extLst>
   </p:cSld>

</xml_diff>